<commit_message>
aula 4 - Plumatic Schema
</commit_message>
<xml_diff>
--- a/doc/NUBOOT-MOD3-PROG-TEC-CLJ.pptx
+++ b/doc/NUBOOT-MOD3-PROG-TEC-CLJ.pptx
@@ -5,7 +5,7 @@
     <p:sldMasterId id="2147483648" r:id="rId1"/>
   </p:sldMasterIdLst>
   <p:notesMasterIdLst>
-    <p:notesMasterId r:id="rId21"/>
+    <p:notesMasterId r:id="rId24"/>
   </p:notesMasterIdLst>
   <p:sldIdLst>
     <p:sldId id="256" r:id="rId2"/>
@@ -21,12 +21,15 @@
     <p:sldId id="274" r:id="rId12"/>
     <p:sldId id="273" r:id="rId13"/>
     <p:sldId id="270" r:id="rId14"/>
-    <p:sldId id="264" r:id="rId15"/>
-    <p:sldId id="266" r:id="rId16"/>
-    <p:sldId id="265" r:id="rId17"/>
+    <p:sldId id="275" r:id="rId15"/>
+    <p:sldId id="276" r:id="rId16"/>
+    <p:sldId id="266" r:id="rId17"/>
     <p:sldId id="267" r:id="rId18"/>
-    <p:sldId id="268" r:id="rId19"/>
-    <p:sldId id="269" r:id="rId20"/>
+    <p:sldId id="264" r:id="rId19"/>
+    <p:sldId id="268" r:id="rId20"/>
+    <p:sldId id="269" r:id="rId21"/>
+    <p:sldId id="277" r:id="rId22"/>
+    <p:sldId id="278" r:id="rId23"/>
   </p:sldIdLst>
   <p:sldSz cx="12192000" cy="6858000"/>
   <p:notesSz cx="6858000" cy="9144000"/>
@@ -151,12 +154,15 @@
         <p14:section name="Aula 3" id="{1E759683-8BDA-6947-BDA4-9C81F08549B8}">
           <p14:sldIdLst>
             <p14:sldId id="270"/>
+            <p14:sldId id="275"/>
+            <p14:sldId id="276"/>
+            <p14:sldId id="266"/>
+            <p14:sldId id="267"/>
             <p14:sldId id="264"/>
-            <p14:sldId id="266"/>
-            <p14:sldId id="265"/>
-            <p14:sldId id="267"/>
             <p14:sldId id="268"/>
             <p14:sldId id="269"/>
+            <p14:sldId id="277"/>
+            <p14:sldId id="278"/>
           </p14:sldIdLst>
         </p14:section>
       </p14:sectionLst>
@@ -250,7 +256,7 @@
           <a:p>
             <a:fld id="{290A6CB2-1C58-D84E-B07B-B5770D071A49}" type="datetimeFigureOut">
               <a:rPr lang="en-BR" smtClean="0"/>
-              <a:t>29/05/23</a:t>
+              <a:t>01/06/23</a:t>
             </a:fld>
             <a:endParaRPr lang="en-BR"/>
           </a:p>
@@ -4253,7 +4259,7 @@
           <a:p>
             <a:fld id="{DC55D523-4C5D-3943-A284-67088B5655C5}" type="slidenum">
               <a:rPr lang="en-BR" smtClean="0"/>
-              <a:t>18</a:t>
+              <a:t>19</a:t>
             </a:fld>
             <a:endParaRPr lang="en-BR"/>
           </a:p>
@@ -4263,6 +4269,90 @@
     <p:extLst>
       <p:ext uri="{BB962C8B-B14F-4D97-AF65-F5344CB8AC3E}">
         <p14:creationId xmlns:p14="http://schemas.microsoft.com/office/powerpoint/2010/main" val="3833138780"/>
+      </p:ext>
+    </p:extLst>
+  </p:cSld>
+  <p:clrMapOvr>
+    <a:masterClrMapping/>
+  </p:clrMapOvr>
+</p:notes>
+</file>
+
+<file path=ppt/notesSlides/notesSlide4.xml><?xml version="1.0" encoding="utf-8"?>
+<p:notes xmlns:a="http://schemas.openxmlformats.org/drawingml/2006/main" xmlns:r="http://schemas.openxmlformats.org/officeDocument/2006/relationships" xmlns:p="http://schemas.openxmlformats.org/presentationml/2006/main">
+  <p:cSld>
+    <p:spTree>
+      <p:nvGrpSpPr>
+        <p:cNvPr id="1" name=""/>
+        <p:cNvGrpSpPr/>
+        <p:nvPr/>
+      </p:nvGrpSpPr>
+      <p:grpSpPr>
+        <a:xfrm>
+          <a:off x="0" y="0"/>
+          <a:ext cx="0" cy="0"/>
+          <a:chOff x="0" y="0"/>
+          <a:chExt cx="0" cy="0"/>
+        </a:xfrm>
+      </p:grpSpPr>
+      <p:sp>
+        <p:nvSpPr>
+          <p:cNvPr id="2" name="Slide Image Placeholder 1"/>
+          <p:cNvSpPr>
+            <a:spLocks noGrp="1" noRot="1" noChangeAspect="1"/>
+          </p:cNvSpPr>
+          <p:nvPr>
+            <p:ph type="sldImg"/>
+          </p:nvPr>
+        </p:nvSpPr>
+        <p:spPr/>
+      </p:sp>
+      <p:sp>
+        <p:nvSpPr>
+          <p:cNvPr id="3" name="Notes Placeholder 2"/>
+          <p:cNvSpPr>
+            <a:spLocks noGrp="1"/>
+          </p:cNvSpPr>
+          <p:nvPr>
+            <p:ph type="body" idx="1"/>
+          </p:nvPr>
+        </p:nvSpPr>
+        <p:spPr/>
+        <p:txBody>
+          <a:bodyPr/>
+          <a:lstStyle/>
+          <a:p>
+            <a:endParaRPr lang="en-BR"/>
+          </a:p>
+        </p:txBody>
+      </p:sp>
+      <p:sp>
+        <p:nvSpPr>
+          <p:cNvPr id="4" name="Slide Number Placeholder 3"/>
+          <p:cNvSpPr>
+            <a:spLocks noGrp="1"/>
+          </p:cNvSpPr>
+          <p:nvPr>
+            <p:ph type="sldNum" sz="quarter" idx="5"/>
+          </p:nvPr>
+        </p:nvSpPr>
+        <p:spPr/>
+        <p:txBody>
+          <a:bodyPr/>
+          <a:lstStyle/>
+          <a:p>
+            <a:fld id="{DC55D523-4C5D-3943-A284-67088B5655C5}" type="slidenum">
+              <a:rPr lang="en-BR" smtClean="0"/>
+              <a:t>21</a:t>
+            </a:fld>
+            <a:endParaRPr lang="en-BR"/>
+          </a:p>
+        </p:txBody>
+      </p:sp>
+    </p:spTree>
+    <p:extLst>
+      <p:ext uri="{BB962C8B-B14F-4D97-AF65-F5344CB8AC3E}">
+        <p14:creationId xmlns:p14="http://schemas.microsoft.com/office/powerpoint/2010/main" val="979200426"/>
       </p:ext>
     </p:extLst>
   </p:cSld>
@@ -4489,7 +4579,7 @@
           <a:p>
             <a:fld id="{9AB3A824-1A51-4B26-AD58-A6D8E14F6C04}" type="datetimeFigureOut">
               <a:rPr lang="en-US"/>
-              <a:t>5/29/23</a:t>
+              <a:t>6/1/23</a:t>
             </a:fld>
             <a:endParaRPr lang="en-US"/>
           </a:p>
@@ -4823,7 +4913,7 @@
           <a:p>
             <a:fld id="{D857E33E-8B18-4087-B112-809917729534}" type="datetimeFigureOut">
               <a:rPr lang="en-US"/>
-              <a:t>5/29/23</a:t>
+              <a:t>6/1/23</a:t>
             </a:fld>
             <a:endParaRPr lang="en-US"/>
           </a:p>
@@ -5125,7 +5215,7 @@
           <a:p>
             <a:fld id="{D3FFE419-2371-464F-8239-3959401C3561}" type="datetimeFigureOut">
               <a:rPr lang="en-US"/>
-              <a:t>5/29/23</a:t>
+              <a:t>6/1/23</a:t>
             </a:fld>
             <a:endParaRPr lang="en-US"/>
           </a:p>
@@ -5372,7 +5462,7 @@
           <a:p>
             <a:fld id="{97D162C4-EDD9-4389-A98B-B87ECEA2A816}" type="datetimeFigureOut">
               <a:rPr lang="en-US"/>
-              <a:t>5/29/23</a:t>
+              <a:t>6/1/23</a:t>
             </a:fld>
             <a:endParaRPr lang="en-US"/>
           </a:p>
@@ -5779,7 +5869,7 @@
           <a:p>
             <a:fld id="{3E5059C3-6A89-4494-99FF-5A4D6FFD50EB}" type="datetimeFigureOut">
               <a:rPr lang="en-US"/>
-              <a:t>5/29/23</a:t>
+              <a:t>6/1/23</a:t>
             </a:fld>
             <a:endParaRPr lang="en-US"/>
           </a:p>
@@ -6093,7 +6183,7 @@
           <a:p>
             <a:fld id="{CA954B2F-12DE-47F5-8894-472B206D2E1E}" type="datetimeFigureOut">
               <a:rPr lang="en-US"/>
-              <a:t>5/29/23</a:t>
+              <a:t>6/1/23</a:t>
             </a:fld>
             <a:endParaRPr lang="en-US"/>
           </a:p>
@@ -6637,7 +6727,7 @@
           <a:p>
             <a:fld id="{3F30E46F-7819-4ACF-B48B-48222C2ACC88}" type="datetimeFigureOut">
               <a:rPr lang="en-US"/>
-              <a:t>5/29/23</a:t>
+              <a:t>6/1/23</a:t>
             </a:fld>
             <a:endParaRPr lang="en-US"/>
           </a:p>
@@ -6832,7 +6922,7 @@
           <a:p>
             <a:fld id="{1FAF3416-4057-4DAA-829D-4CA07428D088}" type="datetimeFigureOut">
               <a:rPr lang="en-US"/>
-              <a:t>5/29/23</a:t>
+              <a:t>6/1/23</a:t>
             </a:fld>
             <a:endParaRPr lang="en-US"/>
           </a:p>
@@ -7045,7 +7135,7 @@
           <a:p>
             <a:fld id="{921D9284-D300-4297-87F7-E791DCC15DB1}" type="datetimeFigureOut">
               <a:rPr lang="en-US"/>
-              <a:t>5/29/23</a:t>
+              <a:t>6/1/23</a:t>
             </a:fld>
             <a:endParaRPr lang="en-US"/>
           </a:p>
@@ -7414,7 +7504,7 @@
           <a:p>
             <a:fld id="{37D525BB-DA17-4BA0-B3C8-3AC3ABC827E6}" type="datetimeFigureOut">
               <a:rPr lang="en-US"/>
-              <a:t>5/29/23</a:t>
+              <a:t>6/1/23</a:t>
             </a:fld>
             <a:endParaRPr lang="en-US"/>
           </a:p>
@@ -7816,7 +7906,7 @@
           <a:p>
             <a:fld id="{B16C4C9A-3960-41CF-A4E9-2A8FB932454B}" type="datetimeFigureOut">
               <a:rPr lang="en-US"/>
-              <a:t>5/29/23</a:t>
+              <a:t>6/1/23</a:t>
             </a:fld>
             <a:endParaRPr lang="en-US"/>
           </a:p>
@@ -8127,7 +8217,7 @@
           <a:p>
             <a:fld id="{3CBC1C18-307B-4F68-A007-B5B542270E8D}" type="datetimeFigureOut">
               <a:rPr lang="en-US"/>
-              <a:t>5/29/23</a:t>
+              <a:t>6/1/23</a:t>
             </a:fld>
             <a:endParaRPr lang="en-US"/>
           </a:p>
@@ -9106,7 +9196,7 @@
             </a:br>
             <a:r>
               <a:rPr lang="en-BR" dirty="0"/>
-              <a:t>Aula 3 – 29/05/2023</a:t>
+              <a:t>Aula 3 – 31/05/2023</a:t>
             </a:r>
             <a:br>
               <a:rPr lang="en-BR" dirty="0"/>
@@ -9151,12 +9241,6 @@
             <a:r>
               <a:rPr lang="en-BR" dirty="0"/>
               <a:t>Atoms</a:t>
-            </a:r>
-          </a:p>
-          <a:p>
-            <a:r>
-              <a:rPr lang="en-BR" dirty="0"/>
-              <a:t>Refactoring</a:t>
             </a:r>
           </a:p>
           <a:p>
@@ -9197,101 +9281,188 @@
           <a:chExt cx="0" cy="0"/>
         </a:xfrm>
       </p:grpSpPr>
-      <p:sp>
-        <p:nvSpPr>
-          <p:cNvPr id="4" name="Title 3">
+      <p:pic>
+        <p:nvPicPr>
+          <p:cNvPr id="4" name="Picture 3">
             <a:extLst>
               <a:ext uri="{FF2B5EF4-FFF2-40B4-BE49-F238E27FC236}">
-                <a16:creationId xmlns:a16="http://schemas.microsoft.com/office/drawing/2014/main" id="{E9CF7843-DDFB-50C6-FF7B-85A4DFA4F6D1}"/>
+                <a16:creationId xmlns:a16="http://schemas.microsoft.com/office/drawing/2014/main" id="{4D2B37CA-03B2-7A5D-96A0-F8C8AEE8932B}"/>
               </a:ext>
             </a:extLst>
           </p:cNvPr>
-          <p:cNvSpPr>
-            <a:spLocks noGrp="1"/>
-          </p:cNvSpPr>
-          <p:nvPr>
-            <p:ph type="title"/>
-          </p:nvPr>
-        </p:nvSpPr>
-        <p:spPr/>
-        <p:txBody>
-          <a:bodyPr/>
-          <a:lstStyle/>
-          <a:p>
-            <a:r>
-              <a:rPr lang="en-BR"/>
-              <a:t>Imutabilidade</a:t>
-            </a:r>
-          </a:p>
-        </p:txBody>
-      </p:sp>
-      <p:sp>
-        <p:nvSpPr>
-          <p:cNvPr id="5" name="Content Placeholder 4">
+          <p:cNvPicPr>
+            <a:picLocks noChangeAspect="1"/>
+          </p:cNvPicPr>
+          <p:nvPr/>
+        </p:nvPicPr>
+        <p:blipFill>
+          <a:blip r:embed="rId2"/>
+          <a:stretch>
+            <a:fillRect/>
+          </a:stretch>
+        </p:blipFill>
+        <p:spPr>
+          <a:xfrm>
+            <a:off x="2435268" y="1637447"/>
+            <a:ext cx="3035300" cy="4165600"/>
+          </a:xfrm>
+          <a:prstGeom prst="rect">
+            <a:avLst/>
+          </a:prstGeom>
+        </p:spPr>
+      </p:pic>
+      <p:pic>
+        <p:nvPicPr>
+          <p:cNvPr id="5" name="Picture 4">
             <a:extLst>
               <a:ext uri="{FF2B5EF4-FFF2-40B4-BE49-F238E27FC236}">
-                <a16:creationId xmlns:a16="http://schemas.microsoft.com/office/drawing/2014/main" id="{DDC6F2CA-CCD2-AA3E-E6B8-AA9AD7D5D10E}"/>
+                <a16:creationId xmlns:a16="http://schemas.microsoft.com/office/drawing/2014/main" id="{2E990089-1FFF-BF74-DF0D-2A57461E39A9}"/>
               </a:ext>
             </a:extLst>
           </p:cNvPr>
-          <p:cNvSpPr>
-            <a:spLocks noGrp="1"/>
-          </p:cNvSpPr>
-          <p:nvPr>
-            <p:ph idx="1"/>
-          </p:nvPr>
-        </p:nvSpPr>
-        <p:spPr/>
+          <p:cNvPicPr>
+            <a:picLocks noChangeAspect="1"/>
+          </p:cNvPicPr>
+          <p:nvPr/>
+        </p:nvPicPr>
+        <p:blipFill>
+          <a:blip r:embed="rId3"/>
+          <a:stretch>
+            <a:fillRect/>
+          </a:stretch>
+        </p:blipFill>
+        <p:spPr>
+          <a:xfrm>
+            <a:off x="6795963" y="1637447"/>
+            <a:ext cx="2443831" cy="4519939"/>
+          </a:xfrm>
+          <a:prstGeom prst="rect">
+            <a:avLst/>
+          </a:prstGeom>
+        </p:spPr>
+      </p:pic>
+      <p:sp>
+        <p:nvSpPr>
+          <p:cNvPr id="7" name="TextBox 6">
+            <a:extLst>
+              <a:ext uri="{FF2B5EF4-FFF2-40B4-BE49-F238E27FC236}">
+                <a16:creationId xmlns:a16="http://schemas.microsoft.com/office/drawing/2014/main" id="{C6E7CA4D-4EEB-E4ED-1F35-A925178324FD}"/>
+              </a:ext>
+            </a:extLst>
+          </p:cNvPr>
+          <p:cNvSpPr txBox="1"/>
+          <p:nvPr/>
+        </p:nvSpPr>
+        <p:spPr>
+          <a:xfrm>
+            <a:off x="2435268" y="814642"/>
+            <a:ext cx="1844358" cy="646331"/>
+          </a:xfrm>
+          <a:prstGeom prst="rect">
+            <a:avLst/>
+          </a:prstGeom>
+          <a:noFill/>
+        </p:spPr>
         <p:txBody>
-          <a:bodyPr/>
+          <a:bodyPr wrap="square">
+            <a:spAutoFit/>
+          </a:bodyPr>
           <a:lstStyle/>
           <a:p>
             <a:r>
-              <a:rPr lang="en-US">
-                <a:hlinkClick r:id="rId2"/>
-              </a:rPr>
-              <a:t>https://augustl.com/blog/2019/you_have_to_know_about_persistent_data_structures/</a:t>
-            </a:r>
-            <a:endParaRPr lang="en-US"/>
-          </a:p>
-          <a:p>
-            <a:r>
-              <a:rPr lang="en-US">
-                <a:hlinkClick r:id="rId3"/>
-              </a:rPr>
-              <a:t>https://clojure.org/reference/data_structures</a:t>
-            </a:r>
-            <a:endParaRPr lang="en-US"/>
-          </a:p>
-          <a:p>
-            <a:r>
-              <a:rPr lang="en-US"/>
-              <a:t>https://</a:t>
-            </a:r>
-            <a:r>
-              <a:rPr lang="en-US" err="1"/>
-              <a:t>orgpad.com</a:t>
-            </a:r>
-            <a:r>
-              <a:rPr lang="en-US"/>
-              <a:t>/o/BSZ05PGN1PMbIjmwIT3Vhs?s=</a:t>
-            </a:r>
-            <a:r>
-              <a:rPr lang="en-US" err="1"/>
-              <a:t>clojure-tutorial&amp;token</a:t>
-            </a:r>
-            <a:r>
-              <a:rPr lang="en-US"/>
-              <a:t>=CJlRL7peFImINGAtZ9WscU</a:t>
-            </a:r>
-            <a:endParaRPr lang="en-BR"/>
+              <a:rPr lang="en-US" dirty="0"/>
+              <a:t>(def </a:t>
+            </a:r>
+            <a:r>
+              <a:rPr lang="en-US" dirty="0" err="1"/>
+              <a:t>xs</a:t>
+            </a:r>
+            <a:r>
+              <a:rPr lang="en-US" dirty="0"/>
+              <a:t> [0, 1, 2])</a:t>
+            </a:r>
+          </a:p>
+          <a:p>
+            <a:r>
+              <a:rPr lang="en-US" dirty="0"/>
+              <a:t>(def </a:t>
+            </a:r>
+            <a:r>
+              <a:rPr lang="en-US" dirty="0" err="1"/>
+              <a:t>ys</a:t>
+            </a:r>
+            <a:r>
+              <a:rPr lang="en-US" dirty="0"/>
+              <a:t> [3, 4, 5])</a:t>
+            </a:r>
+            <a:endParaRPr lang="en-BR" dirty="0"/>
+          </a:p>
+        </p:txBody>
+      </p:sp>
+      <p:sp>
+        <p:nvSpPr>
+          <p:cNvPr id="8" name="TextBox 7">
+            <a:extLst>
+              <a:ext uri="{FF2B5EF4-FFF2-40B4-BE49-F238E27FC236}">
+                <a16:creationId xmlns:a16="http://schemas.microsoft.com/office/drawing/2014/main" id="{6AB385C8-7B3F-79A9-F4A6-AA6EAECBF9A5}"/>
+              </a:ext>
+            </a:extLst>
+          </p:cNvPr>
+          <p:cNvSpPr txBox="1"/>
+          <p:nvPr/>
+        </p:nvSpPr>
+        <p:spPr>
+          <a:xfrm>
+            <a:off x="6584901" y="814642"/>
+            <a:ext cx="3035299" cy="369332"/>
+          </a:xfrm>
+          <a:prstGeom prst="rect">
+            <a:avLst/>
+          </a:prstGeom>
+          <a:noFill/>
+        </p:spPr>
+        <p:txBody>
+          <a:bodyPr wrap="square">
+            <a:spAutoFit/>
+          </a:bodyPr>
+          <a:lstStyle/>
+          <a:p>
+            <a:r>
+              <a:rPr lang="en-US" dirty="0"/>
+              <a:t>(def zs (</a:t>
+            </a:r>
+            <a:r>
+              <a:rPr lang="en-US" dirty="0" err="1"/>
+              <a:t>concat</a:t>
+            </a:r>
+            <a:r>
+              <a:rPr lang="en-US" dirty="0"/>
+              <a:t> </a:t>
+            </a:r>
+            <a:r>
+              <a:rPr lang="en-US" dirty="0" err="1"/>
+              <a:t>xs</a:t>
+            </a:r>
+            <a:r>
+              <a:rPr lang="en-US" dirty="0"/>
+              <a:t> </a:t>
+            </a:r>
+            <a:r>
+              <a:rPr lang="en-US" dirty="0" err="1"/>
+              <a:t>ys</a:t>
+            </a:r>
+            <a:r>
+              <a:rPr lang="en-US" dirty="0"/>
+              <a:t>))</a:t>
+            </a:r>
+            <a:endParaRPr lang="en-BR" dirty="0"/>
           </a:p>
         </p:txBody>
       </p:sp>
     </p:spTree>
     <p:extLst>
       <p:ext uri="{BB962C8B-B14F-4D97-AF65-F5344CB8AC3E}">
-        <p14:creationId xmlns:p14="http://schemas.microsoft.com/office/powerpoint/2010/main" val="3446563712"/>
+        <p14:creationId xmlns:p14="http://schemas.microsoft.com/office/powerpoint/2010/main" val="86803441"/>
       </p:ext>
     </p:extLst>
   </p:cSld>
@@ -9302,6 +9473,165 @@
 </file>
 
 <file path=ppt/slides/slide15.xml><?xml version="1.0" encoding="utf-8"?>
+<p:sld xmlns:a="http://schemas.openxmlformats.org/drawingml/2006/main" xmlns:r="http://schemas.openxmlformats.org/officeDocument/2006/relationships" xmlns:p="http://schemas.openxmlformats.org/presentationml/2006/main">
+  <p:cSld>
+    <p:spTree>
+      <p:nvGrpSpPr>
+        <p:cNvPr id="1" name=""/>
+        <p:cNvGrpSpPr/>
+        <p:nvPr/>
+      </p:nvGrpSpPr>
+      <p:grpSpPr>
+        <a:xfrm>
+          <a:off x="0" y="0"/>
+          <a:ext cx="0" cy="0"/>
+          <a:chOff x="0" y="0"/>
+          <a:chExt cx="0" cy="0"/>
+        </a:xfrm>
+      </p:grpSpPr>
+      <p:sp>
+        <p:nvSpPr>
+          <p:cNvPr id="7" name="TextBox 6">
+            <a:extLst>
+              <a:ext uri="{FF2B5EF4-FFF2-40B4-BE49-F238E27FC236}">
+                <a16:creationId xmlns:a16="http://schemas.microsoft.com/office/drawing/2014/main" id="{C6E7CA4D-4EEB-E4ED-1F35-A925178324FD}"/>
+              </a:ext>
+            </a:extLst>
+          </p:cNvPr>
+          <p:cNvSpPr txBox="1"/>
+          <p:nvPr/>
+        </p:nvSpPr>
+        <p:spPr>
+          <a:xfrm>
+            <a:off x="2435268" y="814642"/>
+            <a:ext cx="4609966" cy="923330"/>
+          </a:xfrm>
+          <a:prstGeom prst="rect">
+            <a:avLst/>
+          </a:prstGeom>
+          <a:noFill/>
+        </p:spPr>
+        <p:txBody>
+          <a:bodyPr wrap="square">
+            <a:spAutoFit/>
+          </a:bodyPr>
+          <a:lstStyle/>
+          <a:p>
+            <a:r>
+              <a:rPr lang="en-US" b="0" i="0" dirty="0">
+                <a:effectLst/>
+                <a:latin typeface="Source Code Pro" panose="020F0502020204030204" pitchFamily="34" charset="0"/>
+              </a:rPr>
+              <a:t>(</a:t>
+            </a:r>
+            <a:r>
+              <a:rPr lang="en-US" b="1" i="0" dirty="0">
+                <a:effectLst/>
+                <a:latin typeface="Source Code Pro" panose="020F0502020204030204" pitchFamily="34" charset="0"/>
+              </a:rPr>
+              <a:t>def</a:t>
+            </a:r>
+            <a:r>
+              <a:rPr lang="en-US" b="0" i="0" dirty="0">
+                <a:effectLst/>
+                <a:latin typeface="Source Code Pro" panose="020F0502020204030204" pitchFamily="34" charset="0"/>
+              </a:rPr>
+              <a:t> brown [0 1 2 3 4 5]) </a:t>
+            </a:r>
+          </a:p>
+          <a:p>
+            <a:r>
+              <a:rPr lang="en-US" b="0" i="0" dirty="0">
+                <a:effectLst/>
+                <a:latin typeface="Source Code Pro" panose="020F0502020204030204" pitchFamily="34" charset="0"/>
+              </a:rPr>
+              <a:t>(</a:t>
+            </a:r>
+            <a:r>
+              <a:rPr lang="en-US" b="1" i="0" dirty="0">
+                <a:effectLst/>
+                <a:latin typeface="Source Code Pro" panose="020F0502020204030204" pitchFamily="34" charset="0"/>
+              </a:rPr>
+              <a:t>def</a:t>
+            </a:r>
+            <a:r>
+              <a:rPr lang="en-US" b="0" i="0" dirty="0">
+                <a:effectLst/>
+                <a:latin typeface="Source Code Pro" panose="020F0502020204030204" pitchFamily="34" charset="0"/>
+              </a:rPr>
+              <a:t> blue (pop brown)) </a:t>
+            </a:r>
+          </a:p>
+          <a:p>
+            <a:r>
+              <a:rPr lang="en-US" b="0" i="0" dirty="0">
+                <a:effectLst/>
+                <a:latin typeface="Source Code Pro" panose="020F0502020204030204" pitchFamily="34" charset="0"/>
+              </a:rPr>
+              <a:t>(</a:t>
+            </a:r>
+            <a:r>
+              <a:rPr lang="en-US" b="1" i="0" dirty="0">
+                <a:effectLst/>
+                <a:latin typeface="Source Code Pro" panose="020F0502020204030204" pitchFamily="34" charset="0"/>
+              </a:rPr>
+              <a:t>def</a:t>
+            </a:r>
+            <a:r>
+              <a:rPr lang="en-US" b="0" i="0" dirty="0">
+                <a:effectLst/>
+                <a:latin typeface="Source Code Pro" panose="020F0502020204030204" pitchFamily="34" charset="0"/>
+              </a:rPr>
+              <a:t> green (pop brown))</a:t>
+            </a:r>
+            <a:endParaRPr lang="en-BR" dirty="0"/>
+          </a:p>
+        </p:txBody>
+      </p:sp>
+      <p:pic>
+        <p:nvPicPr>
+          <p:cNvPr id="2" name="Picture 1">
+            <a:extLst>
+              <a:ext uri="{FF2B5EF4-FFF2-40B4-BE49-F238E27FC236}">
+                <a16:creationId xmlns:a16="http://schemas.microsoft.com/office/drawing/2014/main" id="{39981DF6-F09F-3DFA-B03C-9A6E8AD56E64}"/>
+              </a:ext>
+            </a:extLst>
+          </p:cNvPr>
+          <p:cNvPicPr>
+            <a:picLocks noChangeAspect="1"/>
+          </p:cNvPicPr>
+          <p:nvPr/>
+        </p:nvPicPr>
+        <p:blipFill>
+          <a:blip r:embed="rId2"/>
+          <a:stretch>
+            <a:fillRect/>
+          </a:stretch>
+        </p:blipFill>
+        <p:spPr>
+          <a:xfrm>
+            <a:off x="2590853" y="1984274"/>
+            <a:ext cx="7772400" cy="4607590"/>
+          </a:xfrm>
+          <a:prstGeom prst="rect">
+            <a:avLst/>
+          </a:prstGeom>
+        </p:spPr>
+      </p:pic>
+    </p:spTree>
+    <p:extLst>
+      <p:ext uri="{BB962C8B-B14F-4D97-AF65-F5344CB8AC3E}">
+        <p14:creationId xmlns:p14="http://schemas.microsoft.com/office/powerpoint/2010/main" val="4293095660"/>
+      </p:ext>
+    </p:extLst>
+  </p:cSld>
+  <p:clrMapOvr>
+    <a:masterClrMapping/>
+  </p:clrMapOvr>
+</p:sld>
+</file>
+
+<file path=ppt/slides/slide16.xml><?xml version="1.0" encoding="utf-8"?>
 <p:sld xmlns:a="http://schemas.openxmlformats.org/drawingml/2006/main" xmlns:r="http://schemas.openxmlformats.org/officeDocument/2006/relationships" xmlns:p="http://schemas.openxmlformats.org/presentationml/2006/main">
   <p:cSld>
     <p:spTree>
@@ -9377,7 +9707,7 @@
         </p:blipFill>
         <p:spPr bwMode="auto">
           <a:xfrm>
-            <a:off x="2956521" y="1754891"/>
+            <a:off x="2402121" y="1998496"/>
             <a:ext cx="7823185" cy="4146288"/>
           </a:xfrm>
           <a:prstGeom prst="rect">
@@ -9399,113 +9729,6 @@
     <p:extLst>
       <p:ext uri="{BB962C8B-B14F-4D97-AF65-F5344CB8AC3E}">
         <p14:creationId xmlns:p14="http://schemas.microsoft.com/office/powerpoint/2010/main" val="2905640841"/>
-      </p:ext>
-    </p:extLst>
-  </p:cSld>
-  <p:clrMapOvr>
-    <a:masterClrMapping/>
-  </p:clrMapOvr>
-</p:sld>
-</file>
-
-<file path=ppt/slides/slide16.xml><?xml version="1.0" encoding="utf-8"?>
-<p:sld xmlns:a="http://schemas.openxmlformats.org/drawingml/2006/main" xmlns:r="http://schemas.openxmlformats.org/officeDocument/2006/relationships" xmlns:p="http://schemas.openxmlformats.org/presentationml/2006/main">
-  <p:cSld>
-    <p:spTree>
-      <p:nvGrpSpPr>
-        <p:cNvPr id="1" name=""/>
-        <p:cNvGrpSpPr/>
-        <p:nvPr/>
-      </p:nvGrpSpPr>
-      <p:grpSpPr>
-        <a:xfrm>
-          <a:off x="0" y="0"/>
-          <a:ext cx="0" cy="0"/>
-          <a:chOff x="0" y="0"/>
-          <a:chExt cx="0" cy="0"/>
-        </a:xfrm>
-      </p:grpSpPr>
-      <p:sp>
-        <p:nvSpPr>
-          <p:cNvPr id="2" name="Title 1">
-            <a:extLst>
-              <a:ext uri="{FF2B5EF4-FFF2-40B4-BE49-F238E27FC236}">
-                <a16:creationId xmlns:a16="http://schemas.microsoft.com/office/drawing/2014/main" id="{B369B5F4-268B-1396-E173-DF820CB2FA28}"/>
-              </a:ext>
-            </a:extLst>
-          </p:cNvPr>
-          <p:cNvSpPr>
-            <a:spLocks noGrp="1"/>
-          </p:cNvSpPr>
-          <p:nvPr>
-            <p:ph type="title"/>
-          </p:nvPr>
-        </p:nvSpPr>
-        <p:spPr/>
-        <p:txBody>
-          <a:bodyPr/>
-          <a:lstStyle/>
-          <a:p>
-            <a:r>
-              <a:rPr lang="en-BR"/>
-              <a:t>Imutabilidade</a:t>
-            </a:r>
-          </a:p>
-        </p:txBody>
-      </p:sp>
-      <p:pic>
-        <p:nvPicPr>
-          <p:cNvPr id="2050" name="Picture 2" descr="Persistent Trees in git, Clojure and CouchDB">
-            <a:extLst>
-              <a:ext uri="{FF2B5EF4-FFF2-40B4-BE49-F238E27FC236}">
-                <a16:creationId xmlns:a16="http://schemas.microsoft.com/office/drawing/2014/main" id="{01F5D8AF-10D3-D65C-550E-826B2D9F63F7}"/>
-              </a:ext>
-            </a:extLst>
-          </p:cNvPr>
-          <p:cNvPicPr>
-            <a:picLocks noGrp="1" noChangeAspect="1" noChangeArrowheads="1"/>
-          </p:cNvPicPr>
-          <p:nvPr>
-            <p:ph idx="1"/>
-          </p:nvPr>
-        </p:nvPicPr>
-        <p:blipFill>
-          <a:blip r:embed="rId2">
-            <a:extLst>
-              <a:ext uri="{28A0092B-C50C-407E-A947-70E740481C1C}">
-                <a14:useLocalDpi xmlns:a14="http://schemas.microsoft.com/office/drawing/2010/main" val="0"/>
-              </a:ext>
-            </a:extLst>
-          </a:blip>
-          <a:srcRect/>
-          <a:stretch>
-            <a:fillRect/>
-          </a:stretch>
-        </p:blipFill>
-        <p:spPr bwMode="auto">
-          <a:xfrm>
-            <a:off x="3623469" y="2425700"/>
-            <a:ext cx="6096000" cy="3251200"/>
-          </a:xfrm>
-          <a:prstGeom prst="rect">
-            <a:avLst/>
-          </a:prstGeom>
-          <a:noFill/>
-          <a:extLst>
-            <a:ext uri="{909E8E84-426E-40DD-AFC4-6F175D3DCCD1}">
-              <a14:hiddenFill xmlns:a14="http://schemas.microsoft.com/office/drawing/2010/main">
-                <a:solidFill>
-                  <a:srgbClr val="FFFFFF"/>
-                </a:solidFill>
-              </a14:hiddenFill>
-            </a:ext>
-          </a:extLst>
-        </p:spPr>
-      </p:pic>
-    </p:spTree>
-    <p:extLst>
-      <p:ext uri="{BB962C8B-B14F-4D97-AF65-F5344CB8AC3E}">
-        <p14:creationId xmlns:p14="http://schemas.microsoft.com/office/powerpoint/2010/main" val="615230609"/>
       </p:ext>
     </p:extLst>
   </p:cSld>
@@ -9584,8 +9807,8 @@
         </p:blipFill>
         <p:spPr>
           <a:xfrm>
-            <a:off x="3563871" y="2052638"/>
-            <a:ext cx="6215195" cy="3997325"/>
+            <a:off x="2611808" y="1447754"/>
+            <a:ext cx="7958331" cy="5118429"/>
           </a:xfrm>
           <a:prstGeom prst="rect">
             <a:avLst/>
@@ -9624,10 +9847,10 @@
       </p:grpSpPr>
       <p:sp>
         <p:nvSpPr>
-          <p:cNvPr id="2" name="Title 1">
+          <p:cNvPr id="4" name="Title 3">
             <a:extLst>
               <a:ext uri="{FF2B5EF4-FFF2-40B4-BE49-F238E27FC236}">
-                <a16:creationId xmlns:a16="http://schemas.microsoft.com/office/drawing/2014/main" id="{B369B5F4-268B-1396-E173-DF820CB2FA28}"/>
+                <a16:creationId xmlns:a16="http://schemas.microsoft.com/office/drawing/2014/main" id="{E9CF7843-DDFB-50C6-FF7B-85A4DFA4F6D1}"/>
               </a:ext>
             </a:extLst>
           </p:cNvPr>
@@ -9645,17 +9868,17 @@
           <a:p>
             <a:r>
               <a:rPr lang="en-BR" dirty="0"/>
-              <a:t>Exercicios</a:t>
+              <a:t>Links</a:t>
             </a:r>
           </a:p>
         </p:txBody>
       </p:sp>
       <p:sp>
         <p:nvSpPr>
-          <p:cNvPr id="4" name="Content Placeholder 3">
+          <p:cNvPr id="5" name="Content Placeholder 4">
             <a:extLst>
               <a:ext uri="{FF2B5EF4-FFF2-40B4-BE49-F238E27FC236}">
-                <a16:creationId xmlns:a16="http://schemas.microsoft.com/office/drawing/2014/main" id="{E6EF5C85-9C2C-F4A4-3838-53A1003CF817}"/>
+                <a16:creationId xmlns:a16="http://schemas.microsoft.com/office/drawing/2014/main" id="{DDC6F2CA-CCD2-AA3E-E6B8-AA9AD7D5D10E}"/>
               </a:ext>
             </a:extLst>
           </p:cNvPr>
@@ -9666,407 +9889,81 @@
             <p:ph idx="1"/>
           </p:nvPr>
         </p:nvSpPr>
-        <p:spPr/>
+        <p:spPr>
+          <a:xfrm>
+            <a:off x="2029097" y="1750423"/>
+            <a:ext cx="8541042" cy="4299521"/>
+          </a:xfrm>
+        </p:spPr>
         <p:txBody>
-          <a:bodyPr/>
+          <a:bodyPr>
+            <a:normAutofit lnSpcReduction="10000"/>
+          </a:bodyPr>
           <a:lstStyle/>
           <a:p>
-            <a:pPr rtl="0">
-              <a:spcBef>
-                <a:spcPts val="0"/>
-              </a:spcBef>
-              <a:spcAft>
-                <a:spcPts val="0"/>
-              </a:spcAft>
-            </a:pPr>
-            <a:r>
-              <a:rPr lang="en-US" sz="1800" b="0" i="0" u="none" strike="noStrike" dirty="0" err="1">
-                <a:effectLst/>
-                <a:latin typeface="Arial" panose="020B0604020202020204" pitchFamily="34" charset="0"/>
-              </a:rPr>
-              <a:t>Exercício</a:t>
-            </a:r>
-            <a:r>
-              <a:rPr lang="en-US" sz="1800" b="0" i="0" u="none" strike="noStrike" dirty="0">
-                <a:effectLst/>
-                <a:latin typeface="Arial" panose="020B0604020202020204" pitchFamily="34" charset="0"/>
-              </a:rPr>
-              <a:t> 1 - </a:t>
-            </a:r>
-            <a:r>
-              <a:rPr lang="en-US" sz="1800" b="0" i="0" u="none" strike="noStrike" dirty="0" err="1">
-                <a:effectLst/>
-                <a:latin typeface="Arial" panose="020B0604020202020204" pitchFamily="34" charset="0"/>
-              </a:rPr>
-              <a:t>Construir</a:t>
-            </a:r>
-            <a:r>
-              <a:rPr lang="en-US" sz="1800" b="0" i="0" u="none" strike="noStrike" dirty="0">
-                <a:effectLst/>
-                <a:latin typeface="Arial" panose="020B0604020202020204" pitchFamily="34" charset="0"/>
-              </a:rPr>
-              <a:t> um </a:t>
-            </a:r>
-            <a:r>
-              <a:rPr lang="en-US" sz="1800" b="0" i="0" u="none" strike="noStrike" dirty="0" err="1">
-                <a:effectLst/>
-                <a:latin typeface="Arial" panose="020B0604020202020204" pitchFamily="34" charset="0"/>
-              </a:rPr>
-              <a:t>relógio</a:t>
-            </a:r>
-            <a:r>
-              <a:rPr lang="en-US" sz="1800" b="0" i="0" u="none" strike="noStrike" dirty="0">
-                <a:effectLst/>
-                <a:latin typeface="Arial" panose="020B0604020202020204" pitchFamily="34" charset="0"/>
-              </a:rPr>
-              <a:t> que </a:t>
-            </a:r>
-            <a:r>
-              <a:rPr lang="en-US" sz="1800" b="0" i="0" u="none" strike="noStrike" dirty="0" err="1">
-                <a:effectLst/>
-                <a:latin typeface="Arial" panose="020B0604020202020204" pitchFamily="34" charset="0"/>
-              </a:rPr>
-              <a:t>imprime</a:t>
-            </a:r>
-            <a:r>
-              <a:rPr lang="en-US" sz="1800" b="0" i="0" u="none" strike="noStrike" dirty="0">
-                <a:effectLst/>
-                <a:latin typeface="Arial" panose="020B0604020202020204" pitchFamily="34" charset="0"/>
-              </a:rPr>
-              <a:t> human readable.</a:t>
-            </a:r>
-            <a:endParaRPr lang="en-US" sz="1600" b="0" dirty="0">
-              <a:effectLst/>
-            </a:endParaRPr>
-          </a:p>
-          <a:p>
-            <a:pPr rtl="0">
-              <a:spcBef>
-                <a:spcPts val="0"/>
-              </a:spcBef>
-              <a:spcAft>
-                <a:spcPts val="0"/>
-              </a:spcAft>
-            </a:pPr>
-            <a:r>
-              <a:rPr lang="en-US" sz="1800" b="0" i="0" u="none" strike="noStrike" dirty="0" err="1">
-                <a:effectLst/>
-                <a:latin typeface="Arial" panose="020B0604020202020204" pitchFamily="34" charset="0"/>
-              </a:rPr>
-              <a:t>Exercício</a:t>
-            </a:r>
-            <a:r>
-              <a:rPr lang="en-US" sz="1800" b="0" i="0" u="none" strike="noStrike" dirty="0">
-                <a:effectLst/>
-                <a:latin typeface="Arial" panose="020B0604020202020204" pitchFamily="34" charset="0"/>
-              </a:rPr>
-              <a:t> 2 - </a:t>
-            </a:r>
-            <a:r>
-              <a:rPr lang="en-US" sz="1800" b="0" i="0" u="none" strike="noStrike" dirty="0" err="1">
-                <a:effectLst/>
-                <a:latin typeface="Arial" panose="020B0604020202020204" pitchFamily="34" charset="0"/>
-              </a:rPr>
-              <a:t>Construir</a:t>
-            </a:r>
-            <a:r>
-              <a:rPr lang="en-US" sz="1800" b="0" i="0" u="none" strike="noStrike" dirty="0">
-                <a:effectLst/>
-                <a:latin typeface="Arial" panose="020B0604020202020204" pitchFamily="34" charset="0"/>
-              </a:rPr>
-              <a:t> um </a:t>
-            </a:r>
-            <a:r>
-              <a:rPr lang="en-US" sz="1800" b="0" i="0" u="none" strike="noStrike" dirty="0" err="1">
-                <a:effectLst/>
-                <a:latin typeface="Arial" panose="020B0604020202020204" pitchFamily="34" charset="0"/>
-              </a:rPr>
-              <a:t>relógio</a:t>
-            </a:r>
-            <a:r>
-              <a:rPr lang="en-US" sz="1800" b="0" i="0" u="none" strike="noStrike" dirty="0">
-                <a:effectLst/>
-                <a:latin typeface="Arial" panose="020B0604020202020204" pitchFamily="34" charset="0"/>
-              </a:rPr>
-              <a:t> que </a:t>
-            </a:r>
-            <a:r>
-              <a:rPr lang="en-US" sz="1800" b="0" i="0" u="none" strike="noStrike" dirty="0" err="1">
-                <a:effectLst/>
-                <a:latin typeface="Arial" panose="020B0604020202020204" pitchFamily="34" charset="0"/>
-              </a:rPr>
-              <a:t>permite</a:t>
-            </a:r>
-            <a:r>
-              <a:rPr lang="en-US" sz="1800" b="0" i="0" u="none" strike="noStrike" dirty="0">
-                <a:effectLst/>
-                <a:latin typeface="Arial" panose="020B0604020202020204" pitchFamily="34" charset="0"/>
-              </a:rPr>
-              <a:t> tic </a:t>
-            </a:r>
-            <a:r>
-              <a:rPr lang="en-US" sz="1800" b="0" i="0" u="none" strike="noStrike" dirty="0" err="1">
-                <a:effectLst/>
-                <a:latin typeface="Arial" panose="020B0604020202020204" pitchFamily="34" charset="0"/>
-              </a:rPr>
-              <a:t>em</a:t>
-            </a:r>
-            <a:r>
-              <a:rPr lang="en-US" sz="1800" b="0" i="0" u="none" strike="noStrike" dirty="0">
-                <a:effectLst/>
-                <a:latin typeface="Arial" panose="020B0604020202020204" pitchFamily="34" charset="0"/>
-              </a:rPr>
-              <a:t> </a:t>
-            </a:r>
-            <a:r>
-              <a:rPr lang="en-US" sz="1800" b="0" i="0" u="none" strike="noStrike" dirty="0" err="1">
-                <a:effectLst/>
-                <a:latin typeface="Arial" panose="020B0604020202020204" pitchFamily="34" charset="0"/>
-              </a:rPr>
-              <a:t>segundos</a:t>
-            </a:r>
-            <a:r>
-              <a:rPr lang="en-US" sz="1800" b="0" i="0" u="none" strike="noStrike" dirty="0">
-                <a:effectLst/>
-                <a:latin typeface="Arial" panose="020B0604020202020204" pitchFamily="34" charset="0"/>
-              </a:rPr>
-              <a:t> </a:t>
-            </a:r>
-            <a:r>
-              <a:rPr lang="en-US" sz="1800" b="0" i="0" u="none" strike="noStrike" dirty="0" err="1">
-                <a:effectLst/>
-                <a:latin typeface="Arial" panose="020B0604020202020204" pitchFamily="34" charset="0"/>
-              </a:rPr>
-              <a:t>ou</a:t>
-            </a:r>
-            <a:r>
-              <a:rPr lang="en-US" sz="1800" b="0" i="0" u="none" strike="noStrike" dirty="0">
-                <a:effectLst/>
-                <a:latin typeface="Arial" panose="020B0604020202020204" pitchFamily="34" charset="0"/>
-              </a:rPr>
-              <a:t> </a:t>
-            </a:r>
-            <a:r>
-              <a:rPr lang="en-US" sz="1800" b="0" i="0" u="none" strike="noStrike" dirty="0" err="1">
-                <a:effectLst/>
-                <a:latin typeface="Arial" panose="020B0604020202020204" pitchFamily="34" charset="0"/>
-              </a:rPr>
-              <a:t>milissegundos</a:t>
-            </a:r>
-            <a:r>
-              <a:rPr lang="en-US" sz="1800" b="0" i="0" u="none" strike="noStrike" dirty="0">
-                <a:effectLst/>
-                <a:latin typeface="Arial" panose="020B0604020202020204" pitchFamily="34" charset="0"/>
-              </a:rPr>
-              <a:t>."</a:t>
-            </a:r>
-            <a:endParaRPr lang="en-US" sz="1600" b="0" dirty="0">
-              <a:effectLst/>
-            </a:endParaRPr>
-          </a:p>
-          <a:p>
-            <a:pPr rtl="0">
-              <a:spcBef>
-                <a:spcPts val="0"/>
-              </a:spcBef>
-              <a:spcAft>
-                <a:spcPts val="0"/>
-              </a:spcAft>
-            </a:pPr>
-            <a:r>
-              <a:rPr lang="en-US" sz="1800" b="0" i="0" u="none" strike="noStrike" dirty="0" err="1">
-                <a:effectLst/>
-                <a:latin typeface="Arial" panose="020B0604020202020204" pitchFamily="34" charset="0"/>
-              </a:rPr>
-              <a:t>Exercício</a:t>
-            </a:r>
-            <a:r>
-              <a:rPr lang="en-US" sz="1800" b="0" i="0" u="none" strike="noStrike" dirty="0">
-                <a:effectLst/>
-                <a:latin typeface="Arial" panose="020B0604020202020204" pitchFamily="34" charset="0"/>
-              </a:rPr>
-              <a:t> 3 - </a:t>
-            </a:r>
-            <a:r>
-              <a:rPr lang="en-US" sz="1800" b="0" i="0" u="none" strike="noStrike" dirty="0" err="1">
-                <a:effectLst/>
-                <a:latin typeface="Arial" panose="020B0604020202020204" pitchFamily="34" charset="0"/>
-              </a:rPr>
-              <a:t>Construir</a:t>
-            </a:r>
-            <a:r>
-              <a:rPr lang="en-US" sz="1800" b="0" i="0" u="none" strike="noStrike" dirty="0">
-                <a:effectLst/>
-                <a:latin typeface="Arial" panose="020B0604020202020204" pitchFamily="34" charset="0"/>
-              </a:rPr>
-              <a:t> um </a:t>
-            </a:r>
-            <a:r>
-              <a:rPr lang="en-US" sz="1800" b="0" i="0" u="none" strike="noStrike" dirty="0" err="1">
-                <a:effectLst/>
-                <a:latin typeface="Arial" panose="020B0604020202020204" pitchFamily="34" charset="0"/>
-              </a:rPr>
-              <a:t>relógio</a:t>
-            </a:r>
-            <a:r>
-              <a:rPr lang="en-US" sz="1800" b="0" i="0" u="none" strike="noStrike" dirty="0">
-                <a:effectLst/>
-                <a:latin typeface="Arial" panose="020B0604020202020204" pitchFamily="34" charset="0"/>
-              </a:rPr>
-              <a:t> que </a:t>
-            </a:r>
-            <a:r>
-              <a:rPr lang="en-US" sz="1800" b="0" i="0" u="none" strike="noStrike" dirty="0" err="1">
-                <a:effectLst/>
-                <a:latin typeface="Arial" panose="020B0604020202020204" pitchFamily="34" charset="0"/>
-              </a:rPr>
-              <a:t>permite</a:t>
-            </a:r>
-            <a:r>
-              <a:rPr lang="en-US" sz="1800" b="0" i="0" u="none" strike="noStrike" dirty="0">
-                <a:effectLst/>
-                <a:latin typeface="Arial" panose="020B0604020202020204" pitchFamily="34" charset="0"/>
-              </a:rPr>
-              <a:t> tic’s </a:t>
-            </a:r>
-            <a:r>
-              <a:rPr lang="en-US" sz="1800" b="0" i="0" u="none" strike="noStrike" dirty="0" err="1">
-                <a:effectLst/>
-                <a:latin typeface="Arial" panose="020B0604020202020204" pitchFamily="34" charset="0"/>
-              </a:rPr>
-              <a:t>configuráveis</a:t>
-            </a:r>
-            <a:r>
-              <a:rPr lang="en-US" sz="1800" b="0" i="0" u="none" strike="noStrike" dirty="0">
-                <a:effectLst/>
-                <a:latin typeface="Arial" panose="020B0604020202020204" pitchFamily="34" charset="0"/>
-              </a:rPr>
-              <a:t>.</a:t>
-            </a:r>
-            <a:endParaRPr lang="en-US" sz="1600" b="0" dirty="0">
-              <a:effectLst/>
-            </a:endParaRPr>
-          </a:p>
-          <a:p>
-            <a:pPr rtl="0">
-              <a:spcBef>
-                <a:spcPts val="0"/>
-              </a:spcBef>
-              <a:spcAft>
-                <a:spcPts val="0"/>
-              </a:spcAft>
-            </a:pPr>
-            <a:r>
-              <a:rPr lang="en-US" sz="1800" b="0" i="0" u="none" strike="noStrike" dirty="0" err="1">
-                <a:effectLst/>
-                <a:latin typeface="Arial" panose="020B0604020202020204" pitchFamily="34" charset="0"/>
-              </a:rPr>
-              <a:t>Exercício</a:t>
-            </a:r>
-            <a:r>
-              <a:rPr lang="en-US" sz="1800" b="0" i="0" u="none" strike="noStrike" dirty="0">
-                <a:effectLst/>
-                <a:latin typeface="Arial" panose="020B0604020202020204" pitchFamily="34" charset="0"/>
-              </a:rPr>
-              <a:t> 4 - </a:t>
-            </a:r>
-            <a:r>
-              <a:rPr lang="en-US" sz="1800" b="0" i="0" u="none" strike="noStrike" dirty="0" err="1">
-                <a:effectLst/>
-                <a:latin typeface="Arial" panose="020B0604020202020204" pitchFamily="34" charset="0"/>
-              </a:rPr>
-              <a:t>Construir</a:t>
-            </a:r>
-            <a:r>
-              <a:rPr lang="en-US" sz="1800" b="0" i="0" u="none" strike="noStrike" dirty="0">
-                <a:effectLst/>
-                <a:latin typeface="Arial" panose="020B0604020202020204" pitchFamily="34" charset="0"/>
-              </a:rPr>
-              <a:t> </a:t>
-            </a:r>
-            <a:r>
-              <a:rPr lang="en-US" sz="1800" b="0" i="0" u="none" strike="noStrike" dirty="0" err="1">
-                <a:effectLst/>
-                <a:latin typeface="Arial" panose="020B0604020202020204" pitchFamily="34" charset="0"/>
-              </a:rPr>
-              <a:t>uma</a:t>
-            </a:r>
-            <a:r>
-              <a:rPr lang="en-US" sz="1800" b="0" i="0" u="none" strike="noStrike" dirty="0">
-                <a:effectLst/>
-                <a:latin typeface="Arial" panose="020B0604020202020204" pitchFamily="34" charset="0"/>
-              </a:rPr>
-              <a:t> </a:t>
-            </a:r>
-            <a:r>
-              <a:rPr lang="en-US" sz="1800" b="0" i="0" u="none" strike="noStrike" dirty="0" err="1">
-                <a:effectLst/>
-                <a:latin typeface="Arial" panose="020B0604020202020204" pitchFamily="34" charset="0"/>
-              </a:rPr>
-              <a:t>árvore</a:t>
-            </a:r>
-            <a:r>
-              <a:rPr lang="en-US" sz="1800" b="0" i="0" u="none" strike="noStrike" dirty="0">
-                <a:effectLst/>
-                <a:latin typeface="Arial" panose="020B0604020202020204" pitchFamily="34" charset="0"/>
-              </a:rPr>
-              <a:t> </a:t>
-            </a:r>
-            <a:r>
-              <a:rPr lang="en-US" sz="1800" b="0" i="0" u="none" strike="noStrike" dirty="0" err="1">
-                <a:effectLst/>
-                <a:latin typeface="Arial" panose="020B0604020202020204" pitchFamily="34" charset="0"/>
-              </a:rPr>
-              <a:t>onde</a:t>
-            </a:r>
-            <a:r>
-              <a:rPr lang="en-US" sz="1800" b="0" i="0" u="none" strike="noStrike" dirty="0">
-                <a:effectLst/>
-                <a:latin typeface="Arial" panose="020B0604020202020204" pitchFamily="34" charset="0"/>
-              </a:rPr>
-              <a:t> as </a:t>
-            </a:r>
-            <a:r>
-              <a:rPr lang="en-US" sz="1800" b="0" i="0" u="none" strike="noStrike" dirty="0" err="1">
-                <a:effectLst/>
-                <a:latin typeface="Arial" panose="020B0604020202020204" pitchFamily="34" charset="0"/>
-              </a:rPr>
-              <a:t>folhas</a:t>
-            </a:r>
-            <a:r>
-              <a:rPr lang="en-US" sz="1800" b="0" i="0" u="none" strike="noStrike" dirty="0">
-                <a:effectLst/>
-                <a:latin typeface="Arial" panose="020B0604020202020204" pitchFamily="34" charset="0"/>
-              </a:rPr>
-              <a:t> </a:t>
-            </a:r>
-            <a:r>
-              <a:rPr lang="en-US" sz="1800" b="0" i="0" u="none" strike="noStrike" dirty="0" err="1">
-                <a:effectLst/>
-                <a:latin typeface="Arial" panose="020B0604020202020204" pitchFamily="34" charset="0"/>
-              </a:rPr>
-              <a:t>sejam</a:t>
-            </a:r>
-            <a:r>
-              <a:rPr lang="en-US" sz="1800" b="0" i="0" u="none" strike="noStrike" dirty="0">
-                <a:effectLst/>
-                <a:latin typeface="Arial" panose="020B0604020202020204" pitchFamily="34" charset="0"/>
-              </a:rPr>
-              <a:t> </a:t>
-            </a:r>
-            <a:r>
-              <a:rPr lang="en-US" sz="1800" b="0" i="0" u="none" strike="noStrike" dirty="0" err="1">
-                <a:effectLst/>
-                <a:latin typeface="Arial" panose="020B0604020202020204" pitchFamily="34" charset="0"/>
-              </a:rPr>
-              <a:t>únicas</a:t>
-            </a:r>
-            <a:r>
-              <a:rPr lang="en-US" sz="1800" b="0" i="0" u="none" strike="noStrike" dirty="0">
-                <a:effectLst/>
-                <a:latin typeface="Arial" panose="020B0604020202020204" pitchFamily="34" charset="0"/>
-              </a:rPr>
-              <a:t>.</a:t>
+            <a:r>
+              <a:rPr lang="en-US" dirty="0">
+                <a:hlinkClick r:id="rId2"/>
+              </a:rPr>
+              <a:t>https://en.wikipedia.org/wiki/Persistent_data_structure</a:t>
+            </a:r>
+          </a:p>
+          <a:p>
+            <a:r>
+              <a:rPr lang="en-US" dirty="0">
+                <a:hlinkClick r:id="rId2"/>
+              </a:rPr>
+              <a:t>https://augustl.com/blog/2019/you_have_to_know_about_persistent_data_structures/</a:t>
+            </a:r>
+            <a:endParaRPr lang="en-US" dirty="0"/>
+          </a:p>
+          <a:p>
+            <a:r>
+              <a:rPr lang="en-US" dirty="0">
+                <a:hlinkClick r:id="rId3"/>
+              </a:rPr>
+              <a:t>https://clojure.org/reference/data_structures</a:t>
+            </a:r>
+            <a:endParaRPr lang="en-US" dirty="0"/>
+          </a:p>
+          <a:p>
+            <a:r>
+              <a:rPr lang="en-US" dirty="0">
+                <a:hlinkClick r:id="rId4"/>
+              </a:rPr>
+              <a:t>https://orgpad.com/o/BSZ05PGN1PMbIjmwIT3Vhs?s=clojure-tutorial&amp;token=CJlRL7peFImINGAtZ9WscU</a:t>
+            </a:r>
+            <a:endParaRPr lang="en-US" dirty="0"/>
+          </a:p>
+          <a:p>
+            <a:r>
+              <a:rPr lang="en-US" dirty="0">
+                <a:hlinkClick r:id="rId5"/>
+              </a:rPr>
+              <a:t>https://www.juxt.pro/blog/clojure-ds/</a:t>
+            </a:r>
+            <a:endParaRPr lang="en-US" dirty="0"/>
+          </a:p>
+          <a:p>
+            <a:r>
+              <a:rPr lang="en-US" dirty="0"/>
+              <a:t>https://</a:t>
+            </a:r>
+            <a:r>
+              <a:rPr lang="en-US" dirty="0" err="1"/>
+              <a:t>augustl.com</a:t>
+            </a:r>
+            <a:r>
+              <a:rPr lang="en-US" dirty="0"/>
+              <a:t>/blog/2019/</a:t>
+            </a:r>
+            <a:r>
+              <a:rPr lang="en-US" dirty="0" err="1"/>
+              <a:t>you_have_to_know_about_persistent_data_structures</a:t>
+            </a:r>
+            <a:r>
+              <a:rPr lang="en-US" dirty="0"/>
+              <a:t>/</a:t>
             </a:r>
             <a:endParaRPr lang="en-BR" dirty="0"/>
           </a:p>
@@ -10075,7 +9972,7 @@
     </p:spTree>
     <p:extLst>
       <p:ext uri="{BB962C8B-B14F-4D97-AF65-F5344CB8AC3E}">
-        <p14:creationId xmlns:p14="http://schemas.microsoft.com/office/powerpoint/2010/main" val="3051377618"/>
+        <p14:creationId xmlns:p14="http://schemas.microsoft.com/office/powerpoint/2010/main" val="3446563712"/>
       </p:ext>
     </p:extLst>
   </p:cSld>
@@ -10107,7 +10004,7 @@
           <p:cNvPr id="2" name="Title 1">
             <a:extLst>
               <a:ext uri="{FF2B5EF4-FFF2-40B4-BE49-F238E27FC236}">
-                <a16:creationId xmlns:a16="http://schemas.microsoft.com/office/drawing/2014/main" id="{225CE189-9175-BCD9-C159-B670AA4BCABB}"/>
+                <a16:creationId xmlns:a16="http://schemas.microsoft.com/office/drawing/2014/main" id="{B369B5F4-268B-1396-E173-DF820CB2FA28}"/>
               </a:ext>
             </a:extLst>
           </p:cNvPr>
@@ -10125,17 +10022,17 @@
           <a:p>
             <a:r>
               <a:rPr lang="en-BR" dirty="0"/>
-              <a:t>Pré-projeto</a:t>
+              <a:t>Exercicios</a:t>
             </a:r>
           </a:p>
         </p:txBody>
       </p:sp>
       <p:sp>
         <p:nvSpPr>
-          <p:cNvPr id="3" name="Content Placeholder 2">
+          <p:cNvPr id="4" name="Content Placeholder 3">
             <a:extLst>
               <a:ext uri="{FF2B5EF4-FFF2-40B4-BE49-F238E27FC236}">
-                <a16:creationId xmlns:a16="http://schemas.microsoft.com/office/drawing/2014/main" id="{1851244D-1CBF-9681-5763-9ABF57AF9637}"/>
+                <a16:creationId xmlns:a16="http://schemas.microsoft.com/office/drawing/2014/main" id="{E6EF5C85-9C2C-F4A4-3838-53A1003CF817}"/>
               </a:ext>
             </a:extLst>
           </p:cNvPr>
@@ -10146,22 +10043,296 @@
             <p:ph idx="1"/>
           </p:nvPr>
         </p:nvSpPr>
-        <p:spPr/>
+        <p:spPr>
+          <a:xfrm>
+            <a:off x="1358537" y="2052116"/>
+            <a:ext cx="9211602" cy="3997828"/>
+          </a:xfrm>
+        </p:spPr>
         <p:txBody>
           <a:bodyPr/>
           <a:lstStyle/>
           <a:p>
-            <a:r>
-              <a:rPr lang="en-BR" dirty="0"/>
-              <a:t>Sistema de registro de aulas Real Time</a:t>
-            </a:r>
+            <a:pPr rtl="0">
+              <a:spcBef>
+                <a:spcPts val="0"/>
+              </a:spcBef>
+              <a:spcAft>
+                <a:spcPts val="0"/>
+              </a:spcAft>
+            </a:pPr>
+            <a:r>
+              <a:rPr lang="en-US" sz="1800" b="0" i="0" u="none" strike="noStrike" dirty="0" err="1">
+                <a:effectLst/>
+                <a:latin typeface="Arial" panose="020B0604020202020204" pitchFamily="34" charset="0"/>
+              </a:rPr>
+              <a:t>Exercício</a:t>
+            </a:r>
+            <a:r>
+              <a:rPr lang="en-US" sz="1800" b="0" i="0" u="none" strike="noStrike" dirty="0">
+                <a:effectLst/>
+                <a:latin typeface="Arial" panose="020B0604020202020204" pitchFamily="34" charset="0"/>
+              </a:rPr>
+              <a:t> 1 - </a:t>
+            </a:r>
+            <a:r>
+              <a:rPr lang="en-US" sz="1800" b="0" i="0" u="none" strike="noStrike" dirty="0" err="1">
+                <a:effectLst/>
+                <a:latin typeface="Arial" panose="020B0604020202020204" pitchFamily="34" charset="0"/>
+              </a:rPr>
+              <a:t>Construir</a:t>
+            </a:r>
+            <a:r>
+              <a:rPr lang="en-US" sz="1800" b="0" i="0" u="none" strike="noStrike" dirty="0">
+                <a:effectLst/>
+                <a:latin typeface="Arial" panose="020B0604020202020204" pitchFamily="34" charset="0"/>
+              </a:rPr>
+              <a:t> um </a:t>
+            </a:r>
+            <a:r>
+              <a:rPr lang="en-US" sz="1800" b="0" i="0" u="none" strike="noStrike" dirty="0" err="1">
+                <a:effectLst/>
+                <a:latin typeface="Arial" panose="020B0604020202020204" pitchFamily="34" charset="0"/>
+              </a:rPr>
+              <a:t>relógio</a:t>
+            </a:r>
+            <a:r>
+              <a:rPr lang="en-US" sz="1800" b="0" i="0" u="none" strike="noStrike" dirty="0">
+                <a:effectLst/>
+                <a:latin typeface="Arial" panose="020B0604020202020204" pitchFamily="34" charset="0"/>
+              </a:rPr>
+              <a:t> que </a:t>
+            </a:r>
+            <a:r>
+              <a:rPr lang="en-US" sz="1800" b="0" i="0" u="none" strike="noStrike" dirty="0" err="1">
+                <a:effectLst/>
+                <a:latin typeface="Arial" panose="020B0604020202020204" pitchFamily="34" charset="0"/>
+              </a:rPr>
+              <a:t>imprime</a:t>
+            </a:r>
+            <a:r>
+              <a:rPr lang="en-US" sz="1800" b="0" i="0" u="none" strike="noStrike" dirty="0">
+                <a:effectLst/>
+                <a:latin typeface="Arial" panose="020B0604020202020204" pitchFamily="34" charset="0"/>
+              </a:rPr>
+              <a:t> human readable.</a:t>
+            </a:r>
+            <a:endParaRPr lang="en-US" sz="1600" b="0" dirty="0">
+              <a:effectLst/>
+            </a:endParaRPr>
+          </a:p>
+          <a:p>
+            <a:pPr rtl="0">
+              <a:spcBef>
+                <a:spcPts val="0"/>
+              </a:spcBef>
+              <a:spcAft>
+                <a:spcPts val="0"/>
+              </a:spcAft>
+            </a:pPr>
+            <a:r>
+              <a:rPr lang="en-US" sz="1800" b="0" i="0" u="none" strike="noStrike" dirty="0" err="1">
+                <a:effectLst/>
+                <a:latin typeface="Arial" panose="020B0604020202020204" pitchFamily="34" charset="0"/>
+              </a:rPr>
+              <a:t>Exercício</a:t>
+            </a:r>
+            <a:r>
+              <a:rPr lang="en-US" sz="1800" b="0" i="0" u="none" strike="noStrike" dirty="0">
+                <a:effectLst/>
+                <a:latin typeface="Arial" panose="020B0604020202020204" pitchFamily="34" charset="0"/>
+              </a:rPr>
+              <a:t> 2 - </a:t>
+            </a:r>
+            <a:r>
+              <a:rPr lang="en-US" sz="1800" b="0" i="0" u="none" strike="noStrike" dirty="0" err="1">
+                <a:effectLst/>
+                <a:latin typeface="Arial" panose="020B0604020202020204" pitchFamily="34" charset="0"/>
+              </a:rPr>
+              <a:t>Construir</a:t>
+            </a:r>
+            <a:r>
+              <a:rPr lang="en-US" sz="1800" b="0" i="0" u="none" strike="noStrike" dirty="0">
+                <a:effectLst/>
+                <a:latin typeface="Arial" panose="020B0604020202020204" pitchFamily="34" charset="0"/>
+              </a:rPr>
+              <a:t> um </a:t>
+            </a:r>
+            <a:r>
+              <a:rPr lang="en-US" sz="1800" b="0" i="0" u="none" strike="noStrike" dirty="0" err="1">
+                <a:effectLst/>
+                <a:latin typeface="Arial" panose="020B0604020202020204" pitchFamily="34" charset="0"/>
+              </a:rPr>
+              <a:t>relógio</a:t>
+            </a:r>
+            <a:r>
+              <a:rPr lang="en-US" sz="1800" b="0" i="0" u="none" strike="noStrike" dirty="0">
+                <a:effectLst/>
+                <a:latin typeface="Arial" panose="020B0604020202020204" pitchFamily="34" charset="0"/>
+              </a:rPr>
+              <a:t> que </a:t>
+            </a:r>
+            <a:r>
+              <a:rPr lang="en-US" sz="1800" b="0" i="0" u="none" strike="noStrike" dirty="0" err="1">
+                <a:effectLst/>
+                <a:latin typeface="Arial" panose="020B0604020202020204" pitchFamily="34" charset="0"/>
+              </a:rPr>
+              <a:t>permite</a:t>
+            </a:r>
+            <a:r>
+              <a:rPr lang="en-US" sz="1800" b="0" i="0" u="none" strike="noStrike" dirty="0">
+                <a:effectLst/>
+                <a:latin typeface="Arial" panose="020B0604020202020204" pitchFamily="34" charset="0"/>
+              </a:rPr>
+              <a:t> tic </a:t>
+            </a:r>
+            <a:r>
+              <a:rPr lang="en-US" sz="1800" b="0" i="0" u="none" strike="noStrike" dirty="0" err="1">
+                <a:effectLst/>
+                <a:latin typeface="Arial" panose="020B0604020202020204" pitchFamily="34" charset="0"/>
+              </a:rPr>
+              <a:t>em</a:t>
+            </a:r>
+            <a:r>
+              <a:rPr lang="en-US" sz="1800" b="0" i="0" u="none" strike="noStrike" dirty="0">
+                <a:effectLst/>
+                <a:latin typeface="Arial" panose="020B0604020202020204" pitchFamily="34" charset="0"/>
+              </a:rPr>
+              <a:t> </a:t>
+            </a:r>
+            <a:r>
+              <a:rPr lang="en-US" sz="1800" b="0" i="0" u="none" strike="noStrike" dirty="0" err="1">
+                <a:effectLst/>
+                <a:latin typeface="Arial" panose="020B0604020202020204" pitchFamily="34" charset="0"/>
+              </a:rPr>
+              <a:t>segundos</a:t>
+            </a:r>
+            <a:r>
+              <a:rPr lang="en-US" sz="1800" b="0" i="0" u="none" strike="noStrike" dirty="0">
+                <a:effectLst/>
+                <a:latin typeface="Arial" panose="020B0604020202020204" pitchFamily="34" charset="0"/>
+              </a:rPr>
+              <a:t> </a:t>
+            </a:r>
+            <a:r>
+              <a:rPr lang="en-US" sz="1800" b="0" i="0" u="none" strike="noStrike" dirty="0" err="1">
+                <a:effectLst/>
+                <a:latin typeface="Arial" panose="020B0604020202020204" pitchFamily="34" charset="0"/>
+              </a:rPr>
+              <a:t>ou</a:t>
+            </a:r>
+            <a:r>
+              <a:rPr lang="en-US" sz="1800" b="0" i="0" u="none" strike="noStrike" dirty="0">
+                <a:effectLst/>
+                <a:latin typeface="Arial" panose="020B0604020202020204" pitchFamily="34" charset="0"/>
+              </a:rPr>
+              <a:t> </a:t>
+            </a:r>
+            <a:r>
+              <a:rPr lang="en-US" sz="1800" b="0" i="0" u="none" strike="noStrike" dirty="0" err="1">
+                <a:effectLst/>
+                <a:latin typeface="Arial" panose="020B0604020202020204" pitchFamily="34" charset="0"/>
+              </a:rPr>
+              <a:t>milissegundos</a:t>
+            </a:r>
+            <a:r>
+              <a:rPr lang="en-US" sz="1800" b="0" i="0" u="none" strike="noStrike" dirty="0">
+                <a:effectLst/>
+                <a:latin typeface="Arial" panose="020B0604020202020204" pitchFamily="34" charset="0"/>
+              </a:rPr>
+              <a:t>.</a:t>
+            </a:r>
+            <a:endParaRPr lang="en-US" sz="1600" b="0" dirty="0">
+              <a:effectLst/>
+            </a:endParaRPr>
+          </a:p>
+          <a:p>
+            <a:pPr rtl="0">
+              <a:spcBef>
+                <a:spcPts val="0"/>
+              </a:spcBef>
+              <a:spcAft>
+                <a:spcPts val="0"/>
+              </a:spcAft>
+            </a:pPr>
+            <a:r>
+              <a:rPr lang="en-US" sz="1800" b="0" i="0" u="none" strike="noStrike" dirty="0" err="1">
+                <a:effectLst/>
+                <a:latin typeface="Arial" panose="020B0604020202020204" pitchFamily="34" charset="0"/>
+              </a:rPr>
+              <a:t>Exercício</a:t>
+            </a:r>
+            <a:r>
+              <a:rPr lang="en-US" sz="1800" b="0" i="0" u="none" strike="noStrike" dirty="0">
+                <a:effectLst/>
+                <a:latin typeface="Arial" panose="020B0604020202020204" pitchFamily="34" charset="0"/>
+              </a:rPr>
+              <a:t> 3 - </a:t>
+            </a:r>
+            <a:r>
+              <a:rPr lang="en-US" sz="1800" b="0" i="0" u="none" strike="noStrike" dirty="0" err="1">
+                <a:effectLst/>
+                <a:latin typeface="Arial" panose="020B0604020202020204" pitchFamily="34" charset="0"/>
+              </a:rPr>
+              <a:t>Construir</a:t>
+            </a:r>
+            <a:r>
+              <a:rPr lang="en-US" sz="1800" b="0" i="0" u="none" strike="noStrike" dirty="0">
+                <a:effectLst/>
+                <a:latin typeface="Arial" panose="020B0604020202020204" pitchFamily="34" charset="0"/>
+              </a:rPr>
+              <a:t> um </a:t>
+            </a:r>
+            <a:r>
+              <a:rPr lang="en-US" sz="1800" b="0" i="0" u="none" strike="noStrike" dirty="0" err="1">
+                <a:effectLst/>
+                <a:latin typeface="Arial" panose="020B0604020202020204" pitchFamily="34" charset="0"/>
+              </a:rPr>
+              <a:t>relógio</a:t>
+            </a:r>
+            <a:r>
+              <a:rPr lang="en-US" sz="1800" b="0" i="0" u="none" strike="noStrike" dirty="0">
+                <a:effectLst/>
+                <a:latin typeface="Arial" panose="020B0604020202020204" pitchFamily="34" charset="0"/>
+              </a:rPr>
+              <a:t> que </a:t>
+            </a:r>
+            <a:r>
+              <a:rPr lang="en-US" sz="1800" b="0" i="0" u="none" strike="noStrike" dirty="0" err="1">
+                <a:effectLst/>
+                <a:latin typeface="Arial" panose="020B0604020202020204" pitchFamily="34" charset="0"/>
+              </a:rPr>
+              <a:t>permite</a:t>
+            </a:r>
+            <a:r>
+              <a:rPr lang="en-US" sz="1800" b="0" i="0" u="none" strike="noStrike" dirty="0">
+                <a:effectLst/>
+                <a:latin typeface="Arial" panose="020B0604020202020204" pitchFamily="34" charset="0"/>
+              </a:rPr>
+              <a:t> tic’s </a:t>
+            </a:r>
+            <a:r>
+              <a:rPr lang="en-US" sz="1800" b="0" i="0" u="none" strike="noStrike" dirty="0" err="1">
+                <a:effectLst/>
+                <a:latin typeface="Arial" panose="020B0604020202020204" pitchFamily="34" charset="0"/>
+              </a:rPr>
+              <a:t>configuráveis</a:t>
+            </a:r>
+            <a:r>
+              <a:rPr lang="en-US" sz="1800" b="0" i="0" u="none" strike="noStrike" dirty="0">
+                <a:effectLst/>
+                <a:latin typeface="Arial" panose="020B0604020202020204" pitchFamily="34" charset="0"/>
+              </a:rPr>
+              <a:t>.</a:t>
+            </a:r>
+            <a:endParaRPr lang="en-BR" dirty="0"/>
           </a:p>
         </p:txBody>
       </p:sp>
     </p:spTree>
     <p:extLst>
       <p:ext uri="{BB962C8B-B14F-4D97-AF65-F5344CB8AC3E}">
-        <p14:creationId xmlns:p14="http://schemas.microsoft.com/office/powerpoint/2010/main" val="1383586077"/>
+        <p14:creationId xmlns:p14="http://schemas.microsoft.com/office/powerpoint/2010/main" val="3051377618"/>
       </p:ext>
     </p:extLst>
   </p:cSld>
@@ -10307,6 +10478,338 @@
     <p:extLst>
       <p:ext uri="{BB962C8B-B14F-4D97-AF65-F5344CB8AC3E}">
         <p14:creationId xmlns:p14="http://schemas.microsoft.com/office/powerpoint/2010/main" val="70917960"/>
+      </p:ext>
+    </p:extLst>
+  </p:cSld>
+  <p:clrMapOvr>
+    <a:masterClrMapping/>
+  </p:clrMapOvr>
+</p:sld>
+</file>
+
+<file path=ppt/slides/slide20.xml><?xml version="1.0" encoding="utf-8"?>
+<p:sld xmlns:a="http://schemas.openxmlformats.org/drawingml/2006/main" xmlns:r="http://schemas.openxmlformats.org/officeDocument/2006/relationships" xmlns:p="http://schemas.openxmlformats.org/presentationml/2006/main">
+  <p:cSld>
+    <p:spTree>
+      <p:nvGrpSpPr>
+        <p:cNvPr id="1" name=""/>
+        <p:cNvGrpSpPr/>
+        <p:nvPr/>
+      </p:nvGrpSpPr>
+      <p:grpSpPr>
+        <a:xfrm>
+          <a:off x="0" y="0"/>
+          <a:ext cx="0" cy="0"/>
+          <a:chOff x="0" y="0"/>
+          <a:chExt cx="0" cy="0"/>
+        </a:xfrm>
+      </p:grpSpPr>
+      <p:sp>
+        <p:nvSpPr>
+          <p:cNvPr id="2" name="Title 1">
+            <a:extLst>
+              <a:ext uri="{FF2B5EF4-FFF2-40B4-BE49-F238E27FC236}">
+                <a16:creationId xmlns:a16="http://schemas.microsoft.com/office/drawing/2014/main" id="{225CE189-9175-BCD9-C159-B670AA4BCABB}"/>
+              </a:ext>
+            </a:extLst>
+          </p:cNvPr>
+          <p:cNvSpPr>
+            <a:spLocks noGrp="1"/>
+          </p:cNvSpPr>
+          <p:nvPr>
+            <p:ph type="title"/>
+          </p:nvPr>
+        </p:nvSpPr>
+        <p:spPr/>
+        <p:txBody>
+          <a:bodyPr/>
+          <a:lstStyle/>
+          <a:p>
+            <a:r>
+              <a:rPr lang="en-BR" dirty="0"/>
+              <a:t>Pré-projeto</a:t>
+            </a:r>
+          </a:p>
+        </p:txBody>
+      </p:sp>
+      <p:sp>
+        <p:nvSpPr>
+          <p:cNvPr id="3" name="Content Placeholder 2">
+            <a:extLst>
+              <a:ext uri="{FF2B5EF4-FFF2-40B4-BE49-F238E27FC236}">
+                <a16:creationId xmlns:a16="http://schemas.microsoft.com/office/drawing/2014/main" id="{1851244D-1CBF-9681-5763-9ABF57AF9637}"/>
+              </a:ext>
+            </a:extLst>
+          </p:cNvPr>
+          <p:cNvSpPr>
+            <a:spLocks noGrp="1"/>
+          </p:cNvSpPr>
+          <p:nvPr>
+            <p:ph idx="1"/>
+          </p:nvPr>
+        </p:nvSpPr>
+        <p:spPr/>
+        <p:txBody>
+          <a:bodyPr/>
+          <a:lstStyle/>
+          <a:p>
+            <a:r>
+              <a:rPr lang="en-BR" dirty="0"/>
+              <a:t>Sistema de registro de aulas Real Time</a:t>
+            </a:r>
+          </a:p>
+        </p:txBody>
+      </p:sp>
+    </p:spTree>
+    <p:extLst>
+      <p:ext uri="{BB962C8B-B14F-4D97-AF65-F5344CB8AC3E}">
+        <p14:creationId xmlns:p14="http://schemas.microsoft.com/office/powerpoint/2010/main" val="1383586077"/>
+      </p:ext>
+    </p:extLst>
+  </p:cSld>
+  <p:clrMapOvr>
+    <a:masterClrMapping/>
+  </p:clrMapOvr>
+</p:sld>
+</file>
+
+<file path=ppt/slides/slide21.xml><?xml version="1.0" encoding="utf-8"?>
+<p:sld xmlns:a="http://schemas.openxmlformats.org/drawingml/2006/main" xmlns:r="http://schemas.openxmlformats.org/officeDocument/2006/relationships" xmlns:p="http://schemas.openxmlformats.org/presentationml/2006/main">
+  <p:cSld>
+    <p:spTree>
+      <p:nvGrpSpPr>
+        <p:cNvPr id="1" name=""/>
+        <p:cNvGrpSpPr/>
+        <p:nvPr/>
+      </p:nvGrpSpPr>
+      <p:grpSpPr>
+        <a:xfrm>
+          <a:off x="0" y="0"/>
+          <a:ext cx="0" cy="0"/>
+          <a:chOff x="0" y="0"/>
+          <a:chExt cx="0" cy="0"/>
+        </a:xfrm>
+      </p:grpSpPr>
+      <p:sp>
+        <p:nvSpPr>
+          <p:cNvPr id="2" name="Title 1">
+            <a:extLst>
+              <a:ext uri="{FF2B5EF4-FFF2-40B4-BE49-F238E27FC236}">
+                <a16:creationId xmlns:a16="http://schemas.microsoft.com/office/drawing/2014/main" id="{DEC72F72-42F9-57D1-B117-E8EA3E4C6321}"/>
+              </a:ext>
+            </a:extLst>
+          </p:cNvPr>
+          <p:cNvSpPr>
+            <a:spLocks noGrp="1"/>
+          </p:cNvSpPr>
+          <p:nvPr>
+            <p:ph type="title"/>
+          </p:nvPr>
+        </p:nvSpPr>
+        <p:spPr>
+          <a:xfrm>
+            <a:off x="2611808" y="808056"/>
+            <a:ext cx="7958331" cy="1986419"/>
+          </a:xfrm>
+        </p:spPr>
+        <p:txBody>
+          <a:bodyPr>
+            <a:normAutofit/>
+          </a:bodyPr>
+          <a:lstStyle/>
+          <a:p>
+            <a:r>
+              <a:rPr lang="en-US" dirty="0" err="1"/>
+              <a:t>Técnicas</a:t>
+            </a:r>
+            <a:r>
+              <a:rPr lang="en-US" dirty="0"/>
+              <a:t> de </a:t>
+            </a:r>
+            <a:r>
+              <a:rPr lang="en-US" dirty="0" err="1"/>
+              <a:t>programação</a:t>
+            </a:r>
+            <a:r>
+              <a:rPr lang="en-US" dirty="0"/>
+              <a:t> </a:t>
+            </a:r>
+            <a:r>
+              <a:rPr lang="en-US" dirty="0" err="1"/>
+              <a:t>em</a:t>
+            </a:r>
+            <a:r>
+              <a:rPr lang="en-US" dirty="0"/>
+              <a:t> Clojure</a:t>
+            </a:r>
+            <a:br>
+              <a:rPr lang="en-BR" dirty="0"/>
+            </a:br>
+            <a:r>
+              <a:rPr lang="en-BR" dirty="0"/>
+              <a:t>Aula 4 – 01/06/2023</a:t>
+            </a:r>
+            <a:br>
+              <a:rPr lang="en-BR" dirty="0"/>
+            </a:br>
+            <a:r>
+              <a:rPr lang="en-BR" dirty="0"/>
+              <a:t>@victorinacio	</a:t>
+            </a:r>
+          </a:p>
+        </p:txBody>
+      </p:sp>
+      <p:sp>
+        <p:nvSpPr>
+          <p:cNvPr id="3" name="Content Placeholder 2">
+            <a:extLst>
+              <a:ext uri="{FF2B5EF4-FFF2-40B4-BE49-F238E27FC236}">
+                <a16:creationId xmlns:a16="http://schemas.microsoft.com/office/drawing/2014/main" id="{08A8D014-EF6D-8616-B6C2-D9EE7016BC53}"/>
+              </a:ext>
+            </a:extLst>
+          </p:cNvPr>
+          <p:cNvSpPr>
+            <a:spLocks noGrp="1"/>
+          </p:cNvSpPr>
+          <p:nvPr>
+            <p:ph idx="1"/>
+          </p:nvPr>
+        </p:nvSpPr>
+        <p:spPr/>
+        <p:txBody>
+          <a:bodyPr/>
+          <a:lstStyle/>
+          <a:p>
+            <a:endParaRPr lang="en-BR" dirty="0"/>
+          </a:p>
+          <a:p>
+            <a:r>
+              <a:rPr lang="en-BR" dirty="0"/>
+              <a:t>Schema</a:t>
+            </a:r>
+          </a:p>
+          <a:p>
+            <a:r>
+              <a:rPr lang="en-BR" dirty="0"/>
+              <a:t>Modelagem</a:t>
+            </a:r>
+          </a:p>
+          <a:p>
+            <a:r>
+              <a:rPr lang="en-BR" dirty="0"/>
+              <a:t>Validação Request / Response</a:t>
+            </a:r>
+          </a:p>
+          <a:p>
+            <a:pPr marL="0" indent="0">
+              <a:buNone/>
+            </a:pPr>
+            <a:endParaRPr lang="en-BR" dirty="0"/>
+          </a:p>
+        </p:txBody>
+      </p:sp>
+    </p:spTree>
+    <p:extLst>
+      <p:ext uri="{BB962C8B-B14F-4D97-AF65-F5344CB8AC3E}">
+        <p14:creationId xmlns:p14="http://schemas.microsoft.com/office/powerpoint/2010/main" val="1049572766"/>
+      </p:ext>
+    </p:extLst>
+  </p:cSld>
+  <p:clrMapOvr>
+    <a:masterClrMapping/>
+  </p:clrMapOvr>
+</p:sld>
+</file>
+
+<file path=ppt/slides/slide22.xml><?xml version="1.0" encoding="utf-8"?>
+<p:sld xmlns:a="http://schemas.openxmlformats.org/drawingml/2006/main" xmlns:r="http://schemas.openxmlformats.org/officeDocument/2006/relationships" xmlns:p="http://schemas.openxmlformats.org/presentationml/2006/main">
+  <p:cSld>
+    <p:spTree>
+      <p:nvGrpSpPr>
+        <p:cNvPr id="1" name=""/>
+        <p:cNvGrpSpPr/>
+        <p:nvPr/>
+      </p:nvGrpSpPr>
+      <p:grpSpPr>
+        <a:xfrm>
+          <a:off x="0" y="0"/>
+          <a:ext cx="0" cy="0"/>
+          <a:chOff x="0" y="0"/>
+          <a:chExt cx="0" cy="0"/>
+        </a:xfrm>
+      </p:grpSpPr>
+      <p:sp>
+        <p:nvSpPr>
+          <p:cNvPr id="2" name="Title 1">
+            <a:extLst>
+              <a:ext uri="{FF2B5EF4-FFF2-40B4-BE49-F238E27FC236}">
+                <a16:creationId xmlns:a16="http://schemas.microsoft.com/office/drawing/2014/main" id="{74343908-1824-703B-728F-487EB55E6F01}"/>
+              </a:ext>
+            </a:extLst>
+          </p:cNvPr>
+          <p:cNvSpPr>
+            <a:spLocks noGrp="1"/>
+          </p:cNvSpPr>
+          <p:nvPr>
+            <p:ph type="title"/>
+          </p:nvPr>
+        </p:nvSpPr>
+        <p:spPr/>
+        <p:txBody>
+          <a:bodyPr/>
+          <a:lstStyle/>
+          <a:p>
+            <a:r>
+              <a:rPr lang="en-BR" dirty="0"/>
+              <a:t>Exercicios	</a:t>
+            </a:r>
+          </a:p>
+        </p:txBody>
+      </p:sp>
+      <p:sp>
+        <p:nvSpPr>
+          <p:cNvPr id="3" name="Content Placeholder 2">
+            <a:extLst>
+              <a:ext uri="{FF2B5EF4-FFF2-40B4-BE49-F238E27FC236}">
+                <a16:creationId xmlns:a16="http://schemas.microsoft.com/office/drawing/2014/main" id="{0570522B-7EB5-0944-252A-19A011935F9E}"/>
+              </a:ext>
+            </a:extLst>
+          </p:cNvPr>
+          <p:cNvSpPr>
+            <a:spLocks noGrp="1"/>
+          </p:cNvSpPr>
+          <p:nvPr>
+            <p:ph idx="1"/>
+          </p:nvPr>
+        </p:nvSpPr>
+        <p:spPr/>
+        <p:txBody>
+          <a:bodyPr/>
+          <a:lstStyle/>
+          <a:p>
+            <a:r>
+              <a:rPr lang="en-BR" dirty="0"/>
+              <a:t>- Criar um schema para entidade turma</a:t>
+            </a:r>
+          </a:p>
+          <a:p>
+            <a:r>
+              <a:rPr lang="en-BR" dirty="0"/>
+              <a:t>- Criar um schema para entidade aluno</a:t>
+            </a:r>
+          </a:p>
+          <a:p>
+            <a:r>
+              <a:rPr lang="en-BR" dirty="0"/>
+              <a:t>- Criar um schema para FN registro-presenca</a:t>
+            </a:r>
+          </a:p>
+        </p:txBody>
+      </p:sp>
+    </p:spTree>
+    <p:extLst>
+      <p:ext uri="{BB962C8B-B14F-4D97-AF65-F5344CB8AC3E}">
+        <p14:creationId xmlns:p14="http://schemas.microsoft.com/office/powerpoint/2010/main" val="3237390634"/>
       </p:ext>
     </p:extLst>
   </p:cSld>

</xml_diff>

<commit_message>
aula 5 - Futures Promisses - inicio
</commit_message>
<xml_diff>
--- a/doc/NUBOOT-MOD3-PROG-TEC-CLJ.pptx
+++ b/doc/NUBOOT-MOD3-PROG-TEC-CLJ.pptx
@@ -5,7 +5,7 @@
     <p:sldMasterId id="2147483648" r:id="rId1"/>
   </p:sldMasterIdLst>
   <p:notesMasterIdLst>
-    <p:notesMasterId r:id="rId24"/>
+    <p:notesMasterId r:id="rId25"/>
   </p:notesMasterIdLst>
   <p:sldIdLst>
     <p:sldId id="256" r:id="rId2"/>
@@ -29,7 +29,8 @@
     <p:sldId id="268" r:id="rId20"/>
     <p:sldId id="269" r:id="rId21"/>
     <p:sldId id="277" r:id="rId22"/>
-    <p:sldId id="278" r:id="rId23"/>
+    <p:sldId id="279" r:id="rId23"/>
+    <p:sldId id="278" r:id="rId24"/>
   </p:sldIdLst>
   <p:sldSz cx="12192000" cy="6858000"/>
   <p:notesSz cx="6858000" cy="9144000"/>
@@ -162,6 +163,7 @@
             <p14:sldId id="268"/>
             <p14:sldId id="269"/>
             <p14:sldId id="277"/>
+            <p14:sldId id="279"/>
             <p14:sldId id="278"/>
           </p14:sldIdLst>
         </p14:section>
@@ -256,7 +258,7 @@
           <a:p>
             <a:fld id="{290A6CB2-1C58-D84E-B07B-B5770D071A49}" type="datetimeFigureOut">
               <a:rPr lang="en-BR" smtClean="0"/>
-              <a:t>01/06/23</a:t>
+              <a:t>05/06/23</a:t>
             </a:fld>
             <a:endParaRPr lang="en-BR"/>
           </a:p>
@@ -4362,6 +4364,90 @@
 </p:notes>
 </file>
 
+<file path=ppt/notesSlides/notesSlide5.xml><?xml version="1.0" encoding="utf-8"?>
+<p:notes xmlns:a="http://schemas.openxmlformats.org/drawingml/2006/main" xmlns:r="http://schemas.openxmlformats.org/officeDocument/2006/relationships" xmlns:p="http://schemas.openxmlformats.org/presentationml/2006/main">
+  <p:cSld>
+    <p:spTree>
+      <p:nvGrpSpPr>
+        <p:cNvPr id="1" name=""/>
+        <p:cNvGrpSpPr/>
+        <p:nvPr/>
+      </p:nvGrpSpPr>
+      <p:grpSpPr>
+        <a:xfrm>
+          <a:off x="0" y="0"/>
+          <a:ext cx="0" cy="0"/>
+          <a:chOff x="0" y="0"/>
+          <a:chExt cx="0" cy="0"/>
+        </a:xfrm>
+      </p:grpSpPr>
+      <p:sp>
+        <p:nvSpPr>
+          <p:cNvPr id="2" name="Slide Image Placeholder 1"/>
+          <p:cNvSpPr>
+            <a:spLocks noGrp="1" noRot="1" noChangeAspect="1"/>
+          </p:cNvSpPr>
+          <p:nvPr>
+            <p:ph type="sldImg"/>
+          </p:nvPr>
+        </p:nvSpPr>
+        <p:spPr/>
+      </p:sp>
+      <p:sp>
+        <p:nvSpPr>
+          <p:cNvPr id="3" name="Notes Placeholder 2"/>
+          <p:cNvSpPr>
+            <a:spLocks noGrp="1"/>
+          </p:cNvSpPr>
+          <p:nvPr>
+            <p:ph type="body" idx="1"/>
+          </p:nvPr>
+        </p:nvSpPr>
+        <p:spPr/>
+        <p:txBody>
+          <a:bodyPr/>
+          <a:lstStyle/>
+          <a:p>
+            <a:endParaRPr lang="en-BR"/>
+          </a:p>
+        </p:txBody>
+      </p:sp>
+      <p:sp>
+        <p:nvSpPr>
+          <p:cNvPr id="4" name="Slide Number Placeholder 3"/>
+          <p:cNvSpPr>
+            <a:spLocks noGrp="1"/>
+          </p:cNvSpPr>
+          <p:nvPr>
+            <p:ph type="sldNum" sz="quarter" idx="5"/>
+          </p:nvPr>
+        </p:nvSpPr>
+        <p:spPr/>
+        <p:txBody>
+          <a:bodyPr/>
+          <a:lstStyle/>
+          <a:p>
+            <a:fld id="{DC55D523-4C5D-3943-A284-67088B5655C5}" type="slidenum">
+              <a:rPr lang="en-BR" smtClean="0"/>
+              <a:t>22</a:t>
+            </a:fld>
+            <a:endParaRPr lang="en-BR"/>
+          </a:p>
+        </p:txBody>
+      </p:sp>
+    </p:spTree>
+    <p:extLst>
+      <p:ext uri="{BB962C8B-B14F-4D97-AF65-F5344CB8AC3E}">
+        <p14:creationId xmlns:p14="http://schemas.microsoft.com/office/powerpoint/2010/main" val="3257334185"/>
+      </p:ext>
+    </p:extLst>
+  </p:cSld>
+  <p:clrMapOvr>
+    <a:masterClrMapping/>
+  </p:clrMapOvr>
+</p:notes>
+</file>
+
 <file path=ppt/slideLayouts/slideLayout1.xml><?xml version="1.0" encoding="utf-8"?>
 <p:sldLayout xmlns:a="http://schemas.openxmlformats.org/drawingml/2006/main" xmlns:r="http://schemas.openxmlformats.org/officeDocument/2006/relationships" xmlns:p="http://schemas.openxmlformats.org/presentationml/2006/main" type="title" preserve="1">
   <p:cSld name="Title Slide">
@@ -4579,7 +4665,7 @@
           <a:p>
             <a:fld id="{9AB3A824-1A51-4B26-AD58-A6D8E14F6C04}" type="datetimeFigureOut">
               <a:rPr lang="en-US"/>
-              <a:t>6/1/23</a:t>
+              <a:t>6/5/23</a:t>
             </a:fld>
             <a:endParaRPr lang="en-US"/>
           </a:p>
@@ -4913,7 +4999,7 @@
           <a:p>
             <a:fld id="{D857E33E-8B18-4087-B112-809917729534}" type="datetimeFigureOut">
               <a:rPr lang="en-US"/>
-              <a:t>6/1/23</a:t>
+              <a:t>6/5/23</a:t>
             </a:fld>
             <a:endParaRPr lang="en-US"/>
           </a:p>
@@ -5215,7 +5301,7 @@
           <a:p>
             <a:fld id="{D3FFE419-2371-464F-8239-3959401C3561}" type="datetimeFigureOut">
               <a:rPr lang="en-US"/>
-              <a:t>6/1/23</a:t>
+              <a:t>6/5/23</a:t>
             </a:fld>
             <a:endParaRPr lang="en-US"/>
           </a:p>
@@ -5462,7 +5548,7 @@
           <a:p>
             <a:fld id="{97D162C4-EDD9-4389-A98B-B87ECEA2A816}" type="datetimeFigureOut">
               <a:rPr lang="en-US"/>
-              <a:t>6/1/23</a:t>
+              <a:t>6/5/23</a:t>
             </a:fld>
             <a:endParaRPr lang="en-US"/>
           </a:p>
@@ -5869,7 +5955,7 @@
           <a:p>
             <a:fld id="{3E5059C3-6A89-4494-99FF-5A4D6FFD50EB}" type="datetimeFigureOut">
               <a:rPr lang="en-US"/>
-              <a:t>6/1/23</a:t>
+              <a:t>6/5/23</a:t>
             </a:fld>
             <a:endParaRPr lang="en-US"/>
           </a:p>
@@ -6183,7 +6269,7 @@
           <a:p>
             <a:fld id="{CA954B2F-12DE-47F5-8894-472B206D2E1E}" type="datetimeFigureOut">
               <a:rPr lang="en-US"/>
-              <a:t>6/1/23</a:t>
+              <a:t>6/5/23</a:t>
             </a:fld>
             <a:endParaRPr lang="en-US"/>
           </a:p>
@@ -6727,7 +6813,7 @@
           <a:p>
             <a:fld id="{3F30E46F-7819-4ACF-B48B-48222C2ACC88}" type="datetimeFigureOut">
               <a:rPr lang="en-US"/>
-              <a:t>6/1/23</a:t>
+              <a:t>6/5/23</a:t>
             </a:fld>
             <a:endParaRPr lang="en-US"/>
           </a:p>
@@ -6922,7 +7008,7 @@
           <a:p>
             <a:fld id="{1FAF3416-4057-4DAA-829D-4CA07428D088}" type="datetimeFigureOut">
               <a:rPr lang="en-US"/>
-              <a:t>6/1/23</a:t>
+              <a:t>6/5/23</a:t>
             </a:fld>
             <a:endParaRPr lang="en-US"/>
           </a:p>
@@ -7135,7 +7221,7 @@
           <a:p>
             <a:fld id="{921D9284-D300-4297-87F7-E791DCC15DB1}" type="datetimeFigureOut">
               <a:rPr lang="en-US"/>
-              <a:t>6/1/23</a:t>
+              <a:t>6/5/23</a:t>
             </a:fld>
             <a:endParaRPr lang="en-US"/>
           </a:p>
@@ -7504,7 +7590,7 @@
           <a:p>
             <a:fld id="{37D525BB-DA17-4BA0-B3C8-3AC3ABC827E6}" type="datetimeFigureOut">
               <a:rPr lang="en-US"/>
-              <a:t>6/1/23</a:t>
+              <a:t>6/5/23</a:t>
             </a:fld>
             <a:endParaRPr lang="en-US"/>
           </a:p>
@@ -7906,7 +7992,7 @@
           <a:p>
             <a:fld id="{B16C4C9A-3960-41CF-A4E9-2A8FB932454B}" type="datetimeFigureOut">
               <a:rPr lang="en-US"/>
-              <a:t>6/1/23</a:t>
+              <a:t>6/5/23</a:t>
             </a:fld>
             <a:endParaRPr lang="en-US"/>
           </a:p>
@@ -8217,7 +8303,7 @@
           <a:p>
             <a:fld id="{3CBC1C18-307B-4F68-A007-B5B542270E8D}" type="datetimeFigureOut">
               <a:rPr lang="en-US"/>
-              <a:t>6/1/23</a:t>
+              <a:t>6/5/23</a:t>
             </a:fld>
             <a:endParaRPr lang="en-US"/>
           </a:p>
@@ -10647,7 +10733,7 @@
             </a:br>
             <a:r>
               <a:rPr lang="en-BR" dirty="0"/>
-              <a:t>Aula 4 – 01/06/2023</a:t>
+              <a:t>Aula 4 – 04/06/2023</a:t>
             </a:r>
             <a:br>
               <a:rPr lang="en-BR" dirty="0"/>
@@ -10743,6 +10829,160 @@
           <p:cNvPr id="2" name="Title 1">
             <a:extLst>
               <a:ext uri="{FF2B5EF4-FFF2-40B4-BE49-F238E27FC236}">
+                <a16:creationId xmlns:a16="http://schemas.microsoft.com/office/drawing/2014/main" id="{DEC72F72-42F9-57D1-B117-E8EA3E4C6321}"/>
+              </a:ext>
+            </a:extLst>
+          </p:cNvPr>
+          <p:cNvSpPr>
+            <a:spLocks noGrp="1"/>
+          </p:cNvSpPr>
+          <p:nvPr>
+            <p:ph type="title"/>
+          </p:nvPr>
+        </p:nvSpPr>
+        <p:spPr>
+          <a:xfrm>
+            <a:off x="2611808" y="808056"/>
+            <a:ext cx="7958331" cy="1986419"/>
+          </a:xfrm>
+        </p:spPr>
+        <p:txBody>
+          <a:bodyPr>
+            <a:normAutofit/>
+          </a:bodyPr>
+          <a:lstStyle/>
+          <a:p>
+            <a:r>
+              <a:rPr lang="en-US" dirty="0" err="1"/>
+              <a:t>Técnicas</a:t>
+            </a:r>
+            <a:r>
+              <a:rPr lang="en-US" dirty="0"/>
+              <a:t> de </a:t>
+            </a:r>
+            <a:r>
+              <a:rPr lang="en-US" dirty="0" err="1"/>
+              <a:t>programação</a:t>
+            </a:r>
+            <a:r>
+              <a:rPr lang="en-US" dirty="0"/>
+              <a:t> </a:t>
+            </a:r>
+            <a:r>
+              <a:rPr lang="en-US" dirty="0" err="1"/>
+              <a:t>em</a:t>
+            </a:r>
+            <a:r>
+              <a:rPr lang="en-US" dirty="0"/>
+              <a:t> Clojure</a:t>
+            </a:r>
+            <a:br>
+              <a:rPr lang="en-BR" dirty="0"/>
+            </a:br>
+            <a:r>
+              <a:rPr lang="en-BR" dirty="0"/>
+              <a:t>Aula 5 – 06/06/2023</a:t>
+            </a:r>
+            <a:br>
+              <a:rPr lang="en-BR" dirty="0"/>
+            </a:br>
+            <a:r>
+              <a:rPr lang="en-BR" dirty="0"/>
+              <a:t>@victorinacio	</a:t>
+            </a:r>
+          </a:p>
+        </p:txBody>
+      </p:sp>
+      <p:sp>
+        <p:nvSpPr>
+          <p:cNvPr id="3" name="Content Placeholder 2">
+            <a:extLst>
+              <a:ext uri="{FF2B5EF4-FFF2-40B4-BE49-F238E27FC236}">
+                <a16:creationId xmlns:a16="http://schemas.microsoft.com/office/drawing/2014/main" id="{08A8D014-EF6D-8616-B6C2-D9EE7016BC53}"/>
+              </a:ext>
+            </a:extLst>
+          </p:cNvPr>
+          <p:cNvSpPr>
+            <a:spLocks noGrp="1"/>
+          </p:cNvSpPr>
+          <p:nvPr>
+            <p:ph idx="1"/>
+          </p:nvPr>
+        </p:nvSpPr>
+        <p:spPr/>
+        <p:txBody>
+          <a:bodyPr/>
+          <a:lstStyle/>
+          <a:p>
+            <a:endParaRPr lang="en-BR" dirty="0"/>
+          </a:p>
+          <a:p>
+            <a:r>
+              <a:rPr lang="en-BR" dirty="0"/>
+              <a:t>Modelagem</a:t>
+            </a:r>
+          </a:p>
+          <a:p>
+            <a:r>
+              <a:rPr lang="en-BR" dirty="0"/>
+              <a:t>Concurrency </a:t>
+            </a:r>
+          </a:p>
+          <a:p>
+            <a:r>
+              <a:rPr lang="en-BR" dirty="0"/>
+              <a:t>Futures</a:t>
+            </a:r>
+          </a:p>
+          <a:p>
+            <a:r>
+              <a:rPr lang="en-BR" dirty="0"/>
+              <a:t>Promisses</a:t>
+            </a:r>
+          </a:p>
+          <a:p>
+            <a:pPr marL="0" indent="0">
+              <a:buNone/>
+            </a:pPr>
+            <a:endParaRPr lang="en-BR" dirty="0"/>
+          </a:p>
+        </p:txBody>
+      </p:sp>
+    </p:spTree>
+    <p:extLst>
+      <p:ext uri="{BB962C8B-B14F-4D97-AF65-F5344CB8AC3E}">
+        <p14:creationId xmlns:p14="http://schemas.microsoft.com/office/powerpoint/2010/main" val="3336818947"/>
+      </p:ext>
+    </p:extLst>
+  </p:cSld>
+  <p:clrMapOvr>
+    <a:masterClrMapping/>
+  </p:clrMapOvr>
+</p:sld>
+</file>
+
+<file path=ppt/slides/slide23.xml><?xml version="1.0" encoding="utf-8"?>
+<p:sld xmlns:a="http://schemas.openxmlformats.org/drawingml/2006/main" xmlns:r="http://schemas.openxmlformats.org/officeDocument/2006/relationships" xmlns:p="http://schemas.openxmlformats.org/presentationml/2006/main">
+  <p:cSld>
+    <p:spTree>
+      <p:nvGrpSpPr>
+        <p:cNvPr id="1" name=""/>
+        <p:cNvGrpSpPr/>
+        <p:nvPr/>
+      </p:nvGrpSpPr>
+      <p:grpSpPr>
+        <a:xfrm>
+          <a:off x="0" y="0"/>
+          <a:ext cx="0" cy="0"/>
+          <a:chOff x="0" y="0"/>
+          <a:chExt cx="0" cy="0"/>
+        </a:xfrm>
+      </p:grpSpPr>
+      <p:sp>
+        <p:nvSpPr>
+          <p:cNvPr id="2" name="Title 1">
+            <a:extLst>
+              <a:ext uri="{FF2B5EF4-FFF2-40B4-BE49-F238E27FC236}">
                 <a16:creationId xmlns:a16="http://schemas.microsoft.com/office/drawing/2014/main" id="{74343908-1824-703B-728F-487EB55E6F01}"/>
               </a:ext>
             </a:extLst>
@@ -10782,26 +11022,61 @@
             <p:ph idx="1"/>
           </p:nvPr>
         </p:nvSpPr>
-        <p:spPr/>
-        <p:txBody>
-          <a:bodyPr/>
+        <p:spPr>
+          <a:xfrm>
+            <a:off x="1153682" y="1341690"/>
+            <a:ext cx="9416457" cy="4708254"/>
+          </a:xfrm>
+        </p:spPr>
+        <p:txBody>
+          <a:bodyPr>
+            <a:normAutofit/>
+          </a:bodyPr>
           <a:lstStyle/>
           <a:p>
             <a:r>
               <a:rPr lang="en-BR" dirty="0"/>
-              <a:t>- Criar um schema para entidade turma</a:t>
-            </a:r>
-          </a:p>
-          <a:p>
+              <a:t>- Criar um Record com seu respectivo Schema para as entidades:</a:t>
+            </a:r>
+          </a:p>
+          <a:p>
+            <a:pPr lvl="1"/>
             <a:r>
               <a:rPr lang="en-BR" dirty="0"/>
-              <a:t>- Criar um schema para entidade aluno</a:t>
-            </a:r>
-          </a:p>
-          <a:p>
+              <a:t>Turma</a:t>
+            </a:r>
+          </a:p>
+          <a:p>
+            <a:pPr lvl="1"/>
             <a:r>
               <a:rPr lang="en-BR" dirty="0"/>
-              <a:t>- Criar um schema para FN registro-presenca</a:t>
+              <a:t>Aluno</a:t>
+            </a:r>
+          </a:p>
+          <a:p>
+            <a:pPr lvl="1"/>
+            <a:r>
+              <a:rPr lang="en-BR" dirty="0"/>
+              <a:t>Professor</a:t>
+            </a:r>
+          </a:p>
+          <a:p>
+            <a:pPr lvl="1"/>
+            <a:r>
+              <a:rPr lang="en-BR" dirty="0"/>
+              <a:t>Presenca</a:t>
+            </a:r>
+          </a:p>
+          <a:p>
+            <a:r>
+              <a:rPr lang="en-BR" dirty="0"/>
+              <a:t>- Criar um Protocol para Registrar Presenca recebendo o id do aluno, id da turma e data</a:t>
+            </a:r>
+          </a:p>
+          <a:p>
+            <a:r>
+              <a:rPr lang="en-BR" dirty="0"/>
+              <a:t>OBS: Para todos os schemas iniciar com o minimo de atributos e compor posteriormente</a:t>
             </a:r>
           </a:p>
         </p:txBody>

</xml_diff>

<commit_message>
aula 6 - PPT Atualizado
</commit_message>
<xml_diff>
--- a/doc/NUBOOT-MOD3-PROG-TEC-CLJ.pptx
+++ b/doc/NUBOOT-MOD3-PROG-TEC-CLJ.pptx
@@ -5,7 +5,7 @@
     <p:sldMasterId id="2147483648" r:id="rId1"/>
   </p:sldMasterIdLst>
   <p:notesMasterIdLst>
-    <p:notesMasterId r:id="rId25"/>
+    <p:notesMasterId r:id="rId28"/>
   </p:notesMasterIdLst>
   <p:sldIdLst>
     <p:sldId id="256" r:id="rId2"/>
@@ -29,8 +29,11 @@
     <p:sldId id="268" r:id="rId20"/>
     <p:sldId id="269" r:id="rId21"/>
     <p:sldId id="277" r:id="rId22"/>
-    <p:sldId id="279" r:id="rId23"/>
-    <p:sldId id="278" r:id="rId24"/>
+    <p:sldId id="278" r:id="rId23"/>
+    <p:sldId id="279" r:id="rId24"/>
+    <p:sldId id="280" r:id="rId25"/>
+    <p:sldId id="281" r:id="rId26"/>
+    <p:sldId id="282" r:id="rId27"/>
   </p:sldIdLst>
   <p:sldSz cx="12192000" cy="6858000"/>
   <p:notesSz cx="6858000" cy="9144000"/>
@@ -162,9 +165,24 @@
             <p14:sldId id="264"/>
             <p14:sldId id="268"/>
             <p14:sldId id="269"/>
+          </p14:sldIdLst>
+        </p14:section>
+        <p14:section name="Aula 4" id="{E50E6124-9B78-E74B-8985-0FE842DE4F20}">
+          <p14:sldIdLst>
             <p14:sldId id="277"/>
+            <p14:sldId id="278"/>
+          </p14:sldIdLst>
+        </p14:section>
+        <p14:section name="Aula 5" id="{667E806A-F5E7-7245-9BFE-59E218F30F1E}">
+          <p14:sldIdLst>
             <p14:sldId id="279"/>
-            <p14:sldId id="278"/>
+            <p14:sldId id="280"/>
+          </p14:sldIdLst>
+        </p14:section>
+        <p14:section name="Aula 6" id="{A4D5BACF-5B83-0548-A4EA-A43BAEAF772C}">
+          <p14:sldIdLst>
+            <p14:sldId id="281"/>
+            <p14:sldId id="282"/>
           </p14:sldIdLst>
         </p14:section>
       </p14:sectionLst>
@@ -258,7 +276,7 @@
           <a:p>
             <a:fld id="{290A6CB2-1C58-D84E-B07B-B5770D071A49}" type="datetimeFigureOut">
               <a:rPr lang="en-BR" smtClean="0"/>
-              <a:t>05/06/23</a:t>
+              <a:t>07/06/23</a:t>
             </a:fld>
             <a:endParaRPr lang="en-BR"/>
           </a:p>
@@ -4429,7 +4447,7 @@
           <a:p>
             <a:fld id="{DC55D523-4C5D-3943-A284-67088B5655C5}" type="slidenum">
               <a:rPr lang="en-BR" smtClean="0"/>
-              <a:t>22</a:t>
+              <a:t>23</a:t>
             </a:fld>
             <a:endParaRPr lang="en-BR"/>
           </a:p>
@@ -4439,6 +4457,90 @@
     <p:extLst>
       <p:ext uri="{BB962C8B-B14F-4D97-AF65-F5344CB8AC3E}">
         <p14:creationId xmlns:p14="http://schemas.microsoft.com/office/powerpoint/2010/main" val="3257334185"/>
+      </p:ext>
+    </p:extLst>
+  </p:cSld>
+  <p:clrMapOvr>
+    <a:masterClrMapping/>
+  </p:clrMapOvr>
+</p:notes>
+</file>
+
+<file path=ppt/notesSlides/notesSlide6.xml><?xml version="1.0" encoding="utf-8"?>
+<p:notes xmlns:a="http://schemas.openxmlformats.org/drawingml/2006/main" xmlns:r="http://schemas.openxmlformats.org/officeDocument/2006/relationships" xmlns:p="http://schemas.openxmlformats.org/presentationml/2006/main">
+  <p:cSld>
+    <p:spTree>
+      <p:nvGrpSpPr>
+        <p:cNvPr id="1" name=""/>
+        <p:cNvGrpSpPr/>
+        <p:nvPr/>
+      </p:nvGrpSpPr>
+      <p:grpSpPr>
+        <a:xfrm>
+          <a:off x="0" y="0"/>
+          <a:ext cx="0" cy="0"/>
+          <a:chOff x="0" y="0"/>
+          <a:chExt cx="0" cy="0"/>
+        </a:xfrm>
+      </p:grpSpPr>
+      <p:sp>
+        <p:nvSpPr>
+          <p:cNvPr id="2" name="Slide Image Placeholder 1"/>
+          <p:cNvSpPr>
+            <a:spLocks noGrp="1" noRot="1" noChangeAspect="1"/>
+          </p:cNvSpPr>
+          <p:nvPr>
+            <p:ph type="sldImg"/>
+          </p:nvPr>
+        </p:nvSpPr>
+        <p:spPr/>
+      </p:sp>
+      <p:sp>
+        <p:nvSpPr>
+          <p:cNvPr id="3" name="Notes Placeholder 2"/>
+          <p:cNvSpPr>
+            <a:spLocks noGrp="1"/>
+          </p:cNvSpPr>
+          <p:nvPr>
+            <p:ph type="body" idx="1"/>
+          </p:nvPr>
+        </p:nvSpPr>
+        <p:spPr/>
+        <p:txBody>
+          <a:bodyPr/>
+          <a:lstStyle/>
+          <a:p>
+            <a:endParaRPr lang="en-BR"/>
+          </a:p>
+        </p:txBody>
+      </p:sp>
+      <p:sp>
+        <p:nvSpPr>
+          <p:cNvPr id="4" name="Slide Number Placeholder 3"/>
+          <p:cNvSpPr>
+            <a:spLocks noGrp="1"/>
+          </p:cNvSpPr>
+          <p:nvPr>
+            <p:ph type="sldNum" sz="quarter" idx="5"/>
+          </p:nvPr>
+        </p:nvSpPr>
+        <p:spPr/>
+        <p:txBody>
+          <a:bodyPr/>
+          <a:lstStyle/>
+          <a:p>
+            <a:fld id="{DC55D523-4C5D-3943-A284-67088B5655C5}" type="slidenum">
+              <a:rPr lang="en-BR" smtClean="0"/>
+              <a:t>25</a:t>
+            </a:fld>
+            <a:endParaRPr lang="en-BR"/>
+          </a:p>
+        </p:txBody>
+      </p:sp>
+    </p:spTree>
+    <p:extLst>
+      <p:ext uri="{BB962C8B-B14F-4D97-AF65-F5344CB8AC3E}">
+        <p14:creationId xmlns:p14="http://schemas.microsoft.com/office/powerpoint/2010/main" val="316814279"/>
       </p:ext>
     </p:extLst>
   </p:cSld>
@@ -4665,7 +4767,7 @@
           <a:p>
             <a:fld id="{9AB3A824-1A51-4B26-AD58-A6D8E14F6C04}" type="datetimeFigureOut">
               <a:rPr lang="en-US"/>
-              <a:t>6/5/23</a:t>
+              <a:t>6/7/23</a:t>
             </a:fld>
             <a:endParaRPr lang="en-US"/>
           </a:p>
@@ -4999,7 +5101,7 @@
           <a:p>
             <a:fld id="{D857E33E-8B18-4087-B112-809917729534}" type="datetimeFigureOut">
               <a:rPr lang="en-US"/>
-              <a:t>6/5/23</a:t>
+              <a:t>6/7/23</a:t>
             </a:fld>
             <a:endParaRPr lang="en-US"/>
           </a:p>
@@ -5301,7 +5403,7 @@
           <a:p>
             <a:fld id="{D3FFE419-2371-464F-8239-3959401C3561}" type="datetimeFigureOut">
               <a:rPr lang="en-US"/>
-              <a:t>6/5/23</a:t>
+              <a:t>6/7/23</a:t>
             </a:fld>
             <a:endParaRPr lang="en-US"/>
           </a:p>
@@ -5548,7 +5650,7 @@
           <a:p>
             <a:fld id="{97D162C4-EDD9-4389-A98B-B87ECEA2A816}" type="datetimeFigureOut">
               <a:rPr lang="en-US"/>
-              <a:t>6/5/23</a:t>
+              <a:t>6/7/23</a:t>
             </a:fld>
             <a:endParaRPr lang="en-US"/>
           </a:p>
@@ -5955,7 +6057,7 @@
           <a:p>
             <a:fld id="{3E5059C3-6A89-4494-99FF-5A4D6FFD50EB}" type="datetimeFigureOut">
               <a:rPr lang="en-US"/>
-              <a:t>6/5/23</a:t>
+              <a:t>6/7/23</a:t>
             </a:fld>
             <a:endParaRPr lang="en-US"/>
           </a:p>
@@ -6269,7 +6371,7 @@
           <a:p>
             <a:fld id="{CA954B2F-12DE-47F5-8894-472B206D2E1E}" type="datetimeFigureOut">
               <a:rPr lang="en-US"/>
-              <a:t>6/5/23</a:t>
+              <a:t>6/7/23</a:t>
             </a:fld>
             <a:endParaRPr lang="en-US"/>
           </a:p>
@@ -6813,7 +6915,7 @@
           <a:p>
             <a:fld id="{3F30E46F-7819-4ACF-B48B-48222C2ACC88}" type="datetimeFigureOut">
               <a:rPr lang="en-US"/>
-              <a:t>6/5/23</a:t>
+              <a:t>6/7/23</a:t>
             </a:fld>
             <a:endParaRPr lang="en-US"/>
           </a:p>
@@ -7008,7 +7110,7 @@
           <a:p>
             <a:fld id="{1FAF3416-4057-4DAA-829D-4CA07428D088}" type="datetimeFigureOut">
               <a:rPr lang="en-US"/>
-              <a:t>6/5/23</a:t>
+              <a:t>6/7/23</a:t>
             </a:fld>
             <a:endParaRPr lang="en-US"/>
           </a:p>
@@ -7221,7 +7323,7 @@
           <a:p>
             <a:fld id="{921D9284-D300-4297-87F7-E791DCC15DB1}" type="datetimeFigureOut">
               <a:rPr lang="en-US"/>
-              <a:t>6/5/23</a:t>
+              <a:t>6/7/23</a:t>
             </a:fld>
             <a:endParaRPr lang="en-US"/>
           </a:p>
@@ -7590,7 +7692,7 @@
           <a:p>
             <a:fld id="{37D525BB-DA17-4BA0-B3C8-3AC3ABC827E6}" type="datetimeFigureOut">
               <a:rPr lang="en-US"/>
-              <a:t>6/5/23</a:t>
+              <a:t>6/7/23</a:t>
             </a:fld>
             <a:endParaRPr lang="en-US"/>
           </a:p>
@@ -7992,7 +8094,7 @@
           <a:p>
             <a:fld id="{B16C4C9A-3960-41CF-A4E9-2A8FB932454B}" type="datetimeFigureOut">
               <a:rPr lang="en-US"/>
-              <a:t>6/5/23</a:t>
+              <a:t>6/7/23</a:t>
             </a:fld>
             <a:endParaRPr lang="en-US"/>
           </a:p>
@@ -8303,7 +8405,7 @@
           <a:p>
             <a:fld id="{3CBC1C18-307B-4F68-A007-B5B542270E8D}" type="datetimeFigureOut">
               <a:rPr lang="en-US"/>
-              <a:t>6/5/23</a:t>
+              <a:t>6/7/23</a:t>
             </a:fld>
             <a:endParaRPr lang="en-US"/>
           </a:p>
@@ -10829,7 +10931,7 @@
           <p:cNvPr id="2" name="Title 1">
             <a:extLst>
               <a:ext uri="{FF2B5EF4-FFF2-40B4-BE49-F238E27FC236}">
-                <a16:creationId xmlns:a16="http://schemas.microsoft.com/office/drawing/2014/main" id="{DEC72F72-42F9-57D1-B117-E8EA3E4C6321}"/>
+                <a16:creationId xmlns:a16="http://schemas.microsoft.com/office/drawing/2014/main" id="{74343908-1824-703B-728F-487EB55E6F01}"/>
               </a:ext>
             </a:extLst>
           </p:cNvPr>
@@ -10840,55 +10942,14 @@
             <p:ph type="title"/>
           </p:nvPr>
         </p:nvSpPr>
-        <p:spPr>
-          <a:xfrm>
-            <a:off x="2611808" y="808056"/>
-            <a:ext cx="7958331" cy="1986419"/>
-          </a:xfrm>
-        </p:spPr>
-        <p:txBody>
-          <a:bodyPr>
-            <a:normAutofit/>
-          </a:bodyPr>
+        <p:spPr/>
+        <p:txBody>
+          <a:bodyPr/>
           <a:lstStyle/>
           <a:p>
             <a:r>
-              <a:rPr lang="en-US" dirty="0" err="1"/>
-              <a:t>Técnicas</a:t>
-            </a:r>
-            <a:r>
-              <a:rPr lang="en-US" dirty="0"/>
-              <a:t> de </a:t>
-            </a:r>
-            <a:r>
-              <a:rPr lang="en-US" dirty="0" err="1"/>
-              <a:t>programação</a:t>
-            </a:r>
-            <a:r>
-              <a:rPr lang="en-US" dirty="0"/>
-              <a:t> </a:t>
-            </a:r>
-            <a:r>
-              <a:rPr lang="en-US" dirty="0" err="1"/>
-              <a:t>em</a:t>
-            </a:r>
-            <a:r>
-              <a:rPr lang="en-US" dirty="0"/>
-              <a:t> Clojure</a:t>
-            </a:r>
-            <a:br>
               <a:rPr lang="en-BR" dirty="0"/>
-            </a:br>
-            <a:r>
-              <a:rPr lang="en-BR" dirty="0"/>
-              <a:t>Aula 5 – 06/06/2023</a:t>
-            </a:r>
-            <a:br>
-              <a:rPr lang="en-BR" dirty="0"/>
-            </a:br>
-            <a:r>
-              <a:rPr lang="en-BR" dirty="0"/>
-              <a:t>@victorinacio	</a:t>
+              <a:t>Exercicios	</a:t>
             </a:r>
           </a:p>
         </p:txBody>
@@ -10898,7 +10959,7 @@
           <p:cNvPr id="3" name="Content Placeholder 2">
             <a:extLst>
               <a:ext uri="{FF2B5EF4-FFF2-40B4-BE49-F238E27FC236}">
-                <a16:creationId xmlns:a16="http://schemas.microsoft.com/office/drawing/2014/main" id="{08A8D014-EF6D-8616-B6C2-D9EE7016BC53}"/>
+                <a16:creationId xmlns:a16="http://schemas.microsoft.com/office/drawing/2014/main" id="{0570522B-7EB5-0944-252A-19A011935F9E}"/>
               </a:ext>
             </a:extLst>
           </p:cNvPr>
@@ -10909,49 +10970,69 @@
             <p:ph idx="1"/>
           </p:nvPr>
         </p:nvSpPr>
-        <p:spPr/>
-        <p:txBody>
-          <a:bodyPr/>
+        <p:spPr>
+          <a:xfrm>
+            <a:off x="1153682" y="1341690"/>
+            <a:ext cx="9416457" cy="4708254"/>
+          </a:xfrm>
+        </p:spPr>
+        <p:txBody>
+          <a:bodyPr>
+            <a:normAutofit/>
+          </a:bodyPr>
           <a:lstStyle/>
           <a:p>
-            <a:endParaRPr lang="en-BR" dirty="0"/>
-          </a:p>
-          <a:p>
             <a:r>
               <a:rPr lang="en-BR" dirty="0"/>
-              <a:t>Modelagem</a:t>
-            </a:r>
-          </a:p>
-          <a:p>
+              <a:t>- Criar um Record com seu respectivo Schema para as entidades:</a:t>
+            </a:r>
+          </a:p>
+          <a:p>
+            <a:pPr lvl="1"/>
             <a:r>
               <a:rPr lang="en-BR" dirty="0"/>
-              <a:t>Concurrency </a:t>
-            </a:r>
-          </a:p>
-          <a:p>
+              <a:t>Turma</a:t>
+            </a:r>
+          </a:p>
+          <a:p>
+            <a:pPr lvl="1"/>
             <a:r>
               <a:rPr lang="en-BR" dirty="0"/>
-              <a:t>Futures</a:t>
-            </a:r>
-          </a:p>
-          <a:p>
+              <a:t>Aluno</a:t>
+            </a:r>
+          </a:p>
+          <a:p>
+            <a:pPr lvl="1"/>
             <a:r>
               <a:rPr lang="en-BR" dirty="0"/>
-              <a:t>Promisses</a:t>
-            </a:r>
-          </a:p>
-          <a:p>
-            <a:pPr marL="0" indent="0">
-              <a:buNone/>
-            </a:pPr>
-            <a:endParaRPr lang="en-BR" dirty="0"/>
+              <a:t>Professor</a:t>
+            </a:r>
+          </a:p>
+          <a:p>
+            <a:pPr lvl="1"/>
+            <a:r>
+              <a:rPr lang="en-BR" dirty="0"/>
+              <a:t>Presenca</a:t>
+            </a:r>
+          </a:p>
+          <a:p>
+            <a:r>
+              <a:rPr lang="en-BR" dirty="0"/>
+              <a:t>- Criar um Protocol para Registrar Presenca recebendo o id do aluno, id da turma e data</a:t>
+            </a:r>
+          </a:p>
+          <a:p>
+            <a:r>
+              <a:rPr lang="en-BR" dirty="0"/>
+              <a:t>OBS: Para todos os schemas iniciar com o minimo de atributos e compor posteriormente</a:t>
+            </a:r>
           </a:p>
         </p:txBody>
       </p:sp>
     </p:spTree>
     <p:extLst>
       <p:ext uri="{BB962C8B-B14F-4D97-AF65-F5344CB8AC3E}">
-        <p14:creationId xmlns:p14="http://schemas.microsoft.com/office/powerpoint/2010/main" val="3336818947"/>
+        <p14:creationId xmlns:p14="http://schemas.microsoft.com/office/powerpoint/2010/main" val="3237390634"/>
       </p:ext>
     </p:extLst>
   </p:cSld>
@@ -10983,7 +11064,7 @@
           <p:cNvPr id="2" name="Title 1">
             <a:extLst>
               <a:ext uri="{FF2B5EF4-FFF2-40B4-BE49-F238E27FC236}">
-                <a16:creationId xmlns:a16="http://schemas.microsoft.com/office/drawing/2014/main" id="{74343908-1824-703B-728F-487EB55E6F01}"/>
+                <a16:creationId xmlns:a16="http://schemas.microsoft.com/office/drawing/2014/main" id="{DEC72F72-42F9-57D1-B117-E8EA3E4C6321}"/>
               </a:ext>
             </a:extLst>
           </p:cNvPr>
@@ -10994,14 +11075,55 @@
             <p:ph type="title"/>
           </p:nvPr>
         </p:nvSpPr>
-        <p:spPr/>
-        <p:txBody>
-          <a:bodyPr/>
+        <p:spPr>
+          <a:xfrm>
+            <a:off x="2611808" y="808056"/>
+            <a:ext cx="7958331" cy="1986419"/>
+          </a:xfrm>
+        </p:spPr>
+        <p:txBody>
+          <a:bodyPr>
+            <a:normAutofit/>
+          </a:bodyPr>
           <a:lstStyle/>
           <a:p>
             <a:r>
+              <a:rPr lang="en-US" dirty="0" err="1"/>
+              <a:t>Técnicas</a:t>
+            </a:r>
+            <a:r>
+              <a:rPr lang="en-US" dirty="0"/>
+              <a:t> de </a:t>
+            </a:r>
+            <a:r>
+              <a:rPr lang="en-US" dirty="0" err="1"/>
+              <a:t>programação</a:t>
+            </a:r>
+            <a:r>
+              <a:rPr lang="en-US" dirty="0"/>
+              <a:t> </a:t>
+            </a:r>
+            <a:r>
+              <a:rPr lang="en-US" dirty="0" err="1"/>
+              <a:t>em</a:t>
+            </a:r>
+            <a:r>
+              <a:rPr lang="en-US" dirty="0"/>
+              <a:t> Clojure</a:t>
+            </a:r>
+            <a:br>
               <a:rPr lang="en-BR" dirty="0"/>
-              <a:t>Exercicios	</a:t>
+            </a:br>
+            <a:r>
+              <a:rPr lang="en-BR" dirty="0"/>
+              <a:t>Aula 5 – 07/06/2023</a:t>
+            </a:r>
+            <a:br>
+              <a:rPr lang="en-BR" dirty="0"/>
+            </a:br>
+            <a:r>
+              <a:rPr lang="en-BR" dirty="0"/>
+              <a:t>@victorinacio	</a:t>
             </a:r>
           </a:p>
         </p:txBody>
@@ -11011,7 +11133,7 @@
           <p:cNvPr id="3" name="Content Placeholder 2">
             <a:extLst>
               <a:ext uri="{FF2B5EF4-FFF2-40B4-BE49-F238E27FC236}">
-                <a16:creationId xmlns:a16="http://schemas.microsoft.com/office/drawing/2014/main" id="{0570522B-7EB5-0944-252A-19A011935F9E}"/>
+                <a16:creationId xmlns:a16="http://schemas.microsoft.com/office/drawing/2014/main" id="{08A8D014-EF6D-8616-B6C2-D9EE7016BC53}"/>
               </a:ext>
             </a:extLst>
           </p:cNvPr>
@@ -11022,10 +11144,184 @@
             <p:ph idx="1"/>
           </p:nvPr>
         </p:nvSpPr>
+        <p:spPr/>
+        <p:txBody>
+          <a:bodyPr/>
+          <a:lstStyle/>
+          <a:p>
+            <a:pPr marL="0" indent="0">
+              <a:buNone/>
+            </a:pPr>
+            <a:endParaRPr lang="en-BR" dirty="0"/>
+          </a:p>
+          <a:p>
+            <a:r>
+              <a:rPr lang="en-BR" dirty="0"/>
+              <a:t>Concurrency </a:t>
+            </a:r>
+          </a:p>
+          <a:p>
+            <a:r>
+              <a:rPr lang="en-BR" dirty="0"/>
+              <a:t>Futures</a:t>
+            </a:r>
+          </a:p>
+          <a:p>
+            <a:r>
+              <a:rPr lang="en-BR" dirty="0"/>
+              <a:t>Promisses</a:t>
+            </a:r>
+          </a:p>
+          <a:p>
+            <a:pPr marL="0" indent="0">
+              <a:buNone/>
+            </a:pPr>
+            <a:endParaRPr lang="en-BR" dirty="0"/>
+          </a:p>
+        </p:txBody>
+      </p:sp>
+    </p:spTree>
+    <p:extLst>
+      <p:ext uri="{BB962C8B-B14F-4D97-AF65-F5344CB8AC3E}">
+        <p14:creationId xmlns:p14="http://schemas.microsoft.com/office/powerpoint/2010/main" val="3336818947"/>
+      </p:ext>
+    </p:extLst>
+  </p:cSld>
+  <p:clrMapOvr>
+    <a:masterClrMapping/>
+  </p:clrMapOvr>
+</p:sld>
+</file>
+
+<file path=ppt/slides/slide24.xml><?xml version="1.0" encoding="utf-8"?>
+<p:sld xmlns:a="http://schemas.openxmlformats.org/drawingml/2006/main" xmlns:r="http://schemas.openxmlformats.org/officeDocument/2006/relationships" xmlns:p="http://schemas.openxmlformats.org/presentationml/2006/main">
+  <p:cSld>
+    <p:spTree>
+      <p:nvGrpSpPr>
+        <p:cNvPr id="1" name=""/>
+        <p:cNvGrpSpPr/>
+        <p:nvPr/>
+      </p:nvGrpSpPr>
+      <p:grpSpPr>
+        <a:xfrm>
+          <a:off x="0" y="0"/>
+          <a:ext cx="0" cy="0"/>
+          <a:chOff x="0" y="0"/>
+          <a:chExt cx="0" cy="0"/>
+        </a:xfrm>
+      </p:grpSpPr>
+      <p:sp>
+        <p:nvSpPr>
+          <p:cNvPr id="2" name="Title 1">
+            <a:extLst>
+              <a:ext uri="{FF2B5EF4-FFF2-40B4-BE49-F238E27FC236}">
+                <a16:creationId xmlns:a16="http://schemas.microsoft.com/office/drawing/2014/main" id="{226B15C0-F4B4-DED6-A91A-E5CA292CB244}"/>
+              </a:ext>
+            </a:extLst>
+          </p:cNvPr>
+          <p:cNvSpPr>
+            <a:spLocks noGrp="1"/>
+          </p:cNvSpPr>
+          <p:nvPr>
+            <p:ph type="title"/>
+          </p:nvPr>
+        </p:nvSpPr>
+        <p:spPr/>
+        <p:txBody>
+          <a:bodyPr/>
+          <a:lstStyle/>
+          <a:p>
+            <a:r>
+              <a:rPr lang="en-BR" dirty="0"/>
+              <a:t>Exercicios</a:t>
+            </a:r>
+          </a:p>
+        </p:txBody>
+      </p:sp>
+      <p:sp>
+        <p:nvSpPr>
+          <p:cNvPr id="3" name="Content Placeholder 2">
+            <a:extLst>
+              <a:ext uri="{FF2B5EF4-FFF2-40B4-BE49-F238E27FC236}">
+                <a16:creationId xmlns:a16="http://schemas.microsoft.com/office/drawing/2014/main" id="{6A57E2BB-2DC7-2E7C-120D-137CC0F54FE3}"/>
+              </a:ext>
+            </a:extLst>
+          </p:cNvPr>
+          <p:cNvSpPr>
+            <a:spLocks noGrp="1"/>
+          </p:cNvSpPr>
+          <p:nvPr>
+            <p:ph idx="1"/>
+          </p:nvPr>
+        </p:nvSpPr>
+        <p:spPr/>
+        <p:txBody>
+          <a:bodyPr/>
+          <a:lstStyle/>
+          <a:p>
+            <a:r>
+              <a:rPr lang="en-BR" dirty="0"/>
+              <a:t>Usando a  fn memoize2 construir uma versão da fn que calcula o produto de x e y.</a:t>
+            </a:r>
+          </a:p>
+          <a:p>
+            <a:r>
+              <a:rPr lang="en-BR" dirty="0"/>
+              <a:t>Utilizando future, promisses e deliver constuir uma função que imprime o tempo inicial e final de executar uma tarefa.</a:t>
+            </a:r>
+          </a:p>
+        </p:txBody>
+      </p:sp>
+    </p:spTree>
+    <p:extLst>
+      <p:ext uri="{BB962C8B-B14F-4D97-AF65-F5344CB8AC3E}">
+        <p14:creationId xmlns:p14="http://schemas.microsoft.com/office/powerpoint/2010/main" val="4127037221"/>
+      </p:ext>
+    </p:extLst>
+  </p:cSld>
+  <p:clrMapOvr>
+    <a:masterClrMapping/>
+  </p:clrMapOvr>
+</p:sld>
+</file>
+
+<file path=ppt/slides/slide25.xml><?xml version="1.0" encoding="utf-8"?>
+<p:sld xmlns:a="http://schemas.openxmlformats.org/drawingml/2006/main" xmlns:r="http://schemas.openxmlformats.org/officeDocument/2006/relationships" xmlns:p="http://schemas.openxmlformats.org/presentationml/2006/main">
+  <p:cSld>
+    <p:spTree>
+      <p:nvGrpSpPr>
+        <p:cNvPr id="1" name=""/>
+        <p:cNvGrpSpPr/>
+        <p:nvPr/>
+      </p:nvGrpSpPr>
+      <p:grpSpPr>
+        <a:xfrm>
+          <a:off x="0" y="0"/>
+          <a:ext cx="0" cy="0"/>
+          <a:chOff x="0" y="0"/>
+          <a:chExt cx="0" cy="0"/>
+        </a:xfrm>
+      </p:grpSpPr>
+      <p:sp>
+        <p:nvSpPr>
+          <p:cNvPr id="2" name="Title 1">
+            <a:extLst>
+              <a:ext uri="{FF2B5EF4-FFF2-40B4-BE49-F238E27FC236}">
+                <a16:creationId xmlns:a16="http://schemas.microsoft.com/office/drawing/2014/main" id="{DEC72F72-42F9-57D1-B117-E8EA3E4C6321}"/>
+              </a:ext>
+            </a:extLst>
+          </p:cNvPr>
+          <p:cNvSpPr>
+            <a:spLocks noGrp="1"/>
+          </p:cNvSpPr>
+          <p:nvPr>
+            <p:ph type="title"/>
+          </p:nvPr>
+        </p:nvSpPr>
         <p:spPr>
           <a:xfrm>
-            <a:off x="1153682" y="1341690"/>
-            <a:ext cx="9416457" cy="4708254"/>
+            <a:off x="2611808" y="808056"/>
+            <a:ext cx="7958331" cy="1986419"/>
           </a:xfrm>
         </p:spPr>
         <p:txBody>
@@ -11035,56 +11331,206 @@
           <a:lstStyle/>
           <a:p>
             <a:r>
+              <a:rPr lang="en-US" dirty="0" err="1"/>
+              <a:t>Técnicas</a:t>
+            </a:r>
+            <a:r>
+              <a:rPr lang="en-US" dirty="0"/>
+              <a:t> de </a:t>
+            </a:r>
+            <a:r>
+              <a:rPr lang="en-US" dirty="0" err="1"/>
+              <a:t>programação</a:t>
+            </a:r>
+            <a:r>
+              <a:rPr lang="en-US" dirty="0"/>
+              <a:t> </a:t>
+            </a:r>
+            <a:r>
+              <a:rPr lang="en-US" dirty="0" err="1"/>
+              <a:t>em</a:t>
+            </a:r>
+            <a:r>
+              <a:rPr lang="en-US" dirty="0"/>
+              <a:t> Clojure</a:t>
+            </a:r>
+            <a:br>
               <a:rPr lang="en-BR" dirty="0"/>
-              <a:t>- Criar um Record com seu respectivo Schema para as entidades:</a:t>
-            </a:r>
-          </a:p>
-          <a:p>
-            <a:pPr lvl="1"/>
+            </a:br>
             <a:r>
               <a:rPr lang="en-BR" dirty="0"/>
-              <a:t>Turma</a:t>
-            </a:r>
-          </a:p>
-          <a:p>
-            <a:pPr lvl="1"/>
-            <a:r>
+              <a:t>Aula 6 – 12/06/2023</a:t>
+            </a:r>
+            <a:br>
               <a:rPr lang="en-BR" dirty="0"/>
-              <a:t>Aluno</a:t>
-            </a:r>
-          </a:p>
-          <a:p>
-            <a:pPr lvl="1"/>
+            </a:br>
             <a:r>
               <a:rPr lang="en-BR" dirty="0"/>
-              <a:t>Professor</a:t>
-            </a:r>
-          </a:p>
-          <a:p>
-            <a:pPr lvl="1"/>
+              <a:t>@victorinacio	</a:t>
+            </a:r>
+          </a:p>
+        </p:txBody>
+      </p:sp>
+      <p:sp>
+        <p:nvSpPr>
+          <p:cNvPr id="3" name="Content Placeholder 2">
+            <a:extLst>
+              <a:ext uri="{FF2B5EF4-FFF2-40B4-BE49-F238E27FC236}">
+                <a16:creationId xmlns:a16="http://schemas.microsoft.com/office/drawing/2014/main" id="{08A8D014-EF6D-8616-B6C2-D9EE7016BC53}"/>
+              </a:ext>
+            </a:extLst>
+          </p:cNvPr>
+          <p:cNvSpPr>
+            <a:spLocks noGrp="1"/>
+          </p:cNvSpPr>
+          <p:nvPr>
+            <p:ph idx="1"/>
+          </p:nvPr>
+        </p:nvSpPr>
+        <p:spPr/>
+        <p:txBody>
+          <a:bodyPr/>
+          <a:lstStyle/>
+          <a:p>
+            <a:pPr marL="0" indent="0">
+              <a:buNone/>
+            </a:pPr>
+            <a:endParaRPr lang="en-BR" dirty="0"/>
+          </a:p>
+          <a:p>
             <a:r>
               <a:rPr lang="en-BR" dirty="0"/>
-              <a:t>Presenca</a:t>
+              <a:t>Lazy</a:t>
             </a:r>
           </a:p>
           <a:p>
             <a:r>
               <a:rPr lang="en-BR" dirty="0"/>
-              <a:t>- Criar um Protocol para Registrar Presenca recebendo o id do aluno, id da turma e data</a:t>
+              <a:t>Seq</a:t>
             </a:r>
           </a:p>
           <a:p>
             <a:r>
               <a:rPr lang="en-BR" dirty="0"/>
-              <a:t>OBS: Para todos os schemas iniciar com o minimo de atributos e compor posteriormente</a:t>
-            </a:r>
+              <a:t>Loop</a:t>
+            </a:r>
+          </a:p>
+          <a:p>
+            <a:r>
+              <a:rPr lang="en-BR" dirty="0"/>
+              <a:t>Recur</a:t>
+            </a:r>
+          </a:p>
+          <a:p>
+            <a:pPr marL="0" indent="0">
+              <a:buNone/>
+            </a:pPr>
+            <a:endParaRPr lang="en-BR" dirty="0"/>
           </a:p>
         </p:txBody>
       </p:sp>
     </p:spTree>
     <p:extLst>
       <p:ext uri="{BB962C8B-B14F-4D97-AF65-F5344CB8AC3E}">
-        <p14:creationId xmlns:p14="http://schemas.microsoft.com/office/powerpoint/2010/main" val="3237390634"/>
+        <p14:creationId xmlns:p14="http://schemas.microsoft.com/office/powerpoint/2010/main" val="1617308822"/>
+      </p:ext>
+    </p:extLst>
+  </p:cSld>
+  <p:clrMapOvr>
+    <a:masterClrMapping/>
+  </p:clrMapOvr>
+</p:sld>
+</file>
+
+<file path=ppt/slides/slide26.xml><?xml version="1.0" encoding="utf-8"?>
+<p:sld xmlns:a="http://schemas.openxmlformats.org/drawingml/2006/main" xmlns:r="http://schemas.openxmlformats.org/officeDocument/2006/relationships" xmlns:p="http://schemas.openxmlformats.org/presentationml/2006/main">
+  <p:cSld>
+    <p:spTree>
+      <p:nvGrpSpPr>
+        <p:cNvPr id="1" name=""/>
+        <p:cNvGrpSpPr/>
+        <p:nvPr/>
+      </p:nvGrpSpPr>
+      <p:grpSpPr>
+        <a:xfrm>
+          <a:off x="0" y="0"/>
+          <a:ext cx="0" cy="0"/>
+          <a:chOff x="0" y="0"/>
+          <a:chExt cx="0" cy="0"/>
+        </a:xfrm>
+      </p:grpSpPr>
+      <p:sp>
+        <p:nvSpPr>
+          <p:cNvPr id="2" name="Title 1">
+            <a:extLst>
+              <a:ext uri="{FF2B5EF4-FFF2-40B4-BE49-F238E27FC236}">
+                <a16:creationId xmlns:a16="http://schemas.microsoft.com/office/drawing/2014/main" id="{226B15C0-F4B4-DED6-A91A-E5CA292CB244}"/>
+              </a:ext>
+            </a:extLst>
+          </p:cNvPr>
+          <p:cNvSpPr>
+            <a:spLocks noGrp="1"/>
+          </p:cNvSpPr>
+          <p:nvPr>
+            <p:ph type="title"/>
+          </p:nvPr>
+        </p:nvSpPr>
+        <p:spPr/>
+        <p:txBody>
+          <a:bodyPr/>
+          <a:lstStyle/>
+          <a:p>
+            <a:r>
+              <a:rPr lang="en-BR" dirty="0"/>
+              <a:t>Exercicios</a:t>
+            </a:r>
+          </a:p>
+        </p:txBody>
+      </p:sp>
+      <p:sp>
+        <p:nvSpPr>
+          <p:cNvPr id="3" name="Content Placeholder 2">
+            <a:extLst>
+              <a:ext uri="{FF2B5EF4-FFF2-40B4-BE49-F238E27FC236}">
+                <a16:creationId xmlns:a16="http://schemas.microsoft.com/office/drawing/2014/main" id="{6A57E2BB-2DC7-2E7C-120D-137CC0F54FE3}"/>
+              </a:ext>
+            </a:extLst>
+          </p:cNvPr>
+          <p:cNvSpPr>
+            <a:spLocks noGrp="1"/>
+          </p:cNvSpPr>
+          <p:nvPr>
+            <p:ph idx="1"/>
+          </p:nvPr>
+        </p:nvSpPr>
+        <p:spPr/>
+        <p:txBody>
+          <a:bodyPr/>
+          <a:lstStyle/>
+          <a:p>
+            <a:r>
+              <a:rPr lang="en-BR" dirty="0"/>
+              <a:t>Gerar um map com chaves aleatorias e como valores um range dos numeros -256 até 2048 com step de 64.</a:t>
+            </a:r>
+          </a:p>
+          <a:p>
+            <a:r>
+              <a:rPr lang="en-BR" dirty="0"/>
+              <a:t>Definir uma função que gera uma seq lazy com os multiplos de um determinado numero positivo excluindo o proprio numero da saida. Executar a função para os </a:t>
+            </a:r>
+          </a:p>
+          <a:p>
+            <a:r>
+              <a:rPr lang="en-BR" dirty="0"/>
+              <a:t>Gerar a sequencia de fibonacci de forma ‘stack-overflow safe’ porem permitindo escolher o valor inicial e final da sequencia.</a:t>
+            </a:r>
+          </a:p>
+        </p:txBody>
+      </p:sp>
+    </p:spTree>
+    <p:extLst>
+      <p:ext uri="{BB962C8B-B14F-4D97-AF65-F5344CB8AC3E}">
+        <p14:creationId xmlns:p14="http://schemas.microsoft.com/office/powerpoint/2010/main" val="881768261"/>
       </p:ext>
     </p:extLst>
   </p:cSld>

</xml_diff>

<commit_message>
aula 8 - Inicio
</commit_message>
<xml_diff>
--- a/doc/NUBOOT-MOD3-PROG-TEC-CLJ.pptx
+++ b/doc/NUBOOT-MOD3-PROG-TEC-CLJ.pptx
@@ -5,7 +5,7 @@
     <p:sldMasterId id="2147483648" r:id="rId1"/>
   </p:sldMasterIdLst>
   <p:notesMasterIdLst>
-    <p:notesMasterId r:id="rId28"/>
+    <p:notesMasterId r:id="rId31"/>
   </p:notesMasterIdLst>
   <p:sldIdLst>
     <p:sldId id="256" r:id="rId2"/>
@@ -34,6 +34,9 @@
     <p:sldId id="280" r:id="rId25"/>
     <p:sldId id="281" r:id="rId26"/>
     <p:sldId id="282" r:id="rId27"/>
+    <p:sldId id="284" r:id="rId28"/>
+    <p:sldId id="285" r:id="rId29"/>
+    <p:sldId id="283" r:id="rId30"/>
   </p:sldIdLst>
   <p:sldSz cx="12192000" cy="6858000"/>
   <p:notesSz cx="6858000" cy="9144000"/>
@@ -185,6 +188,13 @@
             <p14:sldId id="282"/>
           </p14:sldIdLst>
         </p14:section>
+        <p14:section name="Aula 7" id="{80ED8B7E-946E-934D-A436-51C4A223908B}">
+          <p14:sldIdLst>
+            <p14:sldId id="284"/>
+            <p14:sldId id="285"/>
+            <p14:sldId id="283"/>
+          </p14:sldIdLst>
+        </p14:section>
       </p14:sectionLst>
     </p:ext>
     <p:ext uri="{EFAFB233-063F-42B5-8137-9DF3F51BA10A}">
@@ -276,7 +286,7 @@
           <a:p>
             <a:fld id="{290A6CB2-1C58-D84E-B07B-B5770D071A49}" type="datetimeFigureOut">
               <a:rPr lang="en-BR" smtClean="0"/>
-              <a:t>07/06/23</a:t>
+              <a:t>19/06/23</a:t>
             </a:fld>
             <a:endParaRPr lang="en-BR"/>
           </a:p>
@@ -4550,6 +4560,174 @@
 </p:notes>
 </file>
 
+<file path=ppt/notesSlides/notesSlide7.xml><?xml version="1.0" encoding="utf-8"?>
+<p:notes xmlns:a="http://schemas.openxmlformats.org/drawingml/2006/main" xmlns:r="http://schemas.openxmlformats.org/officeDocument/2006/relationships" xmlns:p="http://schemas.openxmlformats.org/presentationml/2006/main">
+  <p:cSld>
+    <p:spTree>
+      <p:nvGrpSpPr>
+        <p:cNvPr id="1" name=""/>
+        <p:cNvGrpSpPr/>
+        <p:nvPr/>
+      </p:nvGrpSpPr>
+      <p:grpSpPr>
+        <a:xfrm>
+          <a:off x="0" y="0"/>
+          <a:ext cx="0" cy="0"/>
+          <a:chOff x="0" y="0"/>
+          <a:chExt cx="0" cy="0"/>
+        </a:xfrm>
+      </p:grpSpPr>
+      <p:sp>
+        <p:nvSpPr>
+          <p:cNvPr id="2" name="Slide Image Placeholder 1"/>
+          <p:cNvSpPr>
+            <a:spLocks noGrp="1" noRot="1" noChangeAspect="1"/>
+          </p:cNvSpPr>
+          <p:nvPr>
+            <p:ph type="sldImg"/>
+          </p:nvPr>
+        </p:nvSpPr>
+        <p:spPr/>
+      </p:sp>
+      <p:sp>
+        <p:nvSpPr>
+          <p:cNvPr id="3" name="Notes Placeholder 2"/>
+          <p:cNvSpPr>
+            <a:spLocks noGrp="1"/>
+          </p:cNvSpPr>
+          <p:nvPr>
+            <p:ph type="body" idx="1"/>
+          </p:nvPr>
+        </p:nvSpPr>
+        <p:spPr/>
+        <p:txBody>
+          <a:bodyPr/>
+          <a:lstStyle/>
+          <a:p>
+            <a:endParaRPr lang="en-BR"/>
+          </a:p>
+        </p:txBody>
+      </p:sp>
+      <p:sp>
+        <p:nvSpPr>
+          <p:cNvPr id="4" name="Slide Number Placeholder 3"/>
+          <p:cNvSpPr>
+            <a:spLocks noGrp="1"/>
+          </p:cNvSpPr>
+          <p:nvPr>
+            <p:ph type="sldNum" sz="quarter" idx="5"/>
+          </p:nvPr>
+        </p:nvSpPr>
+        <p:spPr/>
+        <p:txBody>
+          <a:bodyPr/>
+          <a:lstStyle/>
+          <a:p>
+            <a:fld id="{DC55D523-4C5D-3943-A284-67088B5655C5}" type="slidenum">
+              <a:rPr lang="en-BR" smtClean="0"/>
+              <a:t>27</a:t>
+            </a:fld>
+            <a:endParaRPr lang="en-BR"/>
+          </a:p>
+        </p:txBody>
+      </p:sp>
+    </p:spTree>
+    <p:extLst>
+      <p:ext uri="{BB962C8B-B14F-4D97-AF65-F5344CB8AC3E}">
+        <p14:creationId xmlns:p14="http://schemas.microsoft.com/office/powerpoint/2010/main" val="3069908937"/>
+      </p:ext>
+    </p:extLst>
+  </p:cSld>
+  <p:clrMapOvr>
+    <a:masterClrMapping/>
+  </p:clrMapOvr>
+</p:notes>
+</file>
+
+<file path=ppt/notesSlides/notesSlide8.xml><?xml version="1.0" encoding="utf-8"?>
+<p:notes xmlns:a="http://schemas.openxmlformats.org/drawingml/2006/main" xmlns:r="http://schemas.openxmlformats.org/officeDocument/2006/relationships" xmlns:p="http://schemas.openxmlformats.org/presentationml/2006/main">
+  <p:cSld>
+    <p:spTree>
+      <p:nvGrpSpPr>
+        <p:cNvPr id="1" name=""/>
+        <p:cNvGrpSpPr/>
+        <p:nvPr/>
+      </p:nvGrpSpPr>
+      <p:grpSpPr>
+        <a:xfrm>
+          <a:off x="0" y="0"/>
+          <a:ext cx="0" cy="0"/>
+          <a:chOff x="0" y="0"/>
+          <a:chExt cx="0" cy="0"/>
+        </a:xfrm>
+      </p:grpSpPr>
+      <p:sp>
+        <p:nvSpPr>
+          <p:cNvPr id="2" name="Slide Image Placeholder 1"/>
+          <p:cNvSpPr>
+            <a:spLocks noGrp="1" noRot="1" noChangeAspect="1"/>
+          </p:cNvSpPr>
+          <p:nvPr>
+            <p:ph type="sldImg"/>
+          </p:nvPr>
+        </p:nvSpPr>
+        <p:spPr/>
+      </p:sp>
+      <p:sp>
+        <p:nvSpPr>
+          <p:cNvPr id="3" name="Notes Placeholder 2"/>
+          <p:cNvSpPr>
+            <a:spLocks noGrp="1"/>
+          </p:cNvSpPr>
+          <p:nvPr>
+            <p:ph type="body" idx="1"/>
+          </p:nvPr>
+        </p:nvSpPr>
+        <p:spPr/>
+        <p:txBody>
+          <a:bodyPr/>
+          <a:lstStyle/>
+          <a:p>
+            <a:endParaRPr lang="en-BR"/>
+          </a:p>
+        </p:txBody>
+      </p:sp>
+      <p:sp>
+        <p:nvSpPr>
+          <p:cNvPr id="4" name="Slide Number Placeholder 3"/>
+          <p:cNvSpPr>
+            <a:spLocks noGrp="1"/>
+          </p:cNvSpPr>
+          <p:nvPr>
+            <p:ph type="sldNum" sz="quarter" idx="5"/>
+          </p:nvPr>
+        </p:nvSpPr>
+        <p:spPr/>
+        <p:txBody>
+          <a:bodyPr/>
+          <a:lstStyle/>
+          <a:p>
+            <a:fld id="{DC55D523-4C5D-3943-A284-67088B5655C5}" type="slidenum">
+              <a:rPr lang="en-BR" smtClean="0"/>
+              <a:t>28</a:t>
+            </a:fld>
+            <a:endParaRPr lang="en-BR"/>
+          </a:p>
+        </p:txBody>
+      </p:sp>
+    </p:spTree>
+    <p:extLst>
+      <p:ext uri="{BB962C8B-B14F-4D97-AF65-F5344CB8AC3E}">
+        <p14:creationId xmlns:p14="http://schemas.microsoft.com/office/powerpoint/2010/main" val="3782972626"/>
+      </p:ext>
+    </p:extLst>
+  </p:cSld>
+  <p:clrMapOvr>
+    <a:masterClrMapping/>
+  </p:clrMapOvr>
+</p:notes>
+</file>
+
 <file path=ppt/slideLayouts/slideLayout1.xml><?xml version="1.0" encoding="utf-8"?>
 <p:sldLayout xmlns:a="http://schemas.openxmlformats.org/drawingml/2006/main" xmlns:r="http://schemas.openxmlformats.org/officeDocument/2006/relationships" xmlns:p="http://schemas.openxmlformats.org/presentationml/2006/main" type="title" preserve="1">
   <p:cSld name="Title Slide">
@@ -4767,7 +4945,7 @@
           <a:p>
             <a:fld id="{9AB3A824-1A51-4B26-AD58-A6D8E14F6C04}" type="datetimeFigureOut">
               <a:rPr lang="en-US"/>
-              <a:t>6/7/23</a:t>
+              <a:t>6/19/23</a:t>
             </a:fld>
             <a:endParaRPr lang="en-US"/>
           </a:p>
@@ -5101,7 +5279,7 @@
           <a:p>
             <a:fld id="{D857E33E-8B18-4087-B112-809917729534}" type="datetimeFigureOut">
               <a:rPr lang="en-US"/>
-              <a:t>6/7/23</a:t>
+              <a:t>6/19/23</a:t>
             </a:fld>
             <a:endParaRPr lang="en-US"/>
           </a:p>
@@ -5403,7 +5581,7 @@
           <a:p>
             <a:fld id="{D3FFE419-2371-464F-8239-3959401C3561}" type="datetimeFigureOut">
               <a:rPr lang="en-US"/>
-              <a:t>6/7/23</a:t>
+              <a:t>6/19/23</a:t>
             </a:fld>
             <a:endParaRPr lang="en-US"/>
           </a:p>
@@ -5650,7 +5828,7 @@
           <a:p>
             <a:fld id="{97D162C4-EDD9-4389-A98B-B87ECEA2A816}" type="datetimeFigureOut">
               <a:rPr lang="en-US"/>
-              <a:t>6/7/23</a:t>
+              <a:t>6/19/23</a:t>
             </a:fld>
             <a:endParaRPr lang="en-US"/>
           </a:p>
@@ -6057,7 +6235,7 @@
           <a:p>
             <a:fld id="{3E5059C3-6A89-4494-99FF-5A4D6FFD50EB}" type="datetimeFigureOut">
               <a:rPr lang="en-US"/>
-              <a:t>6/7/23</a:t>
+              <a:t>6/19/23</a:t>
             </a:fld>
             <a:endParaRPr lang="en-US"/>
           </a:p>
@@ -6371,7 +6549,7 @@
           <a:p>
             <a:fld id="{CA954B2F-12DE-47F5-8894-472B206D2E1E}" type="datetimeFigureOut">
               <a:rPr lang="en-US"/>
-              <a:t>6/7/23</a:t>
+              <a:t>6/19/23</a:t>
             </a:fld>
             <a:endParaRPr lang="en-US"/>
           </a:p>
@@ -6915,7 +7093,7 @@
           <a:p>
             <a:fld id="{3F30E46F-7819-4ACF-B48B-48222C2ACC88}" type="datetimeFigureOut">
               <a:rPr lang="en-US"/>
-              <a:t>6/7/23</a:t>
+              <a:t>6/19/23</a:t>
             </a:fld>
             <a:endParaRPr lang="en-US"/>
           </a:p>
@@ -7110,7 +7288,7 @@
           <a:p>
             <a:fld id="{1FAF3416-4057-4DAA-829D-4CA07428D088}" type="datetimeFigureOut">
               <a:rPr lang="en-US"/>
-              <a:t>6/7/23</a:t>
+              <a:t>6/19/23</a:t>
             </a:fld>
             <a:endParaRPr lang="en-US"/>
           </a:p>
@@ -7323,7 +7501,7 @@
           <a:p>
             <a:fld id="{921D9284-D300-4297-87F7-E791DCC15DB1}" type="datetimeFigureOut">
               <a:rPr lang="en-US"/>
-              <a:t>6/7/23</a:t>
+              <a:t>6/19/23</a:t>
             </a:fld>
             <a:endParaRPr lang="en-US"/>
           </a:p>
@@ -7692,7 +7870,7 @@
           <a:p>
             <a:fld id="{37D525BB-DA17-4BA0-B3C8-3AC3ABC827E6}" type="datetimeFigureOut">
               <a:rPr lang="en-US"/>
-              <a:t>6/7/23</a:t>
+              <a:t>6/19/23</a:t>
             </a:fld>
             <a:endParaRPr lang="en-US"/>
           </a:p>
@@ -8094,7 +8272,7 @@
           <a:p>
             <a:fld id="{B16C4C9A-3960-41CF-A4E9-2A8FB932454B}" type="datetimeFigureOut">
               <a:rPr lang="en-US"/>
-              <a:t>6/7/23</a:t>
+              <a:t>6/19/23</a:t>
             </a:fld>
             <a:endParaRPr lang="en-US"/>
           </a:p>
@@ -8405,7 +8583,7 @@
           <a:p>
             <a:fld id="{3CBC1C18-307B-4F68-A007-B5B542270E8D}" type="datetimeFigureOut">
               <a:rPr lang="en-US"/>
-              <a:t>6/7/23</a:t>
+              <a:t>6/19/23</a:t>
             </a:fld>
             <a:endParaRPr lang="en-US"/>
           </a:p>
@@ -11531,6 +11709,431 @@
     <p:extLst>
       <p:ext uri="{BB962C8B-B14F-4D97-AF65-F5344CB8AC3E}">
         <p14:creationId xmlns:p14="http://schemas.microsoft.com/office/powerpoint/2010/main" val="881768261"/>
+      </p:ext>
+    </p:extLst>
+  </p:cSld>
+  <p:clrMapOvr>
+    <a:masterClrMapping/>
+  </p:clrMapOvr>
+</p:sld>
+</file>
+
+<file path=ppt/slides/slide27.xml><?xml version="1.0" encoding="utf-8"?>
+<p:sld xmlns:a="http://schemas.openxmlformats.org/drawingml/2006/main" xmlns:r="http://schemas.openxmlformats.org/officeDocument/2006/relationships" xmlns:p="http://schemas.openxmlformats.org/presentationml/2006/main">
+  <p:cSld>
+    <p:spTree>
+      <p:nvGrpSpPr>
+        <p:cNvPr id="1" name=""/>
+        <p:cNvGrpSpPr/>
+        <p:nvPr/>
+      </p:nvGrpSpPr>
+      <p:grpSpPr>
+        <a:xfrm>
+          <a:off x="0" y="0"/>
+          <a:ext cx="0" cy="0"/>
+          <a:chOff x="0" y="0"/>
+          <a:chExt cx="0" cy="0"/>
+        </a:xfrm>
+      </p:grpSpPr>
+      <p:sp>
+        <p:nvSpPr>
+          <p:cNvPr id="2" name="Title 1">
+            <a:extLst>
+              <a:ext uri="{FF2B5EF4-FFF2-40B4-BE49-F238E27FC236}">
+                <a16:creationId xmlns:a16="http://schemas.microsoft.com/office/drawing/2014/main" id="{DEC72F72-42F9-57D1-B117-E8EA3E4C6321}"/>
+              </a:ext>
+            </a:extLst>
+          </p:cNvPr>
+          <p:cNvSpPr>
+            <a:spLocks noGrp="1"/>
+          </p:cNvSpPr>
+          <p:nvPr>
+            <p:ph type="title"/>
+          </p:nvPr>
+        </p:nvSpPr>
+        <p:spPr>
+          <a:xfrm>
+            <a:off x="2611808" y="808056"/>
+            <a:ext cx="7958331" cy="1986419"/>
+          </a:xfrm>
+        </p:spPr>
+        <p:txBody>
+          <a:bodyPr>
+            <a:normAutofit/>
+          </a:bodyPr>
+          <a:lstStyle/>
+          <a:p>
+            <a:r>
+              <a:rPr lang="en-US" dirty="0" err="1"/>
+              <a:t>Técnicas</a:t>
+            </a:r>
+            <a:r>
+              <a:rPr lang="en-US" dirty="0"/>
+              <a:t> de </a:t>
+            </a:r>
+            <a:r>
+              <a:rPr lang="en-US" dirty="0" err="1"/>
+              <a:t>programação</a:t>
+            </a:r>
+            <a:r>
+              <a:rPr lang="en-US" dirty="0"/>
+              <a:t> </a:t>
+            </a:r>
+            <a:r>
+              <a:rPr lang="en-US" dirty="0" err="1"/>
+              <a:t>em</a:t>
+            </a:r>
+            <a:r>
+              <a:rPr lang="en-US" dirty="0"/>
+              <a:t> Clojure</a:t>
+            </a:r>
+            <a:br>
+              <a:rPr lang="en-BR" dirty="0"/>
+            </a:br>
+            <a:r>
+              <a:rPr lang="en-BR" dirty="0"/>
+              <a:t>Aula 7 – 15/06/2023</a:t>
+            </a:r>
+            <a:br>
+              <a:rPr lang="en-BR" dirty="0"/>
+            </a:br>
+            <a:r>
+              <a:rPr lang="en-BR" dirty="0"/>
+              <a:t>@victorinacio	</a:t>
+            </a:r>
+          </a:p>
+        </p:txBody>
+      </p:sp>
+      <p:sp>
+        <p:nvSpPr>
+          <p:cNvPr id="3" name="Content Placeholder 2">
+            <a:extLst>
+              <a:ext uri="{FF2B5EF4-FFF2-40B4-BE49-F238E27FC236}">
+                <a16:creationId xmlns:a16="http://schemas.microsoft.com/office/drawing/2014/main" id="{08A8D014-EF6D-8616-B6C2-D9EE7016BC53}"/>
+              </a:ext>
+            </a:extLst>
+          </p:cNvPr>
+          <p:cNvSpPr>
+            <a:spLocks noGrp="1"/>
+          </p:cNvSpPr>
+          <p:nvPr>
+            <p:ph idx="1"/>
+          </p:nvPr>
+        </p:nvSpPr>
+        <p:spPr/>
+        <p:txBody>
+          <a:bodyPr/>
+          <a:lstStyle/>
+          <a:p>
+            <a:pPr marL="0" indent="0">
+              <a:buNone/>
+            </a:pPr>
+            <a:endParaRPr lang="en-BR" dirty="0"/>
+          </a:p>
+          <a:p>
+            <a:r>
+              <a:rPr lang="en-BR" dirty="0"/>
+              <a:t>Destructuring</a:t>
+            </a:r>
+          </a:p>
+          <a:p>
+            <a:r>
+              <a:rPr lang="en-BR" dirty="0"/>
+              <a:t>Map</a:t>
+            </a:r>
+          </a:p>
+          <a:p>
+            <a:r>
+              <a:rPr lang="en-BR" dirty="0"/>
+              <a:t>Reduce</a:t>
+            </a:r>
+          </a:p>
+          <a:p>
+            <a:pPr marL="0" indent="0">
+              <a:buNone/>
+            </a:pPr>
+            <a:endParaRPr lang="en-BR" dirty="0"/>
+          </a:p>
+        </p:txBody>
+      </p:sp>
+    </p:spTree>
+    <p:extLst>
+      <p:ext uri="{BB962C8B-B14F-4D97-AF65-F5344CB8AC3E}">
+        <p14:creationId xmlns:p14="http://schemas.microsoft.com/office/powerpoint/2010/main" val="838982739"/>
+      </p:ext>
+    </p:extLst>
+  </p:cSld>
+  <p:clrMapOvr>
+    <a:masterClrMapping/>
+  </p:clrMapOvr>
+</p:sld>
+</file>
+
+<file path=ppt/slides/slide28.xml><?xml version="1.0" encoding="utf-8"?>
+<p:sld xmlns:a="http://schemas.openxmlformats.org/drawingml/2006/main" xmlns:r="http://schemas.openxmlformats.org/officeDocument/2006/relationships" xmlns:p="http://schemas.openxmlformats.org/presentationml/2006/main">
+  <p:cSld>
+    <p:spTree>
+      <p:nvGrpSpPr>
+        <p:cNvPr id="1" name=""/>
+        <p:cNvGrpSpPr/>
+        <p:nvPr/>
+      </p:nvGrpSpPr>
+      <p:grpSpPr>
+        <a:xfrm>
+          <a:off x="0" y="0"/>
+          <a:ext cx="0" cy="0"/>
+          <a:chOff x="0" y="0"/>
+          <a:chExt cx="0" cy="0"/>
+        </a:xfrm>
+      </p:grpSpPr>
+      <p:sp>
+        <p:nvSpPr>
+          <p:cNvPr id="2" name="Title 1">
+            <a:extLst>
+              <a:ext uri="{FF2B5EF4-FFF2-40B4-BE49-F238E27FC236}">
+                <a16:creationId xmlns:a16="http://schemas.microsoft.com/office/drawing/2014/main" id="{DEC72F72-42F9-57D1-B117-E8EA3E4C6321}"/>
+              </a:ext>
+            </a:extLst>
+          </p:cNvPr>
+          <p:cNvSpPr>
+            <a:spLocks noGrp="1"/>
+          </p:cNvSpPr>
+          <p:nvPr>
+            <p:ph type="title"/>
+          </p:nvPr>
+        </p:nvSpPr>
+        <p:spPr>
+          <a:xfrm>
+            <a:off x="2611808" y="808056"/>
+            <a:ext cx="7958331" cy="1986419"/>
+          </a:xfrm>
+        </p:spPr>
+        <p:txBody>
+          <a:bodyPr>
+            <a:normAutofit/>
+          </a:bodyPr>
+          <a:lstStyle/>
+          <a:p>
+            <a:r>
+              <a:rPr lang="en-US" dirty="0" err="1"/>
+              <a:t>Técnicas</a:t>
+            </a:r>
+            <a:r>
+              <a:rPr lang="en-US" dirty="0"/>
+              <a:t> de </a:t>
+            </a:r>
+            <a:r>
+              <a:rPr lang="en-US" dirty="0" err="1"/>
+              <a:t>programação</a:t>
+            </a:r>
+            <a:r>
+              <a:rPr lang="en-US" dirty="0"/>
+              <a:t> </a:t>
+            </a:r>
+            <a:r>
+              <a:rPr lang="en-US" dirty="0" err="1"/>
+              <a:t>em</a:t>
+            </a:r>
+            <a:r>
+              <a:rPr lang="en-US" dirty="0"/>
+              <a:t> Clojure</a:t>
+            </a:r>
+            <a:br>
+              <a:rPr lang="en-BR" dirty="0"/>
+            </a:br>
+            <a:r>
+              <a:rPr lang="en-BR" dirty="0"/>
+              <a:t>Aula 8 – 19/06/2023</a:t>
+            </a:r>
+            <a:br>
+              <a:rPr lang="en-BR" dirty="0"/>
+            </a:br>
+            <a:r>
+              <a:rPr lang="en-BR" dirty="0"/>
+              <a:t>@victorinacio	</a:t>
+            </a:r>
+          </a:p>
+        </p:txBody>
+      </p:sp>
+      <p:sp>
+        <p:nvSpPr>
+          <p:cNvPr id="3" name="Content Placeholder 2">
+            <a:extLst>
+              <a:ext uri="{FF2B5EF4-FFF2-40B4-BE49-F238E27FC236}">
+                <a16:creationId xmlns:a16="http://schemas.microsoft.com/office/drawing/2014/main" id="{08A8D014-EF6D-8616-B6C2-D9EE7016BC53}"/>
+              </a:ext>
+            </a:extLst>
+          </p:cNvPr>
+          <p:cNvSpPr>
+            <a:spLocks noGrp="1"/>
+          </p:cNvSpPr>
+          <p:nvPr>
+            <p:ph idx="1"/>
+          </p:nvPr>
+        </p:nvSpPr>
+        <p:spPr/>
+        <p:txBody>
+          <a:bodyPr/>
+          <a:lstStyle/>
+          <a:p>
+            <a:pPr marL="0" indent="0">
+              <a:buNone/>
+            </a:pPr>
+            <a:endParaRPr lang="en-BR" dirty="0"/>
+          </a:p>
+          <a:p>
+            <a:r>
+              <a:rPr lang="en-BR" dirty="0"/>
+              <a:t>Google Map Reduce</a:t>
+            </a:r>
+          </a:p>
+          <a:p>
+            <a:r>
+              <a:rPr lang="en-BR" dirty="0"/>
+              <a:t>Middlewares / Interceptors</a:t>
+            </a:r>
+          </a:p>
+          <a:p>
+            <a:r>
+              <a:rPr lang="en-BR" dirty="0"/>
+              <a:t>Exercicios</a:t>
+            </a:r>
+          </a:p>
+        </p:txBody>
+      </p:sp>
+    </p:spTree>
+    <p:extLst>
+      <p:ext uri="{BB962C8B-B14F-4D97-AF65-F5344CB8AC3E}">
+        <p14:creationId xmlns:p14="http://schemas.microsoft.com/office/powerpoint/2010/main" val="2670877544"/>
+      </p:ext>
+    </p:extLst>
+  </p:cSld>
+  <p:clrMapOvr>
+    <a:masterClrMapping/>
+  </p:clrMapOvr>
+</p:sld>
+</file>
+
+<file path=ppt/slides/slide29.xml><?xml version="1.0" encoding="utf-8"?>
+<p:sld xmlns:a="http://schemas.openxmlformats.org/drawingml/2006/main" xmlns:r="http://schemas.openxmlformats.org/officeDocument/2006/relationships" xmlns:p="http://schemas.openxmlformats.org/presentationml/2006/main">
+  <p:cSld>
+    <p:spTree>
+      <p:nvGrpSpPr>
+        <p:cNvPr id="1" name=""/>
+        <p:cNvGrpSpPr/>
+        <p:nvPr/>
+      </p:nvGrpSpPr>
+      <p:grpSpPr>
+        <a:xfrm>
+          <a:off x="0" y="0"/>
+          <a:ext cx="0" cy="0"/>
+          <a:chOff x="0" y="0"/>
+          <a:chExt cx="0" cy="0"/>
+        </a:xfrm>
+      </p:grpSpPr>
+      <p:sp>
+        <p:nvSpPr>
+          <p:cNvPr id="2" name="Title 1">
+            <a:extLst>
+              <a:ext uri="{FF2B5EF4-FFF2-40B4-BE49-F238E27FC236}">
+                <a16:creationId xmlns:a16="http://schemas.microsoft.com/office/drawing/2014/main" id="{FF254B19-D3E2-2231-A344-721BDB2B188E}"/>
+              </a:ext>
+            </a:extLst>
+          </p:cNvPr>
+          <p:cNvSpPr>
+            <a:spLocks noGrp="1"/>
+          </p:cNvSpPr>
+          <p:nvPr>
+            <p:ph type="title"/>
+          </p:nvPr>
+        </p:nvSpPr>
+        <p:spPr/>
+        <p:txBody>
+          <a:bodyPr/>
+          <a:lstStyle/>
+          <a:p>
+            <a:r>
+              <a:rPr lang="en-BR" dirty="0"/>
+              <a:t>Exercicios</a:t>
+            </a:r>
+          </a:p>
+        </p:txBody>
+      </p:sp>
+      <p:sp>
+        <p:nvSpPr>
+          <p:cNvPr id="3" name="Content Placeholder 2">
+            <a:extLst>
+              <a:ext uri="{FF2B5EF4-FFF2-40B4-BE49-F238E27FC236}">
+                <a16:creationId xmlns:a16="http://schemas.microsoft.com/office/drawing/2014/main" id="{A2EC1E5C-1295-5A59-2D36-AB4557EDB5D5}"/>
+              </a:ext>
+            </a:extLst>
+          </p:cNvPr>
+          <p:cNvSpPr>
+            <a:spLocks noGrp="1"/>
+          </p:cNvSpPr>
+          <p:nvPr>
+            <p:ph idx="1"/>
+          </p:nvPr>
+        </p:nvSpPr>
+        <p:spPr/>
+        <p:txBody>
+          <a:bodyPr/>
+          <a:lstStyle/>
+          <a:p>
+            <a:r>
+              <a:rPr lang="en-BR" dirty="0"/>
+              <a:t>Adicione na funcionalidade de contagem de palavras um filtro parametrizavel para ignorara determinados caracteres</a:t>
+            </a:r>
+          </a:p>
+          <a:p>
+            <a:r>
+              <a:rPr lang="en-BR" dirty="0"/>
+              <a:t>Gere uma sequencia de numeros de 0 a 100 e obtenha gere um map com o numero como chave e como valor o retorno do body do endpoint </a:t>
+            </a:r>
+            <a:r>
+              <a:rPr lang="en-US" sz="1800" dirty="0">
+                <a:solidFill>
+                  <a:srgbClr val="8EA765"/>
+                </a:solidFill>
+                <a:effectLst/>
+                <a:latin typeface="Fira Code" panose="020B0809050000020004" pitchFamily="49" charset="0"/>
+              </a:rPr>
+              <a:t>/par-</a:t>
+            </a:r>
+            <a:r>
+              <a:rPr lang="en-US" sz="1800" dirty="0" err="1">
+                <a:solidFill>
+                  <a:srgbClr val="8EA765"/>
+                </a:solidFill>
+                <a:effectLst/>
+                <a:latin typeface="Fira Code" panose="020B0809050000020004" pitchFamily="49" charset="0"/>
+              </a:rPr>
+              <a:t>ou</a:t>
+            </a:r>
+            <a:r>
+              <a:rPr lang="en-US" sz="1800" dirty="0">
+                <a:solidFill>
+                  <a:srgbClr val="8EA765"/>
+                </a:solidFill>
+                <a:effectLst/>
+                <a:latin typeface="Fira Code" panose="020B0809050000020004" pitchFamily="49" charset="0"/>
+              </a:rPr>
+              <a:t>-impar</a:t>
+            </a:r>
+            <a:endParaRPr lang="en-US" sz="1800" dirty="0">
+              <a:solidFill>
+                <a:srgbClr val="CFD2D5"/>
+              </a:solidFill>
+              <a:effectLst/>
+              <a:latin typeface="Fira Code" panose="020B0809050000020004" pitchFamily="49" charset="0"/>
+            </a:endParaRPr>
+          </a:p>
+        </p:txBody>
+      </p:sp>
+    </p:spTree>
+    <p:extLst>
+      <p:ext uri="{BB962C8B-B14F-4D97-AF65-F5344CB8AC3E}">
+        <p14:creationId xmlns:p14="http://schemas.microsoft.com/office/powerpoint/2010/main" val="176055619"/>
       </p:ext>
     </p:extLst>
   </p:cSld>

</xml_diff>

<commit_message>
aula 8 - Inicio ajustes
</commit_message>
<xml_diff>
--- a/doc/NUBOOT-MOD3-PROG-TEC-CLJ.pptx
+++ b/doc/NUBOOT-MOD3-PROG-TEC-CLJ.pptx
@@ -5,7 +5,7 @@
     <p:sldMasterId id="2147483648" r:id="rId1"/>
   </p:sldMasterIdLst>
   <p:notesMasterIdLst>
-    <p:notesMasterId r:id="rId31"/>
+    <p:notesMasterId r:id="rId34"/>
   </p:notesMasterIdLst>
   <p:sldIdLst>
     <p:sldId id="256" r:id="rId2"/>
@@ -36,7 +36,10 @@
     <p:sldId id="282" r:id="rId27"/>
     <p:sldId id="284" r:id="rId28"/>
     <p:sldId id="285" r:id="rId29"/>
-    <p:sldId id="283" r:id="rId30"/>
+    <p:sldId id="286" r:id="rId30"/>
+    <p:sldId id="287" r:id="rId31"/>
+    <p:sldId id="288" r:id="rId32"/>
+    <p:sldId id="283" r:id="rId33"/>
   </p:sldIdLst>
   <p:sldSz cx="12192000" cy="6858000"/>
   <p:notesSz cx="6858000" cy="9144000"/>
@@ -192,6 +195,9 @@
           <p14:sldIdLst>
             <p14:sldId id="284"/>
             <p14:sldId id="285"/>
+            <p14:sldId id="286"/>
+            <p14:sldId id="287"/>
+            <p14:sldId id="288"/>
             <p14:sldId id="283"/>
           </p14:sldIdLst>
         </p14:section>
@@ -12036,7 +12042,7 @@
           <p:cNvPr id="2" name="Title 1">
             <a:extLst>
               <a:ext uri="{FF2B5EF4-FFF2-40B4-BE49-F238E27FC236}">
-                <a16:creationId xmlns:a16="http://schemas.microsoft.com/office/drawing/2014/main" id="{FF254B19-D3E2-2231-A344-721BDB2B188E}"/>
+                <a16:creationId xmlns:a16="http://schemas.microsoft.com/office/drawing/2014/main" id="{17378DA1-CB74-9D00-EBFB-98E3B5FF2FDB}"/>
               </a:ext>
             </a:extLst>
           </p:cNvPr>
@@ -12054,86 +12060,47 @@
           <a:p>
             <a:r>
               <a:rPr lang="en-BR" dirty="0"/>
-              <a:t>Exercicios</a:t>
-            </a:r>
-          </a:p>
-        </p:txBody>
-      </p:sp>
-      <p:sp>
-        <p:nvSpPr>
-          <p:cNvPr id="3" name="Content Placeholder 2">
+              <a:t>Map phase</a:t>
+            </a:r>
+          </a:p>
+        </p:txBody>
+      </p:sp>
+      <p:pic>
+        <p:nvPicPr>
+          <p:cNvPr id="7" name="Content Placeholder 6">
             <a:extLst>
               <a:ext uri="{FF2B5EF4-FFF2-40B4-BE49-F238E27FC236}">
-                <a16:creationId xmlns:a16="http://schemas.microsoft.com/office/drawing/2014/main" id="{A2EC1E5C-1295-5A59-2D36-AB4557EDB5D5}"/>
+                <a16:creationId xmlns:a16="http://schemas.microsoft.com/office/drawing/2014/main" id="{CBF4E643-C45C-5AF6-DAB1-5FAF2128732A}"/>
               </a:ext>
             </a:extLst>
           </p:cNvPr>
-          <p:cNvSpPr>
-            <a:spLocks noGrp="1"/>
-          </p:cNvSpPr>
+          <p:cNvPicPr>
+            <a:picLocks noGrp="1" noChangeAspect="1"/>
+          </p:cNvPicPr>
           <p:nvPr>
             <p:ph idx="1"/>
           </p:nvPr>
-        </p:nvSpPr>
-        <p:spPr/>
-        <p:txBody>
-          <a:bodyPr/>
-          <a:lstStyle/>
-          <a:p>
-            <a:r>
-              <a:rPr lang="en-BR" dirty="0"/>
-              <a:t>Adicione na funcionalidade de contagem de palavras um filtro parametrizavel para ignorara determinados caracteres</a:t>
-            </a:r>
-          </a:p>
-          <a:p>
-            <a:r>
-              <a:rPr lang="en-BR" dirty="0"/>
-              <a:t>Gere uma sequencia de numeros de 0 a 100 e obtenha gere um map com o numero como chave e como valor o retorno do body do endpoint </a:t>
-            </a:r>
-            <a:r>
-              <a:rPr lang="en-US" sz="1800" dirty="0">
-                <a:solidFill>
-                  <a:srgbClr val="8EA765"/>
-                </a:solidFill>
-                <a:effectLst/>
-                <a:latin typeface="Fira Code" panose="020B0809050000020004" pitchFamily="49" charset="0"/>
-              </a:rPr>
-              <a:t>/par-</a:t>
-            </a:r>
-            <a:r>
-              <a:rPr lang="en-US" sz="1800" dirty="0" err="1">
-                <a:solidFill>
-                  <a:srgbClr val="8EA765"/>
-                </a:solidFill>
-                <a:effectLst/>
-                <a:latin typeface="Fira Code" panose="020B0809050000020004" pitchFamily="49" charset="0"/>
-              </a:rPr>
-              <a:t>ou</a:t>
-            </a:r>
-            <a:r>
-              <a:rPr lang="en-US" sz="1800" dirty="0">
-                <a:solidFill>
-                  <a:srgbClr val="8EA765"/>
-                </a:solidFill>
-                <a:effectLst/>
-                <a:latin typeface="Fira Code" panose="020B0809050000020004" pitchFamily="49" charset="0"/>
-              </a:rPr>
-              <a:t>-impar</a:t>
-            </a:r>
-            <a:endParaRPr lang="en-US" sz="1800" dirty="0">
-              <a:solidFill>
-                <a:srgbClr val="CFD2D5"/>
-              </a:solidFill>
-              <a:effectLst/>
-              <a:latin typeface="Fira Code" panose="020B0809050000020004" pitchFamily="49" charset="0"/>
-            </a:endParaRPr>
-          </a:p>
-        </p:txBody>
-      </p:sp>
+        </p:nvPicPr>
+        <p:blipFill>
+          <a:blip r:embed="rId2"/>
+          <a:stretch>
+            <a:fillRect/>
+          </a:stretch>
+        </p:blipFill>
+        <p:spPr>
+          <a:xfrm>
+            <a:off x="3016997" y="1580366"/>
+            <a:ext cx="5996374" cy="5082076"/>
+          </a:xfrm>
+          <a:prstGeom prst="rect">
+            <a:avLst/>
+          </a:prstGeom>
+        </p:spPr>
+      </p:pic>
     </p:spTree>
     <p:extLst>
       <p:ext uri="{BB962C8B-B14F-4D97-AF65-F5344CB8AC3E}">
-        <p14:creationId xmlns:p14="http://schemas.microsoft.com/office/powerpoint/2010/main" val="176055619"/>
+        <p14:creationId xmlns:p14="http://schemas.microsoft.com/office/powerpoint/2010/main" val="1241611219"/>
       </p:ext>
     </p:extLst>
   </p:cSld>
@@ -12329,6 +12296,484 @@
     <p:extLst>
       <p:ext uri="{BB962C8B-B14F-4D97-AF65-F5344CB8AC3E}">
         <p14:creationId xmlns:p14="http://schemas.microsoft.com/office/powerpoint/2010/main" val="2018294636"/>
+      </p:ext>
+    </p:extLst>
+  </p:cSld>
+  <p:clrMapOvr>
+    <a:masterClrMapping/>
+  </p:clrMapOvr>
+</p:sld>
+</file>
+
+<file path=ppt/slides/slide30.xml><?xml version="1.0" encoding="utf-8"?>
+<p:sld xmlns:a="http://schemas.openxmlformats.org/drawingml/2006/main" xmlns:r="http://schemas.openxmlformats.org/officeDocument/2006/relationships" xmlns:p="http://schemas.openxmlformats.org/presentationml/2006/main">
+  <p:cSld>
+    <p:spTree>
+      <p:nvGrpSpPr>
+        <p:cNvPr id="1" name=""/>
+        <p:cNvGrpSpPr/>
+        <p:nvPr/>
+      </p:nvGrpSpPr>
+      <p:grpSpPr>
+        <a:xfrm>
+          <a:off x="0" y="0"/>
+          <a:ext cx="0" cy="0"/>
+          <a:chOff x="0" y="0"/>
+          <a:chExt cx="0" cy="0"/>
+        </a:xfrm>
+      </p:grpSpPr>
+      <p:sp>
+        <p:nvSpPr>
+          <p:cNvPr id="2" name="Title 1">
+            <a:extLst>
+              <a:ext uri="{FF2B5EF4-FFF2-40B4-BE49-F238E27FC236}">
+                <a16:creationId xmlns:a16="http://schemas.microsoft.com/office/drawing/2014/main" id="{17378DA1-CB74-9D00-EBFB-98E3B5FF2FDB}"/>
+              </a:ext>
+            </a:extLst>
+          </p:cNvPr>
+          <p:cNvSpPr>
+            <a:spLocks noGrp="1"/>
+          </p:cNvSpPr>
+          <p:nvPr>
+            <p:ph type="title"/>
+          </p:nvPr>
+        </p:nvSpPr>
+        <p:spPr/>
+        <p:txBody>
+          <a:bodyPr/>
+          <a:lstStyle/>
+          <a:p>
+            <a:r>
+              <a:rPr lang="en-BR" dirty="0"/>
+              <a:t>Combine</a:t>
+            </a:r>
+          </a:p>
+        </p:txBody>
+      </p:sp>
+      <p:pic>
+        <p:nvPicPr>
+          <p:cNvPr id="11" name="Content Placeholder 10">
+            <a:extLst>
+              <a:ext uri="{FF2B5EF4-FFF2-40B4-BE49-F238E27FC236}">
+                <a16:creationId xmlns:a16="http://schemas.microsoft.com/office/drawing/2014/main" id="{3789CC81-C2E6-627A-2E1C-39BB6D63CF28}"/>
+              </a:ext>
+            </a:extLst>
+          </p:cNvPr>
+          <p:cNvPicPr>
+            <a:picLocks noGrp="1" noChangeAspect="1"/>
+          </p:cNvPicPr>
+          <p:nvPr>
+            <p:ph idx="1"/>
+          </p:nvPr>
+        </p:nvPicPr>
+        <p:blipFill>
+          <a:blip r:embed="rId2"/>
+          <a:stretch>
+            <a:fillRect/>
+          </a:stretch>
+        </p:blipFill>
+        <p:spPr>
+          <a:xfrm>
+            <a:off x="1881930" y="1580366"/>
+            <a:ext cx="8351320" cy="4469578"/>
+          </a:xfrm>
+          <a:prstGeom prst="rect">
+            <a:avLst/>
+          </a:prstGeom>
+        </p:spPr>
+      </p:pic>
+    </p:spTree>
+    <p:extLst>
+      <p:ext uri="{BB962C8B-B14F-4D97-AF65-F5344CB8AC3E}">
+        <p14:creationId xmlns:p14="http://schemas.microsoft.com/office/powerpoint/2010/main" val="498760454"/>
+      </p:ext>
+    </p:extLst>
+  </p:cSld>
+  <p:clrMapOvr>
+    <a:masterClrMapping/>
+  </p:clrMapOvr>
+</p:sld>
+</file>
+
+<file path=ppt/slides/slide31.xml><?xml version="1.0" encoding="utf-8"?>
+<p:sld xmlns:a="http://schemas.openxmlformats.org/drawingml/2006/main" xmlns:r="http://schemas.openxmlformats.org/officeDocument/2006/relationships" xmlns:p="http://schemas.openxmlformats.org/presentationml/2006/main">
+  <p:cSld>
+    <p:spTree>
+      <p:nvGrpSpPr>
+        <p:cNvPr id="1" name=""/>
+        <p:cNvGrpSpPr/>
+        <p:nvPr/>
+      </p:nvGrpSpPr>
+      <p:grpSpPr>
+        <a:xfrm>
+          <a:off x="0" y="0"/>
+          <a:ext cx="0" cy="0"/>
+          <a:chOff x="0" y="0"/>
+          <a:chExt cx="0" cy="0"/>
+        </a:xfrm>
+      </p:grpSpPr>
+      <p:sp>
+        <p:nvSpPr>
+          <p:cNvPr id="2" name="Title 1">
+            <a:extLst>
+              <a:ext uri="{FF2B5EF4-FFF2-40B4-BE49-F238E27FC236}">
+                <a16:creationId xmlns:a16="http://schemas.microsoft.com/office/drawing/2014/main" id="{17378DA1-CB74-9D00-EBFB-98E3B5FF2FDB}"/>
+              </a:ext>
+            </a:extLst>
+          </p:cNvPr>
+          <p:cNvSpPr>
+            <a:spLocks noGrp="1"/>
+          </p:cNvSpPr>
+          <p:nvPr>
+            <p:ph type="title"/>
+          </p:nvPr>
+        </p:nvSpPr>
+        <p:spPr/>
+        <p:txBody>
+          <a:bodyPr/>
+          <a:lstStyle/>
+          <a:p>
+            <a:r>
+              <a:rPr lang="en-BR" dirty="0"/>
+              <a:t>Reduce</a:t>
+            </a:r>
+          </a:p>
+        </p:txBody>
+      </p:sp>
+      <p:pic>
+        <p:nvPicPr>
+          <p:cNvPr id="5" name="Content Placeholder 4">
+            <a:extLst>
+              <a:ext uri="{FF2B5EF4-FFF2-40B4-BE49-F238E27FC236}">
+                <a16:creationId xmlns:a16="http://schemas.microsoft.com/office/drawing/2014/main" id="{B02C75A3-F716-87EC-55CF-B649B1EA5FF5}"/>
+              </a:ext>
+            </a:extLst>
+          </p:cNvPr>
+          <p:cNvPicPr>
+            <a:picLocks noGrp="1" noChangeAspect="1"/>
+          </p:cNvPicPr>
+          <p:nvPr>
+            <p:ph idx="1"/>
+          </p:nvPr>
+        </p:nvPicPr>
+        <p:blipFill>
+          <a:blip r:embed="rId2"/>
+          <a:stretch>
+            <a:fillRect/>
+          </a:stretch>
+        </p:blipFill>
+        <p:spPr>
+          <a:xfrm>
+            <a:off x="1877354" y="1430337"/>
+            <a:ext cx="8328963" cy="5037680"/>
+          </a:xfrm>
+          <a:prstGeom prst="rect">
+            <a:avLst/>
+          </a:prstGeom>
+        </p:spPr>
+      </p:pic>
+    </p:spTree>
+    <p:extLst>
+      <p:ext uri="{BB962C8B-B14F-4D97-AF65-F5344CB8AC3E}">
+        <p14:creationId xmlns:p14="http://schemas.microsoft.com/office/powerpoint/2010/main" val="2034736119"/>
+      </p:ext>
+    </p:extLst>
+  </p:cSld>
+  <p:clrMapOvr>
+    <a:masterClrMapping/>
+  </p:clrMapOvr>
+</p:sld>
+</file>
+
+<file path=ppt/slides/slide32.xml><?xml version="1.0" encoding="utf-8"?>
+<p:sld xmlns:a="http://schemas.openxmlformats.org/drawingml/2006/main" xmlns:r="http://schemas.openxmlformats.org/officeDocument/2006/relationships" xmlns:p="http://schemas.openxmlformats.org/presentationml/2006/main">
+  <p:cSld>
+    <p:spTree>
+      <p:nvGrpSpPr>
+        <p:cNvPr id="1" name=""/>
+        <p:cNvGrpSpPr/>
+        <p:nvPr/>
+      </p:nvGrpSpPr>
+      <p:grpSpPr>
+        <a:xfrm>
+          <a:off x="0" y="0"/>
+          <a:ext cx="0" cy="0"/>
+          <a:chOff x="0" y="0"/>
+          <a:chExt cx="0" cy="0"/>
+        </a:xfrm>
+      </p:grpSpPr>
+      <p:sp>
+        <p:nvSpPr>
+          <p:cNvPr id="2" name="Title 1">
+            <a:extLst>
+              <a:ext uri="{FF2B5EF4-FFF2-40B4-BE49-F238E27FC236}">
+                <a16:creationId xmlns:a16="http://schemas.microsoft.com/office/drawing/2014/main" id="{FF254B19-D3E2-2231-A344-721BDB2B188E}"/>
+              </a:ext>
+            </a:extLst>
+          </p:cNvPr>
+          <p:cNvSpPr>
+            <a:spLocks noGrp="1"/>
+          </p:cNvSpPr>
+          <p:nvPr>
+            <p:ph type="title"/>
+          </p:nvPr>
+        </p:nvSpPr>
+        <p:spPr/>
+        <p:txBody>
+          <a:bodyPr/>
+          <a:lstStyle/>
+          <a:p>
+            <a:r>
+              <a:rPr lang="en-BR" dirty="0"/>
+              <a:t>Exercicios</a:t>
+            </a:r>
+          </a:p>
+        </p:txBody>
+      </p:sp>
+      <p:sp>
+        <p:nvSpPr>
+          <p:cNvPr id="3" name="Content Placeholder 2">
+            <a:extLst>
+              <a:ext uri="{FF2B5EF4-FFF2-40B4-BE49-F238E27FC236}">
+                <a16:creationId xmlns:a16="http://schemas.microsoft.com/office/drawing/2014/main" id="{A2EC1E5C-1295-5A59-2D36-AB4557EDB5D5}"/>
+              </a:ext>
+            </a:extLst>
+          </p:cNvPr>
+          <p:cNvSpPr>
+            <a:spLocks noGrp="1"/>
+          </p:cNvSpPr>
+          <p:nvPr>
+            <p:ph idx="1"/>
+          </p:nvPr>
+        </p:nvSpPr>
+        <p:spPr/>
+        <p:txBody>
+          <a:bodyPr>
+            <a:normAutofit fontScale="85000" lnSpcReduction="20000"/>
+          </a:bodyPr>
+          <a:lstStyle/>
+          <a:p>
+            <a:r>
+              <a:rPr lang="en-BR" dirty="0"/>
+              <a:t>Adicione na funcionalidade de contagem de palavras um filtro parametrizavel para ignorara determinados caracteres.</a:t>
+            </a:r>
+          </a:p>
+          <a:p>
+            <a:r>
+              <a:rPr lang="en-BR" dirty="0"/>
+              <a:t>Aplique no arquivo canto-chars.txt</a:t>
+            </a:r>
+          </a:p>
+          <a:p>
+            <a:br>
+              <a:rPr lang="en-US" sz="1800" dirty="0">
+                <a:solidFill>
+                  <a:srgbClr val="CFD2D5"/>
+                </a:solidFill>
+                <a:effectLst/>
+                <a:latin typeface="Fira Code" panose="020B0809050000020004" pitchFamily="49" charset="0"/>
+              </a:rPr>
+            </a:br>
+            <a:r>
+              <a:rPr lang="en-US" sz="1800" dirty="0">
+                <a:solidFill>
+                  <a:srgbClr val="CFD2D5"/>
+                </a:solidFill>
+                <a:effectLst/>
+                <a:latin typeface="Fira Code" panose="020B0809050000020004" pitchFamily="49" charset="0"/>
+              </a:rPr>
+              <a:t>(</a:t>
+            </a:r>
+            <a:r>
+              <a:rPr lang="en-US" sz="1800" dirty="0">
+                <a:solidFill>
+                  <a:srgbClr val="CC7832"/>
+                </a:solidFill>
+                <a:effectLst/>
+                <a:latin typeface="Fira Code" panose="020B0809050000020004" pitchFamily="49" charset="0"/>
+              </a:rPr>
+              <a:t>def </a:t>
+            </a:r>
+            <a:r>
+              <a:rPr lang="en-US" sz="1800" dirty="0">
+                <a:solidFill>
+                  <a:srgbClr val="CFD2D5"/>
+                </a:solidFill>
+                <a:effectLst/>
+                <a:latin typeface="Fira Code" panose="020B0809050000020004" pitchFamily="49" charset="0"/>
+              </a:rPr>
+              <a:t>replace-map {</a:t>
+            </a:r>
+            <a:r>
+              <a:rPr lang="en-US" sz="1800" dirty="0">
+                <a:solidFill>
+                  <a:srgbClr val="8EA765"/>
+                </a:solidFill>
+                <a:effectLst/>
+                <a:latin typeface="Fira Code" panose="020B0809050000020004" pitchFamily="49" charset="0"/>
+              </a:rPr>
+              <a:t>\( ""</a:t>
+            </a:r>
+            <a:br>
+              <a:rPr lang="en-US" sz="1800" dirty="0">
+                <a:solidFill>
+                  <a:srgbClr val="8EA765"/>
+                </a:solidFill>
+                <a:effectLst/>
+                <a:latin typeface="Fira Code" panose="020B0809050000020004" pitchFamily="49" charset="0"/>
+              </a:rPr>
+            </a:br>
+            <a:r>
+              <a:rPr lang="en-US" sz="1800" dirty="0">
+                <a:solidFill>
+                  <a:srgbClr val="8EA765"/>
+                </a:solidFill>
+                <a:effectLst/>
+                <a:latin typeface="Fira Code" panose="020B0809050000020004" pitchFamily="49" charset="0"/>
+              </a:rPr>
+              <a:t>                  \) ""</a:t>
+            </a:r>
+            <a:r>
+              <a:rPr lang="en-US" sz="1800" dirty="0">
+                <a:solidFill>
+                  <a:srgbClr val="CFD2D5"/>
+                </a:solidFill>
+                <a:effectLst/>
+                <a:latin typeface="Fira Code" panose="020B0809050000020004" pitchFamily="49" charset="0"/>
+              </a:rPr>
+              <a:t>})</a:t>
+            </a:r>
+            <a:br>
+              <a:rPr lang="en-US" sz="1800" dirty="0">
+                <a:solidFill>
+                  <a:srgbClr val="CFD2D5"/>
+                </a:solidFill>
+                <a:effectLst/>
+                <a:latin typeface="Fira Code" panose="020B0809050000020004" pitchFamily="49" charset="0"/>
+              </a:rPr>
+            </a:br>
+            <a:br>
+              <a:rPr lang="en-US" sz="1800" dirty="0">
+                <a:solidFill>
+                  <a:srgbClr val="CFD2D5"/>
+                </a:solidFill>
+                <a:effectLst/>
+                <a:latin typeface="Fira Code" panose="020B0809050000020004" pitchFamily="49" charset="0"/>
+              </a:rPr>
+            </a:br>
+            <a:r>
+              <a:rPr lang="en-US" sz="1800" dirty="0">
+                <a:solidFill>
+                  <a:srgbClr val="CFD2D5"/>
+                </a:solidFill>
+                <a:effectLst/>
+                <a:latin typeface="Fira Code" panose="020B0809050000020004" pitchFamily="49" charset="0"/>
+              </a:rPr>
+              <a:t>(</a:t>
+            </a:r>
+            <a:r>
+              <a:rPr lang="en-US" sz="1800" dirty="0" err="1">
+                <a:solidFill>
+                  <a:srgbClr val="DBC2AF"/>
+                </a:solidFill>
+                <a:effectLst/>
+                <a:latin typeface="Fira Code" panose="020B0809050000020004" pitchFamily="49" charset="0"/>
+              </a:rPr>
+              <a:t>clojure.string</a:t>
+            </a:r>
+            <a:r>
+              <a:rPr lang="en-US" sz="1800" dirty="0">
+                <a:solidFill>
+                  <a:srgbClr val="CC7832"/>
+                </a:solidFill>
+                <a:effectLst/>
+                <a:latin typeface="Fira Code" panose="020B0809050000020004" pitchFamily="49" charset="0"/>
+              </a:rPr>
+              <a:t>/escape </a:t>
+            </a:r>
+            <a:r>
+              <a:rPr lang="en-US" sz="1800" dirty="0">
+                <a:solidFill>
+                  <a:srgbClr val="8EA765"/>
+                </a:solidFill>
+                <a:effectLst/>
+                <a:latin typeface="Fira Code" panose="020B0809050000020004" pitchFamily="49" charset="0"/>
+              </a:rPr>
+              <a:t>"(a) (b) (c)" </a:t>
+            </a:r>
+            <a:r>
+              <a:rPr lang="en-US" sz="1800" dirty="0">
+                <a:solidFill>
+                  <a:srgbClr val="CFD2D5"/>
+                </a:solidFill>
+                <a:effectLst/>
+                <a:latin typeface="Fira Code" panose="020B0809050000020004" pitchFamily="49" charset="0"/>
+              </a:rPr>
+              <a:t>replace-map)</a:t>
+            </a:r>
+          </a:p>
+          <a:p>
+            <a:r>
+              <a:rPr lang="en-US" sz="1800" dirty="0">
+                <a:solidFill>
+                  <a:srgbClr val="CFD2D5"/>
+                </a:solidFill>
+                <a:effectLst/>
+                <a:latin typeface="Fira Code" panose="020B0809050000020004" pitchFamily="49" charset="0"/>
+              </a:rPr>
+              <a:t>=&gt; "a b c"</a:t>
+            </a:r>
+            <a:endParaRPr lang="en-BR" dirty="0"/>
+          </a:p>
+          <a:p>
+            <a:r>
+              <a:rPr lang="en-BR" dirty="0"/>
+              <a:t>Gere uma sequencia de numeros de 0 a 100 e retorne um mapa com o numero n gerado como chave e como valor o retorno do body do endpoint </a:t>
+            </a:r>
+            <a:r>
+              <a:rPr lang="en-US" sz="1800" dirty="0">
+                <a:solidFill>
+                  <a:srgbClr val="8EA765"/>
+                </a:solidFill>
+                <a:effectLst/>
+                <a:latin typeface="Fira Code" panose="020B0809050000020004" pitchFamily="49" charset="0"/>
+              </a:rPr>
+              <a:t>/par-</a:t>
+            </a:r>
+            <a:r>
+              <a:rPr lang="en-US" sz="1800" dirty="0" err="1">
+                <a:solidFill>
+                  <a:srgbClr val="8EA765"/>
+                </a:solidFill>
+                <a:effectLst/>
+                <a:latin typeface="Fira Code" panose="020B0809050000020004" pitchFamily="49" charset="0"/>
+              </a:rPr>
+              <a:t>ou</a:t>
+            </a:r>
+            <a:r>
+              <a:rPr lang="en-US" sz="1800" dirty="0">
+                <a:solidFill>
+                  <a:srgbClr val="8EA765"/>
+                </a:solidFill>
+                <a:effectLst/>
+                <a:latin typeface="Fira Code" panose="020B0809050000020004" pitchFamily="49" charset="0"/>
+              </a:rPr>
+              <a:t>-impar</a:t>
+            </a:r>
+            <a:endParaRPr lang="en-US" sz="1800" dirty="0">
+              <a:solidFill>
+                <a:srgbClr val="CFD2D5"/>
+              </a:solidFill>
+              <a:effectLst/>
+              <a:latin typeface="Fira Code" panose="020B0809050000020004" pitchFamily="49" charset="0"/>
+            </a:endParaRPr>
+          </a:p>
+        </p:txBody>
+      </p:sp>
+    </p:spTree>
+    <p:extLst>
+      <p:ext uri="{BB962C8B-B14F-4D97-AF65-F5344CB8AC3E}">
+        <p14:creationId xmlns:p14="http://schemas.microsoft.com/office/powerpoint/2010/main" val="176055619"/>
       </p:ext>
     </p:extLst>
   </p:cSld>

</xml_diff>

<commit_message>
aula 1 - Kafka basico
</commit_message>
<xml_diff>
--- a/doc/NUBOOT-MOD3-PROG-TEC-CLJ.pptx
+++ b/doc/NUBOOT-MOD3-PROG-TEC-CLJ.pptx
@@ -12060,7 +12060,7 @@
           <a:p>
             <a:r>
               <a:rPr lang="en-BR" dirty="0"/>
-              <a:t>Map phase</a:t>
+              <a:t>Map</a:t>
             </a:r>
           </a:p>
         </p:txBody>
@@ -12555,7 +12555,7 @@
           <a:p>
             <a:r>
               <a:rPr lang="en-BR" dirty="0"/>
-              <a:t>Adicione na funcionalidade de contagem de palavras um filtro parametrizavel para ignorara determinados caracteres.</a:t>
+              <a:t>Adicione na funcionalidade de contagem de palavras um filtro parametrizavel para ignorar a determinados caracteres.</a:t>
             </a:r>
           </a:p>
           <a:p>

</xml_diff>

<commit_message>
aula 1 - Kafka basico - v2
</commit_message>
<xml_diff>
--- a/doc/NUBOOT-MOD3-PROG-TEC-CLJ.pptx
+++ b/doc/NUBOOT-MOD3-PROG-TEC-CLJ.pptx
@@ -194,6 +194,10 @@
         <p14:section name="Aula 7" id="{80ED8B7E-946E-934D-A436-51C4A223908B}">
           <p14:sldIdLst>
             <p14:sldId id="284"/>
+          </p14:sldIdLst>
+        </p14:section>
+        <p14:section name="Aula 8" id="{E9A1ADAD-B9D2-2D4D-8E64-49DB59305D9C}">
+          <p14:sldIdLst>
             <p14:sldId id="285"/>
             <p14:sldId id="286"/>
             <p14:sldId id="287"/>
@@ -292,7 +296,7 @@
           <a:p>
             <a:fld id="{290A6CB2-1C58-D84E-B07B-B5770D071A49}" type="datetimeFigureOut">
               <a:rPr lang="en-BR" smtClean="0"/>
-              <a:t>19/06/23</a:t>
+              <a:t>20/06/23</a:t>
             </a:fld>
             <a:endParaRPr lang="en-BR"/>
           </a:p>
@@ -4951,7 +4955,7 @@
           <a:p>
             <a:fld id="{9AB3A824-1A51-4B26-AD58-A6D8E14F6C04}" type="datetimeFigureOut">
               <a:rPr lang="en-US"/>
-              <a:t>6/19/23</a:t>
+              <a:t>6/20/23</a:t>
             </a:fld>
             <a:endParaRPr lang="en-US"/>
           </a:p>
@@ -5285,7 +5289,7 @@
           <a:p>
             <a:fld id="{D857E33E-8B18-4087-B112-809917729534}" type="datetimeFigureOut">
               <a:rPr lang="en-US"/>
-              <a:t>6/19/23</a:t>
+              <a:t>6/20/23</a:t>
             </a:fld>
             <a:endParaRPr lang="en-US"/>
           </a:p>
@@ -5587,7 +5591,7 @@
           <a:p>
             <a:fld id="{D3FFE419-2371-464F-8239-3959401C3561}" type="datetimeFigureOut">
               <a:rPr lang="en-US"/>
-              <a:t>6/19/23</a:t>
+              <a:t>6/20/23</a:t>
             </a:fld>
             <a:endParaRPr lang="en-US"/>
           </a:p>
@@ -5834,7 +5838,7 @@
           <a:p>
             <a:fld id="{97D162C4-EDD9-4389-A98B-B87ECEA2A816}" type="datetimeFigureOut">
               <a:rPr lang="en-US"/>
-              <a:t>6/19/23</a:t>
+              <a:t>6/20/23</a:t>
             </a:fld>
             <a:endParaRPr lang="en-US"/>
           </a:p>
@@ -6241,7 +6245,7 @@
           <a:p>
             <a:fld id="{3E5059C3-6A89-4494-99FF-5A4D6FFD50EB}" type="datetimeFigureOut">
               <a:rPr lang="en-US"/>
-              <a:t>6/19/23</a:t>
+              <a:t>6/20/23</a:t>
             </a:fld>
             <a:endParaRPr lang="en-US"/>
           </a:p>
@@ -6555,7 +6559,7 @@
           <a:p>
             <a:fld id="{CA954B2F-12DE-47F5-8894-472B206D2E1E}" type="datetimeFigureOut">
               <a:rPr lang="en-US"/>
-              <a:t>6/19/23</a:t>
+              <a:t>6/20/23</a:t>
             </a:fld>
             <a:endParaRPr lang="en-US"/>
           </a:p>
@@ -7099,7 +7103,7 @@
           <a:p>
             <a:fld id="{3F30E46F-7819-4ACF-B48B-48222C2ACC88}" type="datetimeFigureOut">
               <a:rPr lang="en-US"/>
-              <a:t>6/19/23</a:t>
+              <a:t>6/20/23</a:t>
             </a:fld>
             <a:endParaRPr lang="en-US"/>
           </a:p>
@@ -7294,7 +7298,7 @@
           <a:p>
             <a:fld id="{1FAF3416-4057-4DAA-829D-4CA07428D088}" type="datetimeFigureOut">
               <a:rPr lang="en-US"/>
-              <a:t>6/19/23</a:t>
+              <a:t>6/20/23</a:t>
             </a:fld>
             <a:endParaRPr lang="en-US"/>
           </a:p>
@@ -7507,7 +7511,7 @@
           <a:p>
             <a:fld id="{921D9284-D300-4297-87F7-E791DCC15DB1}" type="datetimeFigureOut">
               <a:rPr lang="en-US"/>
-              <a:t>6/19/23</a:t>
+              <a:t>6/20/23</a:t>
             </a:fld>
             <a:endParaRPr lang="en-US"/>
           </a:p>
@@ -7876,7 +7880,7 @@
           <a:p>
             <a:fld id="{37D525BB-DA17-4BA0-B3C8-3AC3ABC827E6}" type="datetimeFigureOut">
               <a:rPr lang="en-US"/>
-              <a:t>6/19/23</a:t>
+              <a:t>6/20/23</a:t>
             </a:fld>
             <a:endParaRPr lang="en-US"/>
           </a:p>
@@ -8278,7 +8282,7 @@
           <a:p>
             <a:fld id="{B16C4C9A-3960-41CF-A4E9-2A8FB932454B}" type="datetimeFigureOut">
               <a:rPr lang="en-US"/>
-              <a:t>6/19/23</a:t>
+              <a:t>6/20/23</a:t>
             </a:fld>
             <a:endParaRPr lang="en-US"/>
           </a:p>
@@ -8589,7 +8593,7 @@
           <a:p>
             <a:fld id="{3CBC1C18-307B-4F68-A007-B5B542270E8D}" type="datetimeFigureOut">
               <a:rPr lang="en-US"/>
-              <a:t>6/19/23</a:t>
+              <a:t>6/20/23</a:t>
             </a:fld>
             <a:endParaRPr lang="en-US"/>
           </a:p>

</xml_diff>